<commit_message>
updated qc setup diagrams
</commit_message>
<xml_diff>
--- a/docs/EquipmentSetup/Equipment_Qc.pptx
+++ b/docs/EquipmentSetup/Equipment_Qc.pptx
@@ -210,7 +210,7 @@
           <a:p>
             <a:fld id="{B9503A7B-FFA9-4535-9439-F7DED7245B92}" type="datetimeFigureOut">
               <a:rPr lang="en-CA" smtClean="0"/>
-              <a:t>2023-12-05</a:t>
+              <a:t>2023-12-11</a:t>
             </a:fld>
             <a:endParaRPr lang="en-CA"/>
           </a:p>
@@ -609,7 +609,7 @@
           <a:p>
             <a:fld id="{DFF2FBC3-E573-4B2D-B1C4-960EEBA08826}" type="datetimeFigureOut">
               <a:rPr lang="fr-CA" smtClean="0"/>
-              <a:t>2023-12-05</a:t>
+              <a:t>2023-12-11</a:t>
             </a:fld>
             <a:endParaRPr lang="fr-CA"/>
           </a:p>
@@ -779,7 +779,7 @@
           <a:p>
             <a:fld id="{DFF2FBC3-E573-4B2D-B1C4-960EEBA08826}" type="datetimeFigureOut">
               <a:rPr lang="fr-CA" smtClean="0"/>
-              <a:t>2023-12-05</a:t>
+              <a:t>2023-12-11</a:t>
             </a:fld>
             <a:endParaRPr lang="fr-CA"/>
           </a:p>
@@ -959,7 +959,7 @@
           <a:p>
             <a:fld id="{DFF2FBC3-E573-4B2D-B1C4-960EEBA08826}" type="datetimeFigureOut">
               <a:rPr lang="fr-CA" smtClean="0"/>
-              <a:t>2023-12-05</a:t>
+              <a:t>2023-12-11</a:t>
             </a:fld>
             <a:endParaRPr lang="fr-CA"/>
           </a:p>
@@ -1129,7 +1129,7 @@
           <a:p>
             <a:fld id="{DFF2FBC3-E573-4B2D-B1C4-960EEBA08826}" type="datetimeFigureOut">
               <a:rPr lang="fr-CA" smtClean="0"/>
-              <a:t>2023-12-05</a:t>
+              <a:t>2023-12-11</a:t>
             </a:fld>
             <a:endParaRPr lang="fr-CA"/>
           </a:p>
@@ -1373,7 +1373,7 @@
           <a:p>
             <a:fld id="{DFF2FBC3-E573-4B2D-B1C4-960EEBA08826}" type="datetimeFigureOut">
               <a:rPr lang="fr-CA" smtClean="0"/>
-              <a:t>2023-12-05</a:t>
+              <a:t>2023-12-11</a:t>
             </a:fld>
             <a:endParaRPr lang="fr-CA"/>
           </a:p>
@@ -1605,7 +1605,7 @@
           <a:p>
             <a:fld id="{DFF2FBC3-E573-4B2D-B1C4-960EEBA08826}" type="datetimeFigureOut">
               <a:rPr lang="fr-CA" smtClean="0"/>
-              <a:t>2023-12-05</a:t>
+              <a:t>2023-12-11</a:t>
             </a:fld>
             <a:endParaRPr lang="fr-CA"/>
           </a:p>
@@ -1972,7 +1972,7 @@
           <a:p>
             <a:fld id="{DFF2FBC3-E573-4B2D-B1C4-960EEBA08826}" type="datetimeFigureOut">
               <a:rPr lang="fr-CA" smtClean="0"/>
-              <a:t>2023-12-05</a:t>
+              <a:t>2023-12-11</a:t>
             </a:fld>
             <a:endParaRPr lang="fr-CA"/>
           </a:p>
@@ -2090,7 +2090,7 @@
           <a:p>
             <a:fld id="{DFF2FBC3-E573-4B2D-B1C4-960EEBA08826}" type="datetimeFigureOut">
               <a:rPr lang="fr-CA" smtClean="0"/>
-              <a:t>2023-12-05</a:t>
+              <a:t>2023-12-11</a:t>
             </a:fld>
             <a:endParaRPr lang="fr-CA"/>
           </a:p>
@@ -2185,7 +2185,7 @@
           <a:p>
             <a:fld id="{DFF2FBC3-E573-4B2D-B1C4-960EEBA08826}" type="datetimeFigureOut">
               <a:rPr lang="fr-CA" smtClean="0"/>
-              <a:t>2023-12-05</a:t>
+              <a:t>2023-12-11</a:t>
             </a:fld>
             <a:endParaRPr lang="fr-CA"/>
           </a:p>
@@ -2462,7 +2462,7 @@
           <a:p>
             <a:fld id="{DFF2FBC3-E573-4B2D-B1C4-960EEBA08826}" type="datetimeFigureOut">
               <a:rPr lang="fr-CA" smtClean="0"/>
-              <a:t>2023-12-05</a:t>
+              <a:t>2023-12-11</a:t>
             </a:fld>
             <a:endParaRPr lang="fr-CA"/>
           </a:p>
@@ -2719,7 +2719,7 @@
           <a:p>
             <a:fld id="{DFF2FBC3-E573-4B2D-B1C4-960EEBA08826}" type="datetimeFigureOut">
               <a:rPr lang="fr-CA" smtClean="0"/>
-              <a:t>2023-12-05</a:t>
+              <a:t>2023-12-11</a:t>
             </a:fld>
             <a:endParaRPr lang="fr-CA"/>
           </a:p>
@@ -2932,7 +2932,7 @@
           <a:p>
             <a:fld id="{DFF2FBC3-E573-4B2D-B1C4-960EEBA08826}" type="datetimeFigureOut">
               <a:rPr lang="fr-CA" smtClean="0"/>
-              <a:t>2023-12-05</a:t>
+              <a:t>2023-12-11</a:t>
             </a:fld>
             <a:endParaRPr lang="fr-CA"/>
           </a:p>
@@ -8682,7 +8682,7 @@
             </a:pPr>
             <a:r>
               <a:rPr lang="fr-CA" sz="1013" dirty="0"/>
-              <a:t>Marshall Scoreboard</a:t>
+              <a:t>Marshal Scoreboard</a:t>
             </a:r>
           </a:p>
         </p:txBody>
@@ -12041,89 +12041,6 @@
           </a:p>
         </p:txBody>
       </p:sp>
-      <p:sp>
-        <p:nvSpPr>
-          <p:cNvPr id="69" name="TextBox 68">
-            <a:extLst>
-              <a:ext uri="{FF2B5EF4-FFF2-40B4-BE49-F238E27FC236}">
-                <a16:creationId xmlns:a16="http://schemas.microsoft.com/office/drawing/2014/main" id="{36B48EE2-5264-F63A-FC62-B894F0B45F3C}"/>
-              </a:ext>
-            </a:extLst>
-          </p:cNvPr>
-          <p:cNvSpPr txBox="1"/>
-          <p:nvPr/>
-        </p:nvSpPr>
-        <p:spPr>
-          <a:xfrm>
-            <a:off x="1367999" y="4981179"/>
-            <a:ext cx="939371" cy="317651"/>
-          </a:xfrm>
-          <a:prstGeom prst="rect">
-            <a:avLst/>
-          </a:prstGeom>
-          <a:noFill/>
-        </p:spPr>
-        <p:txBody>
-          <a:bodyPr wrap="square" rtlCol="0">
-            <a:spAutoFit/>
-          </a:bodyPr>
-          <a:lstStyle/>
-          <a:p>
-            <a:pPr algn="ctr">
-              <a:lnSpc>
-                <a:spcPct val="70000"/>
-              </a:lnSpc>
-            </a:pPr>
-            <a:r>
-              <a:rPr lang="fr-CA" sz="1013" dirty="0" err="1"/>
-              <a:t>Warmup</a:t>
-            </a:r>
-            <a:r>
-              <a:rPr lang="fr-CA" sz="1013" dirty="0"/>
-              <a:t> Scoreboard</a:t>
-            </a:r>
-          </a:p>
-        </p:txBody>
-      </p:sp>
-      <p:pic>
-        <p:nvPicPr>
-          <p:cNvPr id="71" name="Graphic 70" descr="Monitor with solid fill">
-            <a:extLst>
-              <a:ext uri="{FF2B5EF4-FFF2-40B4-BE49-F238E27FC236}">
-                <a16:creationId xmlns:a16="http://schemas.microsoft.com/office/drawing/2014/main" id="{20AB791E-C5F4-086E-E890-24817C0D1561}"/>
-              </a:ext>
-            </a:extLst>
-          </p:cNvPr>
-          <p:cNvPicPr>
-            <a:picLocks noChangeAspect="1"/>
-          </p:cNvPicPr>
-          <p:nvPr/>
-        </p:nvPicPr>
-        <p:blipFill>
-          <a:blip r:embed="rId16">
-            <a:extLst>
-              <a:ext uri="{28A0092B-C50C-407E-A947-70E740481C1C}">
-                <a14:useLocalDpi xmlns:a14="http://schemas.microsoft.com/office/drawing/2010/main" val="0"/>
-              </a:ext>
-              <a:ext uri="{96DAC541-7B7A-43D3-8B79-37D633B846F1}">
-                <asvg:svgBlip xmlns:asvg="http://schemas.microsoft.com/office/drawing/2016/SVG/main" r:embed="rId17"/>
-              </a:ext>
-            </a:extLst>
-          </a:blip>
-          <a:stretch>
-            <a:fillRect/>
-          </a:stretch>
-        </p:blipFill>
-        <p:spPr>
-          <a:xfrm>
-            <a:off x="1627924" y="4608004"/>
-            <a:ext cx="463422" cy="463422"/>
-          </a:xfrm>
-          <a:prstGeom prst="rect">
-            <a:avLst/>
-          </a:prstGeom>
-        </p:spPr>
-      </p:pic>
       <p:pic>
         <p:nvPicPr>
           <p:cNvPr id="76" name="Picture 2" descr="Cheapest Computer Chip Raspberry Pi!">
@@ -13012,8 +12929,15 @@
               </a:lnSpc>
             </a:pPr>
             <a:r>
+              <a:rPr lang="fr-CA" sz="1013" dirty="0" err="1"/>
+              <a:t>Warmup</a:t>
+            </a:r>
+            <a:br>
               <a:rPr lang="fr-CA" sz="1013" dirty="0"/>
-              <a:t>Marshall Scoreboard</a:t>
+            </a:br>
+            <a:r>
+              <a:rPr lang="fr-CA" sz="1013" dirty="0"/>
+              <a:t>Scoreboard</a:t>
             </a:r>
           </a:p>
         </p:txBody>
@@ -13693,237 +13617,7 @@
           <a:p>
             <a:r>
               <a:rPr lang="en-CA" sz="2800" dirty="0"/>
-              <a:t>Two platforms No Jury</a:t>
-            </a:r>
-          </a:p>
-        </p:txBody>
-      </p:sp>
-      <p:grpSp>
-        <p:nvGrpSpPr>
-          <p:cNvPr id="2" name="Group 1">
-            <a:extLst>
-              <a:ext uri="{FF2B5EF4-FFF2-40B4-BE49-F238E27FC236}">
-                <a16:creationId xmlns:a16="http://schemas.microsoft.com/office/drawing/2014/main" id="{57C2B487-74B9-1FB5-4E2E-0DE258A04BF3}"/>
-              </a:ext>
-            </a:extLst>
-          </p:cNvPr>
-          <p:cNvGrpSpPr/>
-          <p:nvPr/>
-        </p:nvGrpSpPr>
-        <p:grpSpPr>
-          <a:xfrm>
-            <a:off x="2213944" y="4608004"/>
-            <a:ext cx="1124026" cy="572413"/>
-            <a:chOff x="1970221" y="3843806"/>
-            <a:chExt cx="1124026" cy="572413"/>
-          </a:xfrm>
-        </p:grpSpPr>
-        <p:sp>
-          <p:nvSpPr>
-            <p:cNvPr id="5" name="TextBox 4">
-              <a:extLst>
-                <a:ext uri="{FF2B5EF4-FFF2-40B4-BE49-F238E27FC236}">
-                  <a16:creationId xmlns:a16="http://schemas.microsoft.com/office/drawing/2014/main" id="{2A4AF17E-0E33-8FB9-AA84-DE18BE3CD0A4}"/>
-                </a:ext>
-              </a:extLst>
-            </p:cNvPr>
-            <p:cNvSpPr txBox="1"/>
-            <p:nvPr/>
-          </p:nvSpPr>
-          <p:spPr>
-            <a:xfrm>
-              <a:off x="1970221" y="4168010"/>
-              <a:ext cx="1124026" cy="248209"/>
-            </a:xfrm>
-            <a:prstGeom prst="rect">
-              <a:avLst/>
-            </a:prstGeom>
-            <a:noFill/>
-          </p:spPr>
-          <p:txBody>
-            <a:bodyPr wrap="none" rtlCol="0">
-              <a:spAutoFit/>
-            </a:bodyPr>
-            <a:lstStyle/>
-            <a:p>
-              <a:pPr algn="ctr"/>
-              <a:r>
-                <a:rPr lang="fr-CA" sz="1013" dirty="0" err="1"/>
-                <a:t>Spare</a:t>
-              </a:r>
-              <a:r>
-                <a:rPr lang="fr-CA" sz="1013" dirty="0"/>
-                <a:t> Jury Laptop</a:t>
-              </a:r>
-            </a:p>
-          </p:txBody>
-        </p:sp>
-        <p:pic>
-          <p:nvPicPr>
-            <p:cNvPr id="8" name="Graphic 7" descr="Laptop">
-              <a:extLst>
-                <a:ext uri="{FF2B5EF4-FFF2-40B4-BE49-F238E27FC236}">
-                  <a16:creationId xmlns:a16="http://schemas.microsoft.com/office/drawing/2014/main" id="{98B8A67B-96F4-20FC-32EE-BF9C4902BFB5}"/>
-                </a:ext>
-              </a:extLst>
-            </p:cNvPr>
-            <p:cNvPicPr>
-              <a:picLocks noChangeAspect="1"/>
-            </p:cNvPicPr>
-            <p:nvPr/>
-          </p:nvPicPr>
-          <p:blipFill>
-            <a:blip r:embed="rId8">
-              <a:extLst>
-                <a:ext uri="{28A0092B-C50C-407E-A947-70E740481C1C}">
-                  <a14:useLocalDpi xmlns:a14="http://schemas.microsoft.com/office/drawing/2010/main" val="0"/>
-                </a:ext>
-                <a:ext uri="{96DAC541-7B7A-43D3-8B79-37D633B846F1}">
-                  <asvg:svgBlip xmlns:asvg="http://schemas.microsoft.com/office/drawing/2016/SVG/main" r:embed="rId9"/>
-                </a:ext>
-              </a:extLst>
-            </a:blip>
-            <a:stretch>
-              <a:fillRect/>
-            </a:stretch>
-          </p:blipFill>
-          <p:spPr>
-            <a:xfrm>
-              <a:off x="2313501" y="3843806"/>
-              <a:ext cx="437452" cy="456245"/>
-            </a:xfrm>
-            <a:prstGeom prst="rect">
-              <a:avLst/>
-            </a:prstGeom>
-          </p:spPr>
-        </p:pic>
-      </p:grpSp>
-      <p:cxnSp>
-        <p:nvCxnSpPr>
-          <p:cNvPr id="13" name="Straight Arrow Connector 12">
-            <a:extLst>
-              <a:ext uri="{FF2B5EF4-FFF2-40B4-BE49-F238E27FC236}">
-                <a16:creationId xmlns:a16="http://schemas.microsoft.com/office/drawing/2014/main" id="{1DB2B3EA-D23A-3791-41A0-68E5C0978A6B}"/>
-              </a:ext>
-            </a:extLst>
-          </p:cNvPr>
-          <p:cNvCxnSpPr>
-            <a:cxnSpLocks/>
-          </p:cNvCxnSpPr>
-          <p:nvPr/>
-        </p:nvCxnSpPr>
-        <p:spPr>
-          <a:xfrm flipH="1">
-            <a:off x="2994676" y="4824164"/>
-            <a:ext cx="542876" cy="0"/>
-          </a:xfrm>
-          <a:prstGeom prst="straightConnector1">
-            <a:avLst/>
-          </a:prstGeom>
-          <a:ln w="12700">
-            <a:solidFill>
-              <a:schemeClr val="accent2">
-                <a:lumMod val="75000"/>
-              </a:schemeClr>
-            </a:solidFill>
-            <a:tailEnd type="triangle"/>
-          </a:ln>
-        </p:spPr>
-        <p:style>
-          <a:lnRef idx="1">
-            <a:schemeClr val="accent1"/>
-          </a:lnRef>
-          <a:fillRef idx="0">
-            <a:schemeClr val="accent1"/>
-          </a:fillRef>
-          <a:effectRef idx="0">
-            <a:schemeClr val="accent1"/>
-          </a:effectRef>
-          <a:fontRef idx="minor">
-            <a:schemeClr val="tx1"/>
-          </a:fontRef>
-        </p:style>
-      </p:cxnSp>
-      <p:cxnSp>
-        <p:nvCxnSpPr>
-          <p:cNvPr id="14" name="Straight Arrow Connector 13">
-            <a:extLst>
-              <a:ext uri="{FF2B5EF4-FFF2-40B4-BE49-F238E27FC236}">
-                <a16:creationId xmlns:a16="http://schemas.microsoft.com/office/drawing/2014/main" id="{90B8A837-2DDF-F512-4654-5DF3C2713867}"/>
-              </a:ext>
-            </a:extLst>
-          </p:cNvPr>
-          <p:cNvCxnSpPr/>
-          <p:nvPr/>
-        </p:nvCxnSpPr>
-        <p:spPr>
-          <a:xfrm flipH="1">
-            <a:off x="2135030" y="4861381"/>
-            <a:ext cx="465878" cy="3588"/>
-          </a:xfrm>
-          <a:prstGeom prst="straightConnector1">
-            <a:avLst/>
-          </a:prstGeom>
-          <a:ln w="25400">
-            <a:solidFill>
-              <a:schemeClr val="accent6">
-                <a:lumMod val="75000"/>
-              </a:schemeClr>
-            </a:solidFill>
-            <a:tailEnd type="triangle"/>
-          </a:ln>
-        </p:spPr>
-        <p:style>
-          <a:lnRef idx="1">
-            <a:schemeClr val="accent1"/>
-          </a:lnRef>
-          <a:fillRef idx="0">
-            <a:schemeClr val="accent1"/>
-          </a:fillRef>
-          <a:effectRef idx="0">
-            <a:schemeClr val="accent1"/>
-          </a:effectRef>
-          <a:fontRef idx="minor">
-            <a:schemeClr val="tx1"/>
-          </a:fontRef>
-        </p:style>
-      </p:cxnSp>
-      <p:sp>
-        <p:nvSpPr>
-          <p:cNvPr id="21" name="TextBox 20">
-            <a:extLst>
-              <a:ext uri="{FF2B5EF4-FFF2-40B4-BE49-F238E27FC236}">
-                <a16:creationId xmlns:a16="http://schemas.microsoft.com/office/drawing/2014/main" id="{A5D35BFD-4575-C6C0-BEF7-A259D6FB5ED7}"/>
-              </a:ext>
-            </a:extLst>
-          </p:cNvPr>
-          <p:cNvSpPr txBox="1"/>
-          <p:nvPr/>
-        </p:nvSpPr>
-        <p:spPr>
-          <a:xfrm>
-            <a:off x="2132856" y="4711947"/>
-            <a:ext cx="425116" cy="184089"/>
-          </a:xfrm>
-          <a:prstGeom prst="rect">
-            <a:avLst/>
-          </a:prstGeom>
-          <a:noFill/>
-        </p:spPr>
-        <p:txBody>
-          <a:bodyPr wrap="none" rtlCol="0">
-            <a:spAutoFit/>
-          </a:bodyPr>
-          <a:lstStyle/>
-          <a:p>
-            <a:pPr algn="ctr">
-              <a:lnSpc>
-                <a:spcPct val="70000"/>
-              </a:lnSpc>
-            </a:pPr>
-            <a:r>
-              <a:rPr lang="en-CA" sz="800" dirty="0"/>
-              <a:t>HDMI</a:t>
+              <a:t>Two platforms, no Jury</a:t>
             </a:r>
           </a:p>
         </p:txBody>
@@ -16039,7 +15733,7 @@
         <p:spPr>
           <a:xfrm>
             <a:off x="1941157" y="7534387"/>
-            <a:ext cx="939371" cy="535916"/>
+            <a:ext cx="939371" cy="317651"/>
           </a:xfrm>
           <a:prstGeom prst="rect">
             <a:avLst/>
@@ -16058,19 +15752,8 @@
               </a:lnSpc>
             </a:pPr>
             <a:r>
-              <a:rPr lang="fr-CA" sz="1013" dirty="0"/>
-              <a:t>Extra platforms</a:t>
-            </a:r>
-            <a:br>
-              <a:rPr lang="fr-CA" sz="1013" dirty="0"/>
-            </a:br>
-            <a:r>
-              <a:rPr lang="fr-CA" sz="1013" dirty="0"/>
-              <a:t>are </a:t>
-            </a:r>
-            <a:r>
               <a:rPr lang="fr-CA" sz="1013" dirty="0" err="1"/>
-              <a:t>identical</a:t>
+              <a:t>Identical</a:t>
             </a:r>
             <a:r>
               <a:rPr lang="fr-CA" sz="1013" dirty="0"/>
@@ -16128,7 +15811,7 @@
           <a:p>
             <a:r>
               <a:rPr lang="en-CA" sz="2800" dirty="0"/>
-              <a:t>Two platforms Two Juries</a:t>
+              <a:t>Fully-Compliant Setup</a:t>
             </a:r>
           </a:p>
         </p:txBody>
@@ -18997,7 +18680,7 @@
             </a:pPr>
             <a:r>
               <a:rPr lang="fr-CA" sz="1013" dirty="0"/>
-              <a:t>Marshall Scoreboard</a:t>
+              <a:t>Marshal Scoreboard</a:t>
             </a:r>
           </a:p>
         </p:txBody>
@@ -19252,52 +18935,6 @@
           </a:p>
         </p:txBody>
       </p:sp>
-      <p:cxnSp>
-        <p:nvCxnSpPr>
-          <p:cNvPr id="155" name="Straight Arrow Connector 154">
-            <a:extLst>
-              <a:ext uri="{FF2B5EF4-FFF2-40B4-BE49-F238E27FC236}">
-                <a16:creationId xmlns:a16="http://schemas.microsoft.com/office/drawing/2014/main" id="{F4AD3AA0-A198-CD64-1272-6C797562C72A}"/>
-              </a:ext>
-            </a:extLst>
-          </p:cNvPr>
-          <p:cNvCxnSpPr>
-            <a:cxnSpLocks/>
-          </p:cNvCxnSpPr>
-          <p:nvPr/>
-        </p:nvCxnSpPr>
-        <p:spPr>
-          <a:xfrm flipH="1">
-            <a:off x="2991446" y="5125195"/>
-            <a:ext cx="542876" cy="0"/>
-          </a:xfrm>
-          <a:prstGeom prst="straightConnector1">
-            <a:avLst/>
-          </a:prstGeom>
-          <a:ln w="12700">
-            <a:solidFill>
-              <a:schemeClr val="accent2">
-                <a:lumMod val="75000"/>
-              </a:schemeClr>
-            </a:solidFill>
-            <a:tailEnd type="triangle"/>
-          </a:ln>
-        </p:spPr>
-        <p:style>
-          <a:lnRef idx="1">
-            <a:schemeClr val="accent1"/>
-          </a:lnRef>
-          <a:fillRef idx="0">
-            <a:schemeClr val="accent1"/>
-          </a:fillRef>
-          <a:effectRef idx="0">
-            <a:schemeClr val="accent1"/>
-          </a:effectRef>
-          <a:fontRef idx="minor">
-            <a:schemeClr val="tx1"/>
-          </a:fontRef>
-        </p:style>
-      </p:cxnSp>
       <p:cxnSp>
         <p:nvCxnSpPr>
           <p:cNvPr id="159" name="Connector: Elbow 158">

</xml_diff>

<commit_message>
updated equipment setup section
</commit_message>
<xml_diff>
--- a/docs/EquipmentSetup/Equipment_Qc.pptx
+++ b/docs/EquipmentSetup/Equipment_Qc.pptx
@@ -5,7 +5,7 @@
     <p:sldMasterId id="2147483660" r:id="rId1"/>
   </p:sldMasterIdLst>
   <p:notesMasterIdLst>
-    <p:notesMasterId r:id="rId13"/>
+    <p:notesMasterId r:id="rId15"/>
   </p:notesMasterIdLst>
   <p:sldIdLst>
     <p:sldId id="266" r:id="rId2"/>
@@ -14,11 +14,13 @@
     <p:sldId id="272" r:id="rId5"/>
     <p:sldId id="273" r:id="rId6"/>
     <p:sldId id="274" r:id="rId7"/>
-    <p:sldId id="260" r:id="rId8"/>
-    <p:sldId id="270" r:id="rId9"/>
-    <p:sldId id="271" r:id="rId10"/>
-    <p:sldId id="268" r:id="rId11"/>
-    <p:sldId id="269" r:id="rId12"/>
+    <p:sldId id="275" r:id="rId8"/>
+    <p:sldId id="276" r:id="rId9"/>
+    <p:sldId id="260" r:id="rId10"/>
+    <p:sldId id="270" r:id="rId11"/>
+    <p:sldId id="271" r:id="rId12"/>
+    <p:sldId id="268" r:id="rId13"/>
+    <p:sldId id="269" r:id="rId14"/>
   </p:sldIdLst>
   <p:sldSz cx="6858000" cy="9144000" type="letter"/>
   <p:notesSz cx="6858000" cy="9144000"/>
@@ -218,7 +220,7 @@
           <a:p>
             <a:fld id="{B9503A7B-FFA9-4535-9439-F7DED7245B92}" type="datetimeFigureOut">
               <a:rPr lang="en-CA" smtClean="0"/>
-              <a:t>2024-02-15</a:t>
+              <a:t>2024-07-31</a:t>
             </a:fld>
             <a:endParaRPr lang="en-CA"/>
           </a:p>
@@ -917,7 +919,7 @@
           <a:p>
             <a:fld id="{DFF2FBC3-E573-4B2D-B1C4-960EEBA08826}" type="datetimeFigureOut">
               <a:rPr lang="fr-CA" smtClean="0"/>
-              <a:t>2024-02-15</a:t>
+              <a:t>2024-07-31</a:t>
             </a:fld>
             <a:endParaRPr lang="fr-CA"/>
           </a:p>
@@ -1087,7 +1089,7 @@
           <a:p>
             <a:fld id="{DFF2FBC3-E573-4B2D-B1C4-960EEBA08826}" type="datetimeFigureOut">
               <a:rPr lang="fr-CA" smtClean="0"/>
-              <a:t>2024-02-15</a:t>
+              <a:t>2024-07-31</a:t>
             </a:fld>
             <a:endParaRPr lang="fr-CA"/>
           </a:p>
@@ -1267,7 +1269,7 @@
           <a:p>
             <a:fld id="{DFF2FBC3-E573-4B2D-B1C4-960EEBA08826}" type="datetimeFigureOut">
               <a:rPr lang="fr-CA" smtClean="0"/>
-              <a:t>2024-02-15</a:t>
+              <a:t>2024-07-31</a:t>
             </a:fld>
             <a:endParaRPr lang="fr-CA"/>
           </a:p>
@@ -1437,7 +1439,7 @@
           <a:p>
             <a:fld id="{DFF2FBC3-E573-4B2D-B1C4-960EEBA08826}" type="datetimeFigureOut">
               <a:rPr lang="fr-CA" smtClean="0"/>
-              <a:t>2024-02-15</a:t>
+              <a:t>2024-07-31</a:t>
             </a:fld>
             <a:endParaRPr lang="fr-CA"/>
           </a:p>
@@ -1681,7 +1683,7 @@
           <a:p>
             <a:fld id="{DFF2FBC3-E573-4B2D-B1C4-960EEBA08826}" type="datetimeFigureOut">
               <a:rPr lang="fr-CA" smtClean="0"/>
-              <a:t>2024-02-15</a:t>
+              <a:t>2024-07-31</a:t>
             </a:fld>
             <a:endParaRPr lang="fr-CA"/>
           </a:p>
@@ -1913,7 +1915,7 @@
           <a:p>
             <a:fld id="{DFF2FBC3-E573-4B2D-B1C4-960EEBA08826}" type="datetimeFigureOut">
               <a:rPr lang="fr-CA" smtClean="0"/>
-              <a:t>2024-02-15</a:t>
+              <a:t>2024-07-31</a:t>
             </a:fld>
             <a:endParaRPr lang="fr-CA"/>
           </a:p>
@@ -2280,7 +2282,7 @@
           <a:p>
             <a:fld id="{DFF2FBC3-E573-4B2D-B1C4-960EEBA08826}" type="datetimeFigureOut">
               <a:rPr lang="fr-CA" smtClean="0"/>
-              <a:t>2024-02-15</a:t>
+              <a:t>2024-07-31</a:t>
             </a:fld>
             <a:endParaRPr lang="fr-CA"/>
           </a:p>
@@ -2398,7 +2400,7 @@
           <a:p>
             <a:fld id="{DFF2FBC3-E573-4B2D-B1C4-960EEBA08826}" type="datetimeFigureOut">
               <a:rPr lang="fr-CA" smtClean="0"/>
-              <a:t>2024-02-15</a:t>
+              <a:t>2024-07-31</a:t>
             </a:fld>
             <a:endParaRPr lang="fr-CA"/>
           </a:p>
@@ -2493,7 +2495,7 @@
           <a:p>
             <a:fld id="{DFF2FBC3-E573-4B2D-B1C4-960EEBA08826}" type="datetimeFigureOut">
               <a:rPr lang="fr-CA" smtClean="0"/>
-              <a:t>2024-02-15</a:t>
+              <a:t>2024-07-31</a:t>
             </a:fld>
             <a:endParaRPr lang="fr-CA"/>
           </a:p>
@@ -2770,7 +2772,7 @@
           <a:p>
             <a:fld id="{DFF2FBC3-E573-4B2D-B1C4-960EEBA08826}" type="datetimeFigureOut">
               <a:rPr lang="fr-CA" smtClean="0"/>
-              <a:t>2024-02-15</a:t>
+              <a:t>2024-07-31</a:t>
             </a:fld>
             <a:endParaRPr lang="fr-CA"/>
           </a:p>
@@ -3027,7 +3029,7 @@
           <a:p>
             <a:fld id="{DFF2FBC3-E573-4B2D-B1C4-960EEBA08826}" type="datetimeFigureOut">
               <a:rPr lang="fr-CA" smtClean="0"/>
-              <a:t>2024-02-15</a:t>
+              <a:t>2024-07-31</a:t>
             </a:fld>
             <a:endParaRPr lang="fr-CA"/>
           </a:p>
@@ -3240,7 +3242,7 @@
           <a:p>
             <a:fld id="{DFF2FBC3-E573-4B2D-B1C4-960EEBA08826}" type="datetimeFigureOut">
               <a:rPr lang="fr-CA" smtClean="0"/>
-              <a:t>2024-02-15</a:t>
+              <a:t>2024-07-31</a:t>
             </a:fld>
             <a:endParaRPr lang="fr-CA"/>
           </a:p>
@@ -9234,72 +9236,28 @@
       </p:grpSpPr>
       <p:cxnSp>
         <p:nvCxnSpPr>
-          <p:cNvPr id="337" name="Straight Arrow Connector 336">
-            <a:extLst>
-              <a:ext uri="{FF2B5EF4-FFF2-40B4-BE49-F238E27FC236}">
-                <a16:creationId xmlns:a16="http://schemas.microsoft.com/office/drawing/2014/main" id="{1985680E-6AB2-BF60-CFEB-6ED7AB3E08BA}"/>
+          <p:cNvPr id="386" name="Connector: Elbow 385">
+            <a:extLst>
+              <a:ext uri="{FF2B5EF4-FFF2-40B4-BE49-F238E27FC236}">
+                <a16:creationId xmlns:a16="http://schemas.microsoft.com/office/drawing/2014/main" id="{B9268D69-00FB-E4C8-1218-14CB2BF516D2}"/>
               </a:ext>
             </a:extLst>
           </p:cNvPr>
           <p:cNvCxnSpPr>
             <a:cxnSpLocks/>
+            <a:stCxn id="2" idx="2"/>
           </p:cNvCxnSpPr>
           <p:nvPr/>
         </p:nvCxnSpPr>
         <p:spPr>
-          <a:xfrm flipH="1">
-            <a:off x="2265985" y="2518643"/>
-            <a:ext cx="320174" cy="0"/>
-          </a:xfrm>
-          <a:prstGeom prst="straightConnector1">
-            <a:avLst/>
-          </a:prstGeom>
-          <a:ln w="12700">
-            <a:solidFill>
-              <a:schemeClr val="accent1"/>
-            </a:solidFill>
-            <a:headEnd type="none" w="med" len="med"/>
-            <a:tailEnd type="triangle" w="med" len="med"/>
-          </a:ln>
-        </p:spPr>
-        <p:style>
-          <a:lnRef idx="1">
-            <a:schemeClr val="accent1"/>
-          </a:lnRef>
-          <a:fillRef idx="0">
-            <a:schemeClr val="accent1"/>
-          </a:fillRef>
-          <a:effectRef idx="0">
-            <a:schemeClr val="accent1"/>
-          </a:effectRef>
-          <a:fontRef idx="minor">
-            <a:schemeClr val="tx1"/>
-          </a:fontRef>
-        </p:style>
-      </p:cxnSp>
-      <p:cxnSp>
-        <p:nvCxnSpPr>
-          <p:cNvPr id="386" name="Connector: Elbow 385">
-            <a:extLst>
-              <a:ext uri="{FF2B5EF4-FFF2-40B4-BE49-F238E27FC236}">
-                <a16:creationId xmlns:a16="http://schemas.microsoft.com/office/drawing/2014/main" id="{B9268D69-00FB-E4C8-1218-14CB2BF516D2}"/>
-              </a:ext>
-            </a:extLst>
-          </p:cNvPr>
-          <p:cNvCxnSpPr>
-            <a:cxnSpLocks/>
-            <a:stCxn id="94" idx="3"/>
-          </p:cNvCxnSpPr>
-          <p:nvPr/>
-        </p:nvCxnSpPr>
-        <p:spPr>
-          <a:xfrm flipV="1">
-            <a:off x="2177641" y="1576633"/>
-            <a:ext cx="100107" cy="1953033"/>
-          </a:xfrm>
-          <a:prstGeom prst="bentConnector3">
+          <a:xfrm flipH="1" flipV="1">
+            <a:off x="2277748" y="1576633"/>
+            <a:ext cx="20379" cy="932675"/>
+          </a:xfrm>
+          <a:prstGeom prst="bentConnector4">
             <a:avLst>
-              <a:gd name="adj1" fmla="val 401429"/>
+              <a:gd name="adj1" fmla="val -1433883"/>
+              <a:gd name="adj2" fmla="val 100345"/>
             </a:avLst>
           </a:prstGeom>
           <a:ln w="12700">
@@ -9371,10 +9329,10 @@
       </p:sp>
       <p:pic>
         <p:nvPicPr>
-          <p:cNvPr id="94" name="Graphic 93" descr="Smart Phone">
-            <a:extLst>
-              <a:ext uri="{FF2B5EF4-FFF2-40B4-BE49-F238E27FC236}">
-                <a16:creationId xmlns:a16="http://schemas.microsoft.com/office/drawing/2014/main" id="{7C77A85E-7AAA-8DAA-EC3F-67A83B132FDE}"/>
+          <p:cNvPr id="2" name="Graphic 1" descr="Smart Phone">
+            <a:extLst>
+              <a:ext uri="{FF2B5EF4-FFF2-40B4-BE49-F238E27FC236}">
+                <a16:creationId xmlns:a16="http://schemas.microsoft.com/office/drawing/2014/main" id="{DE1EFAD3-AAC4-6993-9E82-C66AE21697B4}"/>
               </a:ext>
             </a:extLst>
           </p:cNvPr>
@@ -9399,9 +9357,9 @@
           </a:stretch>
         </p:blipFill>
         <p:spPr>
-          <a:xfrm>
-            <a:off x="1920466" y="3401078"/>
-            <a:ext cx="257175" cy="257175"/>
+          <a:xfrm rot="16200000">
+            <a:off x="1755762" y="2238126"/>
+            <a:ext cx="542365" cy="542365"/>
           </a:xfrm>
           <a:prstGeom prst="rect">
             <a:avLst/>
@@ -9410,10 +9368,10 @@
       </p:pic>
       <p:pic>
         <p:nvPicPr>
-          <p:cNvPr id="98" name="Graphic 97" descr="Smart Phone">
-            <a:extLst>
-              <a:ext uri="{FF2B5EF4-FFF2-40B4-BE49-F238E27FC236}">
-                <a16:creationId xmlns:a16="http://schemas.microsoft.com/office/drawing/2014/main" id="{C185BAE4-F4A2-B662-61BA-B911E5DF12DE}"/>
+          <p:cNvPr id="4" name="Graphic 3" descr="Laptop">
+            <a:extLst>
+              <a:ext uri="{FF2B5EF4-FFF2-40B4-BE49-F238E27FC236}">
+                <a16:creationId xmlns:a16="http://schemas.microsoft.com/office/drawing/2014/main" id="{71177BFE-FADE-7C18-D6B3-3E3B81E8BD87}"/>
               </a:ext>
             </a:extLst>
           </p:cNvPr>
@@ -9423,13 +9381,13 @@
           <p:nvPr/>
         </p:nvPicPr>
         <p:blipFill>
-          <a:blip r:embed="rId2">
+          <a:blip r:embed="rId4">
             <a:extLst>
               <a:ext uri="{28A0092B-C50C-407E-A947-70E740481C1C}">
                 <a14:useLocalDpi xmlns:a14="http://schemas.microsoft.com/office/drawing/2010/main" val="0"/>
               </a:ext>
               <a:ext uri="{96DAC541-7B7A-43D3-8B79-37D633B846F1}">
-                <asvg:svgBlip xmlns:asvg="http://schemas.microsoft.com/office/drawing/2016/SVG/main" r:embed="rId3"/>
+                <asvg:svgBlip xmlns:asvg="http://schemas.microsoft.com/office/drawing/2016/SVG/main" r:embed="rId5"/>
               </a:ext>
             </a:extLst>
           </a:blip>
@@ -9439,209 +9397,6 @@
         </p:blipFill>
         <p:spPr>
           <a:xfrm>
-            <a:off x="1672722" y="3400763"/>
-            <a:ext cx="257175" cy="257175"/>
-          </a:xfrm>
-          <a:prstGeom prst="rect">
-            <a:avLst/>
-          </a:prstGeom>
-        </p:spPr>
-      </p:pic>
-      <p:pic>
-        <p:nvPicPr>
-          <p:cNvPr id="99" name="Graphic 98" descr="Smart Phone">
-            <a:extLst>
-              <a:ext uri="{FF2B5EF4-FFF2-40B4-BE49-F238E27FC236}">
-                <a16:creationId xmlns:a16="http://schemas.microsoft.com/office/drawing/2014/main" id="{371710D2-DDB3-16DC-BC2D-4ADDACCA58BE}"/>
-              </a:ext>
-            </a:extLst>
-          </p:cNvPr>
-          <p:cNvPicPr>
-            <a:picLocks noChangeAspect="1"/>
-          </p:cNvPicPr>
-          <p:nvPr/>
-        </p:nvPicPr>
-        <p:blipFill>
-          <a:blip r:embed="rId2">
-            <a:extLst>
-              <a:ext uri="{28A0092B-C50C-407E-A947-70E740481C1C}">
-                <a14:useLocalDpi xmlns:a14="http://schemas.microsoft.com/office/drawing/2010/main" val="0"/>
-              </a:ext>
-              <a:ext uri="{96DAC541-7B7A-43D3-8B79-37D633B846F1}">
-                <asvg:svgBlip xmlns:asvg="http://schemas.microsoft.com/office/drawing/2016/SVG/main" r:embed="rId3"/>
-              </a:ext>
-            </a:extLst>
-          </a:blip>
-          <a:stretch>
-            <a:fillRect/>
-          </a:stretch>
-        </p:blipFill>
-        <p:spPr>
-          <a:xfrm>
-            <a:off x="1424978" y="3400448"/>
-            <a:ext cx="257175" cy="257175"/>
-          </a:xfrm>
-          <a:prstGeom prst="rect">
-            <a:avLst/>
-          </a:prstGeom>
-        </p:spPr>
-      </p:pic>
-      <p:pic>
-        <p:nvPicPr>
-          <p:cNvPr id="109" name="Picture 108">
-            <a:extLst>
-              <a:ext uri="{FF2B5EF4-FFF2-40B4-BE49-F238E27FC236}">
-                <a16:creationId xmlns:a16="http://schemas.microsoft.com/office/drawing/2014/main" id="{0FECFE45-D370-6CD6-A81A-3660C17F1505}"/>
-              </a:ext>
-            </a:extLst>
-          </p:cNvPr>
-          <p:cNvPicPr>
-            <a:picLocks noChangeAspect="1"/>
-          </p:cNvPicPr>
-          <p:nvPr/>
-        </p:nvPicPr>
-        <p:blipFill>
-          <a:blip r:embed="rId4">
-            <a:extLst>
-              <a:ext uri="{28A0092B-C50C-407E-A947-70E740481C1C}">
-                <a14:useLocalDpi xmlns:a14="http://schemas.microsoft.com/office/drawing/2010/main" val="0"/>
-              </a:ext>
-              <a:ext uri="{837473B0-CC2E-450A-ABE3-18F120FF3D39}">
-                <a1611:picAttrSrcUrl xmlns:a1611="http://schemas.microsoft.com/office/drawing/2016/11/main" r:id="rId5"/>
-              </a:ext>
-            </a:extLst>
-          </a:blip>
-          <a:stretch>
-            <a:fillRect/>
-          </a:stretch>
-        </p:blipFill>
-        <p:spPr>
-          <a:xfrm>
-            <a:off x="2293566" y="3347672"/>
-            <a:ext cx="182880" cy="134684"/>
-          </a:xfrm>
-          <a:prstGeom prst="rect">
-            <a:avLst/>
-          </a:prstGeom>
-        </p:spPr>
-      </p:pic>
-      <p:sp>
-        <p:nvSpPr>
-          <p:cNvPr id="110" name="TextBox 109">
-            <a:extLst>
-              <a:ext uri="{FF2B5EF4-FFF2-40B4-BE49-F238E27FC236}">
-                <a16:creationId xmlns:a16="http://schemas.microsoft.com/office/drawing/2014/main" id="{8B3F18EF-195C-F030-D7F5-D1C95D7DFBFE}"/>
-              </a:ext>
-            </a:extLst>
-          </p:cNvPr>
-          <p:cNvSpPr txBox="1"/>
-          <p:nvPr/>
-        </p:nvSpPr>
-        <p:spPr>
-          <a:xfrm>
-            <a:off x="692696" y="3370834"/>
-            <a:ext cx="862685" cy="317651"/>
-          </a:xfrm>
-          <a:prstGeom prst="rect">
-            <a:avLst/>
-          </a:prstGeom>
-          <a:noFill/>
-        </p:spPr>
-        <p:txBody>
-          <a:bodyPr wrap="square" rtlCol="0">
-            <a:spAutoFit/>
-          </a:bodyPr>
-          <a:lstStyle/>
-          <a:p>
-            <a:pPr algn="ctr">
-              <a:lnSpc>
-                <a:spcPct val="70000"/>
-              </a:lnSpc>
-            </a:pPr>
-            <a:r>
-              <a:rPr lang="en-CA" sz="1013" noProof="1"/>
-              <a:t>Referee</a:t>
-            </a:r>
-            <a:br>
-              <a:rPr lang="en-CA" sz="1013" noProof="1"/>
-            </a:br>
-            <a:r>
-              <a:rPr lang="en-CA" sz="1013" noProof="1"/>
-              <a:t>phones</a:t>
-            </a:r>
-          </a:p>
-        </p:txBody>
-      </p:sp>
-      <p:pic>
-        <p:nvPicPr>
-          <p:cNvPr id="2" name="Graphic 1" descr="Smart Phone">
-            <a:extLst>
-              <a:ext uri="{FF2B5EF4-FFF2-40B4-BE49-F238E27FC236}">
-                <a16:creationId xmlns:a16="http://schemas.microsoft.com/office/drawing/2014/main" id="{DE1EFAD3-AAC4-6993-9E82-C66AE21697B4}"/>
-              </a:ext>
-            </a:extLst>
-          </p:cNvPr>
-          <p:cNvPicPr>
-            <a:picLocks noChangeAspect="1"/>
-          </p:cNvPicPr>
-          <p:nvPr/>
-        </p:nvPicPr>
-        <p:blipFill>
-          <a:blip r:embed="rId2">
-            <a:extLst>
-              <a:ext uri="{28A0092B-C50C-407E-A947-70E740481C1C}">
-                <a14:useLocalDpi xmlns:a14="http://schemas.microsoft.com/office/drawing/2010/main" val="0"/>
-              </a:ext>
-              <a:ext uri="{96DAC541-7B7A-43D3-8B79-37D633B846F1}">
-                <asvg:svgBlip xmlns:asvg="http://schemas.microsoft.com/office/drawing/2016/SVG/main" r:embed="rId3"/>
-              </a:ext>
-            </a:extLst>
-          </a:blip>
-          <a:stretch>
-            <a:fillRect/>
-          </a:stretch>
-        </p:blipFill>
-        <p:spPr>
-          <a:xfrm rot="16200000">
-            <a:off x="1755762" y="2238126"/>
-            <a:ext cx="542365" cy="542365"/>
-          </a:xfrm>
-          <a:prstGeom prst="rect">
-            <a:avLst/>
-          </a:prstGeom>
-        </p:spPr>
-      </p:pic>
-      <p:pic>
-        <p:nvPicPr>
-          <p:cNvPr id="4" name="Graphic 3" descr="Laptop">
-            <a:extLst>
-              <a:ext uri="{FF2B5EF4-FFF2-40B4-BE49-F238E27FC236}">
-                <a16:creationId xmlns:a16="http://schemas.microsoft.com/office/drawing/2014/main" id="{71177BFE-FADE-7C18-D6B3-3E3B81E8BD87}"/>
-              </a:ext>
-            </a:extLst>
-          </p:cNvPr>
-          <p:cNvPicPr>
-            <a:picLocks noChangeAspect="1"/>
-          </p:cNvPicPr>
-          <p:nvPr/>
-        </p:nvPicPr>
-        <p:blipFill>
-          <a:blip r:embed="rId6">
-            <a:extLst>
-              <a:ext uri="{28A0092B-C50C-407E-A947-70E740481C1C}">
-                <a14:useLocalDpi xmlns:a14="http://schemas.microsoft.com/office/drawing/2010/main" val="0"/>
-              </a:ext>
-              <a:ext uri="{96DAC541-7B7A-43D3-8B79-37D633B846F1}">
-                <asvg:svgBlip xmlns:asvg="http://schemas.microsoft.com/office/drawing/2016/SVG/main" r:embed="rId7"/>
-              </a:ext>
-            </a:extLst>
-          </a:blip>
-          <a:stretch>
-            <a:fillRect/>
-          </a:stretch>
-        </p:blipFill>
-        <p:spPr>
-          <a:xfrm>
             <a:off x="1807151" y="1331640"/>
             <a:ext cx="514350" cy="514350"/>
           </a:xfrm>
@@ -9665,13 +9420,13 @@
           <p:nvPr/>
         </p:nvPicPr>
         <p:blipFill>
-          <a:blip r:embed="rId8">
+          <a:blip r:embed="rId6">
             <a:extLst>
               <a:ext uri="{28A0092B-C50C-407E-A947-70E740481C1C}">
                 <a14:useLocalDpi xmlns:a14="http://schemas.microsoft.com/office/drawing/2010/main" val="0"/>
               </a:ext>
               <a:ext uri="{96DAC541-7B7A-43D3-8B79-37D633B846F1}">
-                <asvg:svgBlip xmlns:asvg="http://schemas.microsoft.com/office/drawing/2016/SVG/main" r:embed="rId9"/>
+                <asvg:svgBlip xmlns:asvg="http://schemas.microsoft.com/office/drawing/2016/SVG/main" r:embed="rId7"/>
               </a:ext>
             </a:extLst>
           </a:blip>
@@ -9803,6 +9558,1859 @@
         </p:nvSpPr>
         <p:spPr>
           <a:xfrm>
+            <a:off x="1376772" y="1435583"/>
+            <a:ext cx="425116" cy="184089"/>
+          </a:xfrm>
+          <a:prstGeom prst="rect">
+            <a:avLst/>
+          </a:prstGeom>
+          <a:noFill/>
+        </p:spPr>
+        <p:txBody>
+          <a:bodyPr wrap="none" rtlCol="0">
+            <a:spAutoFit/>
+          </a:bodyPr>
+          <a:lstStyle/>
+          <a:p>
+            <a:pPr algn="ctr">
+              <a:lnSpc>
+                <a:spcPct val="70000"/>
+              </a:lnSpc>
+            </a:pPr>
+            <a:r>
+              <a:rPr lang="en-CA" sz="800" noProof="1"/>
+              <a:t>HDMI</a:t>
+            </a:r>
+          </a:p>
+        </p:txBody>
+      </p:sp>
+      <p:pic>
+        <p:nvPicPr>
+          <p:cNvPr id="9" name="Picture 8">
+            <a:extLst>
+              <a:ext uri="{FF2B5EF4-FFF2-40B4-BE49-F238E27FC236}">
+                <a16:creationId xmlns:a16="http://schemas.microsoft.com/office/drawing/2014/main" id="{694A75B0-294B-B2FF-0D45-EB170E8CB7CC}"/>
+              </a:ext>
+            </a:extLst>
+          </p:cNvPr>
+          <p:cNvPicPr>
+            <a:picLocks noChangeAspect="1"/>
+          </p:cNvPicPr>
+          <p:nvPr/>
+        </p:nvPicPr>
+        <p:blipFill>
+          <a:blip r:embed="rId8">
+            <a:extLst>
+              <a:ext uri="{28A0092B-C50C-407E-A947-70E740481C1C}">
+                <a14:useLocalDpi xmlns:a14="http://schemas.microsoft.com/office/drawing/2010/main" val="0"/>
+              </a:ext>
+              <a:ext uri="{837473B0-CC2E-450A-ABE3-18F120FF3D39}">
+                <a1611:picAttrSrcUrl xmlns:a1611="http://schemas.microsoft.com/office/drawing/2016/11/main" r:id="rId9"/>
+              </a:ext>
+            </a:extLst>
+          </a:blip>
+          <a:stretch>
+            <a:fillRect/>
+          </a:stretch>
+        </p:blipFill>
+        <p:spPr>
+          <a:xfrm>
+            <a:off x="2370135" y="2355469"/>
+            <a:ext cx="182880" cy="134684"/>
+          </a:xfrm>
+          <a:prstGeom prst="rect">
+            <a:avLst/>
+          </a:prstGeom>
+        </p:spPr>
+      </p:pic>
+      <p:sp>
+        <p:nvSpPr>
+          <p:cNvPr id="10" name="TextBox 9">
+            <a:extLst>
+              <a:ext uri="{FF2B5EF4-FFF2-40B4-BE49-F238E27FC236}">
+                <a16:creationId xmlns:a16="http://schemas.microsoft.com/office/drawing/2014/main" id="{F1943B5A-58B3-2F68-F921-E070BF2485A2}"/>
+              </a:ext>
+            </a:extLst>
+          </p:cNvPr>
+          <p:cNvSpPr txBox="1"/>
+          <p:nvPr/>
+        </p:nvSpPr>
+        <p:spPr>
+          <a:xfrm>
+            <a:off x="1592796" y="1734069"/>
+            <a:ext cx="939371" cy="317651"/>
+          </a:xfrm>
+          <a:prstGeom prst="rect">
+            <a:avLst/>
+          </a:prstGeom>
+          <a:noFill/>
+        </p:spPr>
+        <p:txBody>
+          <a:bodyPr wrap="square" rtlCol="0">
+            <a:spAutoFit/>
+          </a:bodyPr>
+          <a:lstStyle/>
+          <a:p>
+            <a:pPr algn="ctr">
+              <a:lnSpc>
+                <a:spcPct val="70000"/>
+              </a:lnSpc>
+            </a:pPr>
+            <a:r>
+              <a:rPr lang="en-CA" sz="1013" noProof="1"/>
+              <a:t>Announcer</a:t>
+            </a:r>
+            <a:br>
+              <a:rPr lang="en-CA" sz="1013" noProof="1"/>
+            </a:br>
+            <a:r>
+              <a:rPr lang="en-CA" sz="1013" noProof="1"/>
+              <a:t>Timekeeper</a:t>
+            </a:r>
+          </a:p>
+        </p:txBody>
+      </p:sp>
+      <p:pic>
+        <p:nvPicPr>
+          <p:cNvPr id="11" name="Graphic 10">
+            <a:extLst>
+              <a:ext uri="{FF2B5EF4-FFF2-40B4-BE49-F238E27FC236}">
+                <a16:creationId xmlns:a16="http://schemas.microsoft.com/office/drawing/2014/main" id="{0546E365-B64A-A026-7ACB-866EA06EAEC9}"/>
+              </a:ext>
+            </a:extLst>
+          </p:cNvPr>
+          <p:cNvPicPr>
+            <a:picLocks noChangeAspect="1"/>
+          </p:cNvPicPr>
+          <p:nvPr/>
+        </p:nvPicPr>
+        <p:blipFill rotWithShape="1">
+          <a:blip r:embed="rId10">
+            <a:duotone>
+              <a:schemeClr val="bg2">
+                <a:shade val="45000"/>
+                <a:satMod val="135000"/>
+              </a:schemeClr>
+              <a:prstClr val="white"/>
+            </a:duotone>
+            <a:extLst>
+              <a:ext uri="{28A0092B-C50C-407E-A947-70E740481C1C}">
+                <a14:useLocalDpi xmlns:a14="http://schemas.microsoft.com/office/drawing/2010/main" val="0"/>
+              </a:ext>
+              <a:ext uri="{96DAC541-7B7A-43D3-8B79-37D633B846F1}">
+                <asvg:svgBlip xmlns:asvg="http://schemas.microsoft.com/office/drawing/2016/SVG/main" r:embed="rId11"/>
+              </a:ext>
+            </a:extLst>
+          </a:blip>
+          <a:srcRect t="19758" b="39178"/>
+          <a:stretch/>
+        </p:blipFill>
+        <p:spPr>
+          <a:xfrm>
+            <a:off x="2708920" y="1846315"/>
+            <a:ext cx="710946" cy="291944"/>
+          </a:xfrm>
+          <a:prstGeom prst="rect">
+            <a:avLst/>
+          </a:prstGeom>
+        </p:spPr>
+      </p:pic>
+      <p:cxnSp>
+        <p:nvCxnSpPr>
+          <p:cNvPr id="13" name="Straight Arrow Connector 12">
+            <a:extLst>
+              <a:ext uri="{FF2B5EF4-FFF2-40B4-BE49-F238E27FC236}">
+                <a16:creationId xmlns:a16="http://schemas.microsoft.com/office/drawing/2014/main" id="{7F835017-B675-DB19-08D2-C453064FC5BF}"/>
+              </a:ext>
+            </a:extLst>
+          </p:cNvPr>
+          <p:cNvCxnSpPr>
+            <a:cxnSpLocks/>
+          </p:cNvCxnSpPr>
+          <p:nvPr/>
+        </p:nvCxnSpPr>
+        <p:spPr>
+          <a:xfrm flipH="1">
+            <a:off x="2591831" y="1987367"/>
+            <a:ext cx="208928" cy="0"/>
+          </a:xfrm>
+          <a:prstGeom prst="straightConnector1">
+            <a:avLst/>
+          </a:prstGeom>
+          <a:ln w="12700">
+            <a:solidFill>
+              <a:schemeClr val="tx1"/>
+            </a:solidFill>
+            <a:headEnd type="triangle"/>
+            <a:tailEnd type="triangle"/>
+          </a:ln>
+        </p:spPr>
+        <p:style>
+          <a:lnRef idx="1">
+            <a:schemeClr val="accent1"/>
+          </a:lnRef>
+          <a:fillRef idx="0">
+            <a:schemeClr val="accent1"/>
+          </a:fillRef>
+          <a:effectRef idx="0">
+            <a:schemeClr val="accent1"/>
+          </a:effectRef>
+          <a:fontRef idx="minor">
+            <a:schemeClr val="tx1"/>
+          </a:fontRef>
+        </p:style>
+      </p:cxnSp>
+      <p:sp>
+        <p:nvSpPr>
+          <p:cNvPr id="14" name="TextBox 13">
+            <a:extLst>
+              <a:ext uri="{FF2B5EF4-FFF2-40B4-BE49-F238E27FC236}">
+                <a16:creationId xmlns:a16="http://schemas.microsoft.com/office/drawing/2014/main" id="{46F89D06-804C-721C-71C1-D9C84A42DFF4}"/>
+              </a:ext>
+            </a:extLst>
+          </p:cNvPr>
+          <p:cNvSpPr txBox="1"/>
+          <p:nvPr/>
+        </p:nvSpPr>
+        <p:spPr>
+          <a:xfrm>
+            <a:off x="2636912" y="2056984"/>
+            <a:ext cx="862685" cy="208519"/>
+          </a:xfrm>
+          <a:prstGeom prst="rect">
+            <a:avLst/>
+          </a:prstGeom>
+          <a:noFill/>
+        </p:spPr>
+        <p:txBody>
+          <a:bodyPr wrap="square" rtlCol="0">
+            <a:spAutoFit/>
+          </a:bodyPr>
+          <a:lstStyle/>
+          <a:p>
+            <a:pPr algn="ctr">
+              <a:lnSpc>
+                <a:spcPct val="70000"/>
+              </a:lnSpc>
+            </a:pPr>
+            <a:r>
+              <a:rPr lang="fr-CA" sz="1013" dirty="0"/>
+              <a:t>Router</a:t>
+            </a:r>
+          </a:p>
+        </p:txBody>
+      </p:sp>
+      <p:sp>
+        <p:nvSpPr>
+          <p:cNvPr id="16" name="Graphic 45" descr="Cloud">
+            <a:extLst>
+              <a:ext uri="{FF2B5EF4-FFF2-40B4-BE49-F238E27FC236}">
+                <a16:creationId xmlns:a16="http://schemas.microsoft.com/office/drawing/2014/main" id="{659E5067-CD5C-B602-8CE0-D56635098499}"/>
+              </a:ext>
+            </a:extLst>
+          </p:cNvPr>
+          <p:cNvSpPr/>
+          <p:nvPr/>
+        </p:nvSpPr>
+        <p:spPr>
+          <a:xfrm>
+            <a:off x="3870467" y="1676122"/>
+            <a:ext cx="862685" cy="514350"/>
+          </a:xfrm>
+          <a:custGeom>
+            <a:avLst/>
+            <a:gdLst>
+              <a:gd name="connsiteX0" fmla="*/ 681898 w 4015594"/>
+              <a:gd name="connsiteY0" fmla="*/ 2281741 h 2285550"/>
+              <a:gd name="connsiteX1" fmla="*/ 870545 w 4015594"/>
+              <a:gd name="connsiteY1" fmla="*/ 2285551 h 2285550"/>
+              <a:gd name="connsiteX2" fmla="*/ 3444286 w 4015594"/>
+              <a:gd name="connsiteY2" fmla="*/ 2285551 h 2285550"/>
+              <a:gd name="connsiteX3" fmla="*/ 4015591 w 4015594"/>
+              <a:gd name="connsiteY3" fmla="*/ 1709703 h 2285550"/>
+              <a:gd name="connsiteX4" fmla="*/ 3449048 w 4015594"/>
+              <a:gd name="connsiteY4" fmla="*/ 1138436 h 2285550"/>
+              <a:gd name="connsiteX5" fmla="*/ 3401423 w 4015594"/>
+              <a:gd name="connsiteY5" fmla="*/ 1138436 h 2285550"/>
+              <a:gd name="connsiteX6" fmla="*/ 3101386 w 4015594"/>
+              <a:gd name="connsiteY6" fmla="*/ 557239 h 2285550"/>
+              <a:gd name="connsiteX7" fmla="*/ 2448890 w 4015594"/>
+              <a:gd name="connsiteY7" fmla="*/ 466752 h 2285550"/>
+              <a:gd name="connsiteX8" fmla="*/ 1296117 w 4015594"/>
+              <a:gd name="connsiteY8" fmla="*/ 94148 h 2285550"/>
+              <a:gd name="connsiteX9" fmla="*/ 829559 w 4015594"/>
+              <a:gd name="connsiteY9" fmla="*/ 852610 h 2285550"/>
+              <a:gd name="connsiteX10" fmla="*/ 829559 w 4015594"/>
+              <a:gd name="connsiteY10" fmla="*/ 862135 h 2285550"/>
+              <a:gd name="connsiteX11" fmla="*/ 716535 w 4015594"/>
+              <a:gd name="connsiteY11" fmla="*/ 852929 h 2285550"/>
+              <a:gd name="connsiteX12" fmla="*/ 0 w 4015594"/>
+              <a:gd name="connsiteY12" fmla="*/ 1567799 h 2285550"/>
+              <a:gd name="connsiteX13" fmla="*/ 67507 w 4015594"/>
+              <a:gd name="connsiteY13" fmla="*/ 1872066 h 2285550"/>
+              <a:gd name="connsiteX14" fmla="*/ 681898 w 4015594"/>
+              <a:gd name="connsiteY14" fmla="*/ 2281741 h 2285550"/>
+              <a:gd name="connsiteX15" fmla="*/ 219826 w 4015594"/>
+              <a:gd name="connsiteY15" fmla="*/ 1195710 h 2285550"/>
+              <a:gd name="connsiteX16" fmla="*/ 716507 w 4015594"/>
+              <a:gd name="connsiteY16" fmla="*/ 948169 h 2285550"/>
+              <a:gd name="connsiteX17" fmla="*/ 814138 w 4015594"/>
+              <a:gd name="connsiteY17" fmla="*/ 956118 h 2285550"/>
+              <a:gd name="connsiteX18" fmla="*/ 924776 w 4015594"/>
+              <a:gd name="connsiteY18" fmla="*/ 974215 h 2285550"/>
+              <a:gd name="connsiteX19" fmla="*/ 924776 w 4015594"/>
+              <a:gd name="connsiteY19" fmla="*/ 852591 h 2285550"/>
+              <a:gd name="connsiteX20" fmla="*/ 1690971 w 4015594"/>
+              <a:gd name="connsiteY20" fmla="*/ 95767 h 2285550"/>
+              <a:gd name="connsiteX21" fmla="*/ 2364137 w 4015594"/>
+              <a:gd name="connsiteY21" fmla="*/ 510238 h 2285550"/>
+              <a:gd name="connsiteX22" fmla="*/ 2401960 w 4015594"/>
+              <a:gd name="connsiteY22" fmla="*/ 583909 h 2285550"/>
+              <a:gd name="connsiteX23" fmla="*/ 2480170 w 4015594"/>
+              <a:gd name="connsiteY23" fmla="*/ 556701 h 2285550"/>
+              <a:gd name="connsiteX24" fmla="*/ 3270097 w 4015594"/>
+              <a:gd name="connsiteY24" fmla="*/ 930548 h 2285550"/>
+              <a:gd name="connsiteX25" fmla="*/ 3306169 w 4015594"/>
+              <a:gd name="connsiteY25" fmla="*/ 1138436 h 2285550"/>
+              <a:gd name="connsiteX26" fmla="*/ 3306169 w 4015594"/>
+              <a:gd name="connsiteY26" fmla="*/ 1233686 h 2285550"/>
+              <a:gd name="connsiteX27" fmla="*/ 3449044 w 4015594"/>
+              <a:gd name="connsiteY27" fmla="*/ 1233686 h 2285550"/>
+              <a:gd name="connsiteX28" fmla="*/ 3920293 w 4015594"/>
+              <a:gd name="connsiteY28" fmla="*/ 1719004 h 2285550"/>
+              <a:gd name="connsiteX29" fmla="*/ 3444286 w 4015594"/>
+              <a:gd name="connsiteY29" fmla="*/ 2190301 h 2285550"/>
+              <a:gd name="connsiteX30" fmla="*/ 771947 w 4015594"/>
+              <a:gd name="connsiteY30" fmla="*/ 2190301 h 2285550"/>
+              <a:gd name="connsiteX31" fmla="*/ 687070 w 4015594"/>
+              <a:gd name="connsiteY31" fmla="*/ 2186629 h 2285550"/>
+              <a:gd name="connsiteX32" fmla="*/ 95530 w 4015594"/>
+              <a:gd name="connsiteY32" fmla="*/ 1541782 h 2285550"/>
+              <a:gd name="connsiteX33" fmla="*/ 219811 w 4015594"/>
+              <a:gd name="connsiteY33" fmla="*/ 1195710 h 2285550"/>
+            </a:gdLst>
+            <a:ahLst/>
+            <a:cxnLst>
+              <a:cxn ang="0">
+                <a:pos x="connsiteX0" y="connsiteY0"/>
+              </a:cxn>
+              <a:cxn ang="0">
+                <a:pos x="connsiteX1" y="connsiteY1"/>
+              </a:cxn>
+              <a:cxn ang="0">
+                <a:pos x="connsiteX2" y="connsiteY2"/>
+              </a:cxn>
+              <a:cxn ang="0">
+                <a:pos x="connsiteX3" y="connsiteY3"/>
+              </a:cxn>
+              <a:cxn ang="0">
+                <a:pos x="connsiteX4" y="connsiteY4"/>
+              </a:cxn>
+              <a:cxn ang="0">
+                <a:pos x="connsiteX5" y="connsiteY5"/>
+              </a:cxn>
+              <a:cxn ang="0">
+                <a:pos x="connsiteX6" y="connsiteY6"/>
+              </a:cxn>
+              <a:cxn ang="0">
+                <a:pos x="connsiteX7" y="connsiteY7"/>
+              </a:cxn>
+              <a:cxn ang="0">
+                <a:pos x="connsiteX8" y="connsiteY8"/>
+              </a:cxn>
+              <a:cxn ang="0">
+                <a:pos x="connsiteX9" y="connsiteY9"/>
+              </a:cxn>
+              <a:cxn ang="0">
+                <a:pos x="connsiteX10" y="connsiteY10"/>
+              </a:cxn>
+              <a:cxn ang="0">
+                <a:pos x="connsiteX11" y="connsiteY11"/>
+              </a:cxn>
+              <a:cxn ang="0">
+                <a:pos x="connsiteX12" y="connsiteY12"/>
+              </a:cxn>
+              <a:cxn ang="0">
+                <a:pos x="connsiteX13" y="connsiteY13"/>
+              </a:cxn>
+              <a:cxn ang="0">
+                <a:pos x="connsiteX14" y="connsiteY14"/>
+              </a:cxn>
+              <a:cxn ang="0">
+                <a:pos x="connsiteX15" y="connsiteY15"/>
+              </a:cxn>
+              <a:cxn ang="0">
+                <a:pos x="connsiteX16" y="connsiteY16"/>
+              </a:cxn>
+              <a:cxn ang="0">
+                <a:pos x="connsiteX17" y="connsiteY17"/>
+              </a:cxn>
+              <a:cxn ang="0">
+                <a:pos x="connsiteX18" y="connsiteY18"/>
+              </a:cxn>
+              <a:cxn ang="0">
+                <a:pos x="connsiteX19" y="connsiteY19"/>
+              </a:cxn>
+              <a:cxn ang="0">
+                <a:pos x="connsiteX20" y="connsiteY20"/>
+              </a:cxn>
+              <a:cxn ang="0">
+                <a:pos x="connsiteX21" y="connsiteY21"/>
+              </a:cxn>
+              <a:cxn ang="0">
+                <a:pos x="connsiteX22" y="connsiteY22"/>
+              </a:cxn>
+              <a:cxn ang="0">
+                <a:pos x="connsiteX23" y="connsiteY23"/>
+              </a:cxn>
+              <a:cxn ang="0">
+                <a:pos x="connsiteX24" y="connsiteY24"/>
+              </a:cxn>
+              <a:cxn ang="0">
+                <a:pos x="connsiteX25" y="connsiteY25"/>
+              </a:cxn>
+              <a:cxn ang="0">
+                <a:pos x="connsiteX26" y="connsiteY26"/>
+              </a:cxn>
+              <a:cxn ang="0">
+                <a:pos x="connsiteX27" y="connsiteY27"/>
+              </a:cxn>
+              <a:cxn ang="0">
+                <a:pos x="connsiteX28" y="connsiteY28"/>
+              </a:cxn>
+              <a:cxn ang="0">
+                <a:pos x="connsiteX29" y="connsiteY29"/>
+              </a:cxn>
+              <a:cxn ang="0">
+                <a:pos x="connsiteX30" y="connsiteY30"/>
+              </a:cxn>
+              <a:cxn ang="0">
+                <a:pos x="connsiteX31" y="connsiteY31"/>
+              </a:cxn>
+              <a:cxn ang="0">
+                <a:pos x="connsiteX32" y="connsiteY32"/>
+              </a:cxn>
+              <a:cxn ang="0">
+                <a:pos x="connsiteX33" y="connsiteY33"/>
+              </a:cxn>
+            </a:cxnLst>
+            <a:rect l="l" t="t" r="r" b="b"/>
+            <a:pathLst>
+              <a:path w="4015594" h="2285550">
+                <a:moveTo>
+                  <a:pt x="681898" y="2281741"/>
+                </a:moveTo>
+                <a:cubicBezTo>
+                  <a:pt x="730051" y="2284365"/>
+                  <a:pt x="870545" y="2285551"/>
+                  <a:pt x="870545" y="2285551"/>
+                </a:cubicBezTo>
+                <a:lnTo>
+                  <a:pt x="3444286" y="2285551"/>
+                </a:lnTo>
+                <a:cubicBezTo>
+                  <a:pt x="3761064" y="2284298"/>
+                  <a:pt x="4016848" y="2026480"/>
+                  <a:pt x="4015591" y="1709703"/>
+                </a:cubicBezTo>
+                <a:cubicBezTo>
+                  <a:pt x="4014352" y="1396554"/>
+                  <a:pt x="3762178" y="1142275"/>
+                  <a:pt x="3449048" y="1138436"/>
+                </a:cubicBezTo>
+                <a:lnTo>
+                  <a:pt x="3401423" y="1138436"/>
+                </a:lnTo>
+                <a:cubicBezTo>
+                  <a:pt x="3400980" y="907655"/>
+                  <a:pt x="3289266" y="691256"/>
+                  <a:pt x="3101386" y="557239"/>
+                </a:cubicBezTo>
+                <a:cubicBezTo>
+                  <a:pt x="2911034" y="424056"/>
+                  <a:pt x="2668303" y="390395"/>
+                  <a:pt x="2448890" y="466752"/>
+                </a:cubicBezTo>
+                <a:cubicBezTo>
+                  <a:pt x="2233454" y="45533"/>
+                  <a:pt x="1717337" y="-121288"/>
+                  <a:pt x="1296117" y="94148"/>
+                </a:cubicBezTo>
+                <a:cubicBezTo>
+                  <a:pt x="1011091" y="239928"/>
+                  <a:pt x="831140" y="532470"/>
+                  <a:pt x="829559" y="852610"/>
+                </a:cubicBezTo>
+                <a:lnTo>
+                  <a:pt x="829559" y="862135"/>
+                </a:lnTo>
+                <a:cubicBezTo>
+                  <a:pt x="792192" y="856020"/>
+                  <a:pt x="754397" y="852943"/>
+                  <a:pt x="716535" y="852929"/>
+                </a:cubicBezTo>
+                <a:cubicBezTo>
+                  <a:pt x="321262" y="852472"/>
+                  <a:pt x="460" y="1172531"/>
+                  <a:pt x="0" y="1567799"/>
+                </a:cubicBezTo>
+                <a:cubicBezTo>
+                  <a:pt x="-121" y="1672950"/>
+                  <a:pt x="22927" y="1776835"/>
+                  <a:pt x="67507" y="1872066"/>
+                </a:cubicBezTo>
+                <a:cubicBezTo>
+                  <a:pt x="183202" y="2109633"/>
+                  <a:pt x="418107" y="2266272"/>
+                  <a:pt x="681898" y="2281741"/>
+                </a:cubicBezTo>
+                <a:close/>
+                <a:moveTo>
+                  <a:pt x="219826" y="1195710"/>
+                </a:moveTo>
+                <a:cubicBezTo>
+                  <a:pt x="338650" y="1041376"/>
+                  <a:pt x="521740" y="950122"/>
+                  <a:pt x="716507" y="948169"/>
+                </a:cubicBezTo>
+                <a:cubicBezTo>
+                  <a:pt x="749211" y="948198"/>
+                  <a:pt x="781858" y="950855"/>
+                  <a:pt x="814138" y="956118"/>
+                </a:cubicBezTo>
+                <a:lnTo>
+                  <a:pt x="924776" y="974215"/>
+                </a:lnTo>
+                <a:lnTo>
+                  <a:pt x="924776" y="852591"/>
+                </a:lnTo>
+                <a:cubicBezTo>
+                  <a:pt x="927362" y="432019"/>
+                  <a:pt x="1270400" y="93181"/>
+                  <a:pt x="1690971" y="95767"/>
+                </a:cubicBezTo>
+                <a:cubicBezTo>
+                  <a:pt x="1975112" y="97515"/>
+                  <a:pt x="2234644" y="257311"/>
+                  <a:pt x="2364137" y="510238"/>
+                </a:cubicBezTo>
+                <a:lnTo>
+                  <a:pt x="2401960" y="583909"/>
+                </a:lnTo>
+                <a:lnTo>
+                  <a:pt x="2480170" y="556701"/>
+                </a:lnTo>
+                <a:cubicBezTo>
+                  <a:pt x="2801539" y="441806"/>
+                  <a:pt x="3155197" y="609179"/>
+                  <a:pt x="3270097" y="930548"/>
+                </a:cubicBezTo>
+                <a:cubicBezTo>
+                  <a:pt x="3293948" y="997261"/>
+                  <a:pt x="3306149" y="1067584"/>
+                  <a:pt x="3306169" y="1138436"/>
+                </a:cubicBezTo>
+                <a:lnTo>
+                  <a:pt x="3306169" y="1233686"/>
+                </a:lnTo>
+                <a:lnTo>
+                  <a:pt x="3449044" y="1233686"/>
+                </a:lnTo>
+                <a:cubicBezTo>
+                  <a:pt x="3713191" y="1237572"/>
+                  <a:pt x="3924179" y="1454856"/>
+                  <a:pt x="3920293" y="1719004"/>
+                </a:cubicBezTo>
+                <a:cubicBezTo>
+                  <a:pt x="3916459" y="1979527"/>
+                  <a:pt x="3704833" y="2189062"/>
+                  <a:pt x="3444286" y="2190301"/>
+                </a:cubicBezTo>
+                <a:lnTo>
+                  <a:pt x="771947" y="2190301"/>
+                </a:lnTo>
+                <a:lnTo>
+                  <a:pt x="687070" y="2186629"/>
+                </a:lnTo>
+                <a:cubicBezTo>
+                  <a:pt x="345651" y="2171908"/>
+                  <a:pt x="80810" y="1883200"/>
+                  <a:pt x="95530" y="1541782"/>
+                </a:cubicBezTo>
+                <a:cubicBezTo>
+                  <a:pt x="100932" y="1416495"/>
+                  <a:pt x="144273" y="1295808"/>
+                  <a:pt x="219811" y="1195710"/>
+                </a:cubicBezTo>
+                <a:close/>
+              </a:path>
+            </a:pathLst>
+          </a:custGeom>
+          <a:noFill/>
+          <a:ln w="6350" cap="flat">
+            <a:solidFill>
+              <a:schemeClr val="bg2">
+                <a:lumMod val="75000"/>
+              </a:schemeClr>
+            </a:solidFill>
+            <a:prstDash val="solid"/>
+            <a:miter/>
+          </a:ln>
+        </p:spPr>
+        <p:txBody>
+          <a:bodyPr rtlCol="0" anchor="ctr"/>
+          <a:lstStyle/>
+          <a:p>
+            <a:pPr algn="ctr"/>
+            <a:r>
+              <a:rPr lang="en-CA" sz="1013" dirty="0"/>
+              <a:t>Cloud owlcms</a:t>
+            </a:r>
+          </a:p>
+        </p:txBody>
+      </p:sp>
+      <p:cxnSp>
+        <p:nvCxnSpPr>
+          <p:cNvPr id="19" name="Straight Arrow Connector 18">
+            <a:extLst>
+              <a:ext uri="{FF2B5EF4-FFF2-40B4-BE49-F238E27FC236}">
+                <a16:creationId xmlns:a16="http://schemas.microsoft.com/office/drawing/2014/main" id="{B5FD6CAC-8B5B-3FAE-CB5B-4B99C67926A5}"/>
+              </a:ext>
+            </a:extLst>
+          </p:cNvPr>
+          <p:cNvCxnSpPr>
+            <a:cxnSpLocks/>
+          </p:cNvCxnSpPr>
+          <p:nvPr/>
+        </p:nvCxnSpPr>
+        <p:spPr>
+          <a:xfrm flipH="1">
+            <a:off x="3320988" y="1987367"/>
+            <a:ext cx="612068" cy="0"/>
+          </a:xfrm>
+          <a:prstGeom prst="straightConnector1">
+            <a:avLst/>
+          </a:prstGeom>
+          <a:ln w="12700">
+            <a:solidFill>
+              <a:schemeClr val="tx1"/>
+            </a:solidFill>
+            <a:headEnd type="triangle"/>
+            <a:tailEnd type="triangle"/>
+          </a:ln>
+        </p:spPr>
+        <p:style>
+          <a:lnRef idx="1">
+            <a:schemeClr val="accent1"/>
+          </a:lnRef>
+          <a:fillRef idx="0">
+            <a:schemeClr val="accent1"/>
+          </a:fillRef>
+          <a:effectRef idx="0">
+            <a:schemeClr val="accent1"/>
+          </a:effectRef>
+          <a:fontRef idx="minor">
+            <a:schemeClr val="tx1"/>
+          </a:fontRef>
+        </p:style>
+      </p:cxnSp>
+    </p:spTree>
+    <p:extLst>
+      <p:ext uri="{BB962C8B-B14F-4D97-AF65-F5344CB8AC3E}">
+        <p14:creationId xmlns:p14="http://schemas.microsoft.com/office/powerpoint/2010/main" val="2251531255"/>
+      </p:ext>
+    </p:extLst>
+  </p:cSld>
+  <p:clrMapOvr>
+    <a:masterClrMapping/>
+  </p:clrMapOvr>
+</p:sld>
+</file>
+
+<file path=ppt/slides/slide11.xml><?xml version="1.0" encoding="utf-8"?>
+<p:sld xmlns:a="http://schemas.openxmlformats.org/drawingml/2006/main" xmlns:r="http://schemas.openxmlformats.org/officeDocument/2006/relationships" xmlns:p="http://schemas.openxmlformats.org/presentationml/2006/main">
+  <p:cSld>
+    <p:spTree>
+      <p:nvGrpSpPr>
+        <p:cNvPr id="1" name=""/>
+        <p:cNvGrpSpPr/>
+        <p:nvPr/>
+      </p:nvGrpSpPr>
+      <p:grpSpPr>
+        <a:xfrm>
+          <a:off x="0" y="0"/>
+          <a:ext cx="0" cy="0"/>
+          <a:chOff x="0" y="0"/>
+          <a:chExt cx="0" cy="0"/>
+        </a:xfrm>
+      </p:grpSpPr>
+      <p:cxnSp>
+        <p:nvCxnSpPr>
+          <p:cNvPr id="386" name="Connector: Elbow 385">
+            <a:extLst>
+              <a:ext uri="{FF2B5EF4-FFF2-40B4-BE49-F238E27FC236}">
+                <a16:creationId xmlns:a16="http://schemas.microsoft.com/office/drawing/2014/main" id="{B9268D69-00FB-E4C8-1218-14CB2BF516D2}"/>
+              </a:ext>
+            </a:extLst>
+          </p:cNvPr>
+          <p:cNvCxnSpPr>
+            <a:cxnSpLocks/>
+            <a:stCxn id="2" idx="2"/>
+          </p:cNvCxnSpPr>
+          <p:nvPr/>
+        </p:nvCxnSpPr>
+        <p:spPr>
+          <a:xfrm flipH="1" flipV="1">
+            <a:off x="2277748" y="1576633"/>
+            <a:ext cx="20379" cy="932675"/>
+          </a:xfrm>
+          <a:prstGeom prst="bentConnector4">
+            <a:avLst>
+              <a:gd name="adj1" fmla="val -1433883"/>
+              <a:gd name="adj2" fmla="val 100345"/>
+            </a:avLst>
+          </a:prstGeom>
+          <a:ln w="12700">
+            <a:headEnd type="triangle" w="med" len="med"/>
+            <a:tailEnd type="triangle" w="med" len="med"/>
+          </a:ln>
+        </p:spPr>
+        <p:style>
+          <a:lnRef idx="1">
+            <a:schemeClr val="accent1"/>
+          </a:lnRef>
+          <a:fillRef idx="0">
+            <a:schemeClr val="accent1"/>
+          </a:fillRef>
+          <a:effectRef idx="0">
+            <a:schemeClr val="accent1"/>
+          </a:effectRef>
+          <a:fontRef idx="minor">
+            <a:schemeClr val="tx1"/>
+          </a:fontRef>
+        </p:style>
+      </p:cxnSp>
+      <p:sp>
+        <p:nvSpPr>
+          <p:cNvPr id="18" name="TextBox 17">
+            <a:extLst>
+              <a:ext uri="{FF2B5EF4-FFF2-40B4-BE49-F238E27FC236}">
+                <a16:creationId xmlns:a16="http://schemas.microsoft.com/office/drawing/2014/main" id="{E2C70ECE-016A-9A22-AD05-903DFA223D4B}"/>
+              </a:ext>
+            </a:extLst>
+          </p:cNvPr>
+          <p:cNvSpPr txBox="1"/>
+          <p:nvPr/>
+        </p:nvSpPr>
+        <p:spPr>
+          <a:xfrm>
+            <a:off x="1574780" y="2670173"/>
+            <a:ext cx="939371" cy="317651"/>
+          </a:xfrm>
+          <a:prstGeom prst="rect">
+            <a:avLst/>
+          </a:prstGeom>
+          <a:noFill/>
+        </p:spPr>
+        <p:txBody>
+          <a:bodyPr wrap="square" rtlCol="0">
+            <a:spAutoFit/>
+          </a:bodyPr>
+          <a:lstStyle/>
+          <a:p>
+            <a:pPr algn="ctr">
+              <a:lnSpc>
+                <a:spcPct val="70000"/>
+              </a:lnSpc>
+            </a:pPr>
+            <a:r>
+              <a:rPr lang="en-CA" sz="1013" noProof="1"/>
+              <a:t>Warmup</a:t>
+            </a:r>
+            <a:br>
+              <a:rPr lang="en-CA" sz="1013" noProof="1"/>
+            </a:br>
+            <a:r>
+              <a:rPr lang="en-CA" sz="1013" noProof="1"/>
+              <a:t>Scoreboard</a:t>
+            </a:r>
+          </a:p>
+        </p:txBody>
+      </p:sp>
+      <p:pic>
+        <p:nvPicPr>
+          <p:cNvPr id="2" name="Graphic 1" descr="Smart Phone">
+            <a:extLst>
+              <a:ext uri="{FF2B5EF4-FFF2-40B4-BE49-F238E27FC236}">
+                <a16:creationId xmlns:a16="http://schemas.microsoft.com/office/drawing/2014/main" id="{DE1EFAD3-AAC4-6993-9E82-C66AE21697B4}"/>
+              </a:ext>
+            </a:extLst>
+          </p:cNvPr>
+          <p:cNvPicPr>
+            <a:picLocks noChangeAspect="1"/>
+          </p:cNvPicPr>
+          <p:nvPr/>
+        </p:nvPicPr>
+        <p:blipFill>
+          <a:blip r:embed="rId2">
+            <a:extLst>
+              <a:ext uri="{28A0092B-C50C-407E-A947-70E740481C1C}">
+                <a14:useLocalDpi xmlns:a14="http://schemas.microsoft.com/office/drawing/2010/main" val="0"/>
+              </a:ext>
+              <a:ext uri="{96DAC541-7B7A-43D3-8B79-37D633B846F1}">
+                <asvg:svgBlip xmlns:asvg="http://schemas.microsoft.com/office/drawing/2016/SVG/main" r:embed="rId3"/>
+              </a:ext>
+            </a:extLst>
+          </a:blip>
+          <a:stretch>
+            <a:fillRect/>
+          </a:stretch>
+        </p:blipFill>
+        <p:spPr>
+          <a:xfrm rot="16200000">
+            <a:off x="1755762" y="2238126"/>
+            <a:ext cx="542365" cy="542365"/>
+          </a:xfrm>
+          <a:prstGeom prst="rect">
+            <a:avLst/>
+          </a:prstGeom>
+        </p:spPr>
+      </p:pic>
+      <p:pic>
+        <p:nvPicPr>
+          <p:cNvPr id="4" name="Graphic 3" descr="Laptop">
+            <a:extLst>
+              <a:ext uri="{FF2B5EF4-FFF2-40B4-BE49-F238E27FC236}">
+                <a16:creationId xmlns:a16="http://schemas.microsoft.com/office/drawing/2014/main" id="{71177BFE-FADE-7C18-D6B3-3E3B81E8BD87}"/>
+              </a:ext>
+            </a:extLst>
+          </p:cNvPr>
+          <p:cNvPicPr>
+            <a:picLocks noChangeAspect="1"/>
+          </p:cNvPicPr>
+          <p:nvPr/>
+        </p:nvPicPr>
+        <p:blipFill>
+          <a:blip r:embed="rId4">
+            <a:extLst>
+              <a:ext uri="{28A0092B-C50C-407E-A947-70E740481C1C}">
+                <a14:useLocalDpi xmlns:a14="http://schemas.microsoft.com/office/drawing/2010/main" val="0"/>
+              </a:ext>
+              <a:ext uri="{96DAC541-7B7A-43D3-8B79-37D633B846F1}">
+                <asvg:svgBlip xmlns:asvg="http://schemas.microsoft.com/office/drawing/2016/SVG/main" r:embed="rId5"/>
+              </a:ext>
+            </a:extLst>
+          </a:blip>
+          <a:stretch>
+            <a:fillRect/>
+          </a:stretch>
+        </p:blipFill>
+        <p:spPr>
+          <a:xfrm>
+            <a:off x="1807151" y="1331640"/>
+            <a:ext cx="514350" cy="514350"/>
+          </a:xfrm>
+          <a:prstGeom prst="rect">
+            <a:avLst/>
+          </a:prstGeom>
+        </p:spPr>
+      </p:pic>
+      <p:pic>
+        <p:nvPicPr>
+          <p:cNvPr id="5" name="Graphic 4" descr="Monitor with solid fill">
+            <a:extLst>
+              <a:ext uri="{FF2B5EF4-FFF2-40B4-BE49-F238E27FC236}">
+                <a16:creationId xmlns:a16="http://schemas.microsoft.com/office/drawing/2014/main" id="{AE175444-22F3-196E-4B37-EA5DDDA72AC5}"/>
+              </a:ext>
+            </a:extLst>
+          </p:cNvPr>
+          <p:cNvPicPr>
+            <a:picLocks noChangeAspect="1"/>
+          </p:cNvPicPr>
+          <p:nvPr/>
+        </p:nvPicPr>
+        <p:blipFill>
+          <a:blip r:embed="rId6">
+            <a:extLst>
+              <a:ext uri="{28A0092B-C50C-407E-A947-70E740481C1C}">
+                <a14:useLocalDpi xmlns:a14="http://schemas.microsoft.com/office/drawing/2010/main" val="0"/>
+              </a:ext>
+              <a:ext uri="{96DAC541-7B7A-43D3-8B79-37D633B846F1}">
+                <asvg:svgBlip xmlns:asvg="http://schemas.microsoft.com/office/drawing/2016/SVG/main" r:embed="rId7"/>
+              </a:ext>
+            </a:extLst>
+          </a:blip>
+          <a:stretch>
+            <a:fillRect/>
+          </a:stretch>
+        </p:blipFill>
+        <p:spPr>
+          <a:xfrm>
+            <a:off x="912510" y="1344301"/>
+            <a:ext cx="463422" cy="463422"/>
+          </a:xfrm>
+          <a:prstGeom prst="rect">
+            <a:avLst/>
+          </a:prstGeom>
+        </p:spPr>
+      </p:pic>
+      <p:sp>
+        <p:nvSpPr>
+          <p:cNvPr id="6" name="TextBox 5">
+            <a:extLst>
+              <a:ext uri="{FF2B5EF4-FFF2-40B4-BE49-F238E27FC236}">
+                <a16:creationId xmlns:a16="http://schemas.microsoft.com/office/drawing/2014/main" id="{7D925E54-90ED-D446-2418-B7072DA4D662}"/>
+              </a:ext>
+            </a:extLst>
+          </p:cNvPr>
+          <p:cNvSpPr txBox="1"/>
+          <p:nvPr/>
+        </p:nvSpPr>
+        <p:spPr>
+          <a:xfrm>
+            <a:off x="693219" y="1637597"/>
+            <a:ext cx="939371" cy="426784"/>
+          </a:xfrm>
+          <a:prstGeom prst="rect">
+            <a:avLst/>
+          </a:prstGeom>
+          <a:noFill/>
+        </p:spPr>
+        <p:txBody>
+          <a:bodyPr wrap="square" rtlCol="0">
+            <a:spAutoFit/>
+          </a:bodyPr>
+          <a:lstStyle/>
+          <a:p>
+            <a:pPr algn="ctr">
+              <a:lnSpc>
+                <a:spcPct val="70000"/>
+              </a:lnSpc>
+            </a:pPr>
+            <a:br>
+              <a:rPr lang="en-CA" sz="1013" noProof="1"/>
+            </a:br>
+            <a:r>
+              <a:rPr lang="en-CA" sz="1013" noProof="1"/>
+              <a:t>Attempt</a:t>
+            </a:r>
+          </a:p>
+          <a:p>
+            <a:pPr algn="ctr">
+              <a:lnSpc>
+                <a:spcPct val="70000"/>
+              </a:lnSpc>
+            </a:pPr>
+            <a:r>
+              <a:rPr lang="en-CA" sz="1013" noProof="1"/>
+              <a:t>Board TV</a:t>
+            </a:r>
+          </a:p>
+        </p:txBody>
+      </p:sp>
+      <p:cxnSp>
+        <p:nvCxnSpPr>
+          <p:cNvPr id="7" name="Straight Arrow Connector 6">
+            <a:extLst>
+              <a:ext uri="{FF2B5EF4-FFF2-40B4-BE49-F238E27FC236}">
+                <a16:creationId xmlns:a16="http://schemas.microsoft.com/office/drawing/2014/main" id="{5F8A012F-F060-BB79-EFB2-D3E1AA20B274}"/>
+              </a:ext>
+            </a:extLst>
+          </p:cNvPr>
+          <p:cNvCxnSpPr>
+            <a:endCxn id="5" idx="3"/>
+          </p:cNvCxnSpPr>
+          <p:nvPr/>
+        </p:nvCxnSpPr>
+        <p:spPr>
+          <a:xfrm flipH="1">
+            <a:off x="1375932" y="1572424"/>
+            <a:ext cx="465878" cy="3588"/>
+          </a:xfrm>
+          <a:prstGeom prst="straightConnector1">
+            <a:avLst/>
+          </a:prstGeom>
+          <a:ln w="25400">
+            <a:solidFill>
+              <a:schemeClr val="accent6">
+                <a:lumMod val="75000"/>
+              </a:schemeClr>
+            </a:solidFill>
+            <a:tailEnd type="triangle"/>
+          </a:ln>
+        </p:spPr>
+        <p:style>
+          <a:lnRef idx="1">
+            <a:schemeClr val="accent1"/>
+          </a:lnRef>
+          <a:fillRef idx="0">
+            <a:schemeClr val="accent1"/>
+          </a:fillRef>
+          <a:effectRef idx="0">
+            <a:schemeClr val="accent1"/>
+          </a:effectRef>
+          <a:fontRef idx="minor">
+            <a:schemeClr val="tx1"/>
+          </a:fontRef>
+        </p:style>
+      </p:cxnSp>
+      <p:sp>
+        <p:nvSpPr>
+          <p:cNvPr id="8" name="TextBox 7">
+            <a:extLst>
+              <a:ext uri="{FF2B5EF4-FFF2-40B4-BE49-F238E27FC236}">
+                <a16:creationId xmlns:a16="http://schemas.microsoft.com/office/drawing/2014/main" id="{6EC13A1A-770F-2040-2A63-DA1FC1FDC402}"/>
+              </a:ext>
+            </a:extLst>
+          </p:cNvPr>
+          <p:cNvSpPr txBox="1"/>
+          <p:nvPr/>
+        </p:nvSpPr>
+        <p:spPr>
+          <a:xfrm>
+            <a:off x="1376772" y="1435583"/>
+            <a:ext cx="425116" cy="184089"/>
+          </a:xfrm>
+          <a:prstGeom prst="rect">
+            <a:avLst/>
+          </a:prstGeom>
+          <a:noFill/>
+        </p:spPr>
+        <p:txBody>
+          <a:bodyPr wrap="none" rtlCol="0">
+            <a:spAutoFit/>
+          </a:bodyPr>
+          <a:lstStyle/>
+          <a:p>
+            <a:pPr algn="ctr">
+              <a:lnSpc>
+                <a:spcPct val="70000"/>
+              </a:lnSpc>
+            </a:pPr>
+            <a:r>
+              <a:rPr lang="en-CA" sz="800" noProof="1"/>
+              <a:t>HDMI</a:t>
+            </a:r>
+          </a:p>
+        </p:txBody>
+      </p:sp>
+      <p:pic>
+        <p:nvPicPr>
+          <p:cNvPr id="9" name="Picture 8">
+            <a:extLst>
+              <a:ext uri="{FF2B5EF4-FFF2-40B4-BE49-F238E27FC236}">
+                <a16:creationId xmlns:a16="http://schemas.microsoft.com/office/drawing/2014/main" id="{694A75B0-294B-B2FF-0D45-EB170E8CB7CC}"/>
+              </a:ext>
+            </a:extLst>
+          </p:cNvPr>
+          <p:cNvPicPr>
+            <a:picLocks noChangeAspect="1"/>
+          </p:cNvPicPr>
+          <p:nvPr/>
+        </p:nvPicPr>
+        <p:blipFill>
+          <a:blip r:embed="rId8">
+            <a:extLst>
+              <a:ext uri="{28A0092B-C50C-407E-A947-70E740481C1C}">
+                <a14:useLocalDpi xmlns:a14="http://schemas.microsoft.com/office/drawing/2010/main" val="0"/>
+              </a:ext>
+              <a:ext uri="{837473B0-CC2E-450A-ABE3-18F120FF3D39}">
+                <a1611:picAttrSrcUrl xmlns:a1611="http://schemas.microsoft.com/office/drawing/2016/11/main" r:id="rId9"/>
+              </a:ext>
+            </a:extLst>
+          </a:blip>
+          <a:stretch>
+            <a:fillRect/>
+          </a:stretch>
+        </p:blipFill>
+        <p:spPr>
+          <a:xfrm>
+            <a:off x="2370135" y="2355469"/>
+            <a:ext cx="182880" cy="134684"/>
+          </a:xfrm>
+          <a:prstGeom prst="rect">
+            <a:avLst/>
+          </a:prstGeom>
+        </p:spPr>
+      </p:pic>
+      <p:sp>
+        <p:nvSpPr>
+          <p:cNvPr id="10" name="TextBox 9">
+            <a:extLst>
+              <a:ext uri="{FF2B5EF4-FFF2-40B4-BE49-F238E27FC236}">
+                <a16:creationId xmlns:a16="http://schemas.microsoft.com/office/drawing/2014/main" id="{F1943B5A-58B3-2F68-F921-E070BF2485A2}"/>
+              </a:ext>
+            </a:extLst>
+          </p:cNvPr>
+          <p:cNvSpPr txBox="1"/>
+          <p:nvPr/>
+        </p:nvSpPr>
+        <p:spPr>
+          <a:xfrm>
+            <a:off x="1592796" y="1734069"/>
+            <a:ext cx="939371" cy="317651"/>
+          </a:xfrm>
+          <a:prstGeom prst="rect">
+            <a:avLst/>
+          </a:prstGeom>
+          <a:noFill/>
+        </p:spPr>
+        <p:txBody>
+          <a:bodyPr wrap="square" rtlCol="0">
+            <a:spAutoFit/>
+          </a:bodyPr>
+          <a:lstStyle/>
+          <a:p>
+            <a:pPr algn="ctr">
+              <a:lnSpc>
+                <a:spcPct val="70000"/>
+              </a:lnSpc>
+            </a:pPr>
+            <a:r>
+              <a:rPr lang="en-CA" sz="1013" noProof="1"/>
+              <a:t>Announcer</a:t>
+            </a:r>
+            <a:br>
+              <a:rPr lang="en-CA" sz="1013" noProof="1"/>
+            </a:br>
+            <a:r>
+              <a:rPr lang="en-CA" sz="1013" noProof="1"/>
+              <a:t>Timekeeper</a:t>
+            </a:r>
+          </a:p>
+        </p:txBody>
+      </p:sp>
+      <p:sp>
+        <p:nvSpPr>
+          <p:cNvPr id="14" name="TextBox 13">
+            <a:extLst>
+              <a:ext uri="{FF2B5EF4-FFF2-40B4-BE49-F238E27FC236}">
+                <a16:creationId xmlns:a16="http://schemas.microsoft.com/office/drawing/2014/main" id="{46F89D06-804C-721C-71C1-D9C84A42DFF4}"/>
+              </a:ext>
+            </a:extLst>
+          </p:cNvPr>
+          <p:cNvSpPr txBox="1"/>
+          <p:nvPr/>
+        </p:nvSpPr>
+        <p:spPr>
+          <a:xfrm>
+            <a:off x="2852936" y="2056984"/>
+            <a:ext cx="587592" cy="208519"/>
+          </a:xfrm>
+          <a:prstGeom prst="rect">
+            <a:avLst/>
+          </a:prstGeom>
+          <a:noFill/>
+        </p:spPr>
+        <p:txBody>
+          <a:bodyPr wrap="square" rtlCol="0">
+            <a:spAutoFit/>
+          </a:bodyPr>
+          <a:lstStyle/>
+          <a:p>
+            <a:pPr algn="ctr">
+              <a:lnSpc>
+                <a:spcPct val="70000"/>
+              </a:lnSpc>
+            </a:pPr>
+            <a:r>
+              <a:rPr lang="en-CA" sz="1013" noProof="1"/>
+              <a:t>Router</a:t>
+            </a:r>
+          </a:p>
+        </p:txBody>
+      </p:sp>
+      <p:cxnSp>
+        <p:nvCxnSpPr>
+          <p:cNvPr id="3" name="Straight Arrow Connector 2">
+            <a:extLst>
+              <a:ext uri="{FF2B5EF4-FFF2-40B4-BE49-F238E27FC236}">
+                <a16:creationId xmlns:a16="http://schemas.microsoft.com/office/drawing/2014/main" id="{CD2CC5BC-4F24-A06C-F7FC-E9158707B87D}"/>
+              </a:ext>
+            </a:extLst>
+          </p:cNvPr>
+          <p:cNvCxnSpPr>
+            <a:cxnSpLocks/>
+          </p:cNvCxnSpPr>
+          <p:nvPr/>
+        </p:nvCxnSpPr>
+        <p:spPr>
+          <a:xfrm flipH="1">
+            <a:off x="2591831" y="1987367"/>
+            <a:ext cx="320174" cy="0"/>
+          </a:xfrm>
+          <a:prstGeom prst="straightConnector1">
+            <a:avLst/>
+          </a:prstGeom>
+          <a:ln w="12700">
+            <a:solidFill>
+              <a:schemeClr val="tx1"/>
+            </a:solidFill>
+            <a:headEnd type="triangle"/>
+            <a:tailEnd type="triangle"/>
+          </a:ln>
+        </p:spPr>
+        <p:style>
+          <a:lnRef idx="1">
+            <a:schemeClr val="accent1"/>
+          </a:lnRef>
+          <a:fillRef idx="0">
+            <a:schemeClr val="accent1"/>
+          </a:fillRef>
+          <a:effectRef idx="0">
+            <a:schemeClr val="accent1"/>
+          </a:effectRef>
+          <a:fontRef idx="minor">
+            <a:schemeClr val="tx1"/>
+          </a:fontRef>
+        </p:style>
+      </p:cxnSp>
+      <p:pic>
+        <p:nvPicPr>
+          <p:cNvPr id="12" name="Graphic 11">
+            <a:extLst>
+              <a:ext uri="{FF2B5EF4-FFF2-40B4-BE49-F238E27FC236}">
+                <a16:creationId xmlns:a16="http://schemas.microsoft.com/office/drawing/2014/main" id="{C4367C66-B4EE-11B6-3D33-0B9732744A5A}"/>
+              </a:ext>
+            </a:extLst>
+          </p:cNvPr>
+          <p:cNvPicPr>
+            <a:picLocks noChangeAspect="1"/>
+          </p:cNvPicPr>
+          <p:nvPr/>
+        </p:nvPicPr>
+        <p:blipFill rotWithShape="1">
+          <a:blip r:embed="rId10">
+            <a:duotone>
+              <a:schemeClr val="accent1">
+                <a:shade val="45000"/>
+                <a:satMod val="135000"/>
+              </a:schemeClr>
+              <a:prstClr val="white"/>
+            </a:duotone>
+            <a:extLst>
+              <a:ext uri="{28A0092B-C50C-407E-A947-70E740481C1C}">
+                <a14:useLocalDpi xmlns:a14="http://schemas.microsoft.com/office/drawing/2010/main" val="0"/>
+              </a:ext>
+              <a:ext uri="{96DAC541-7B7A-43D3-8B79-37D633B846F1}">
+                <asvg:svgBlip xmlns:asvg="http://schemas.microsoft.com/office/drawing/2016/SVG/main" r:embed="rId11"/>
+              </a:ext>
+            </a:extLst>
+          </a:blip>
+          <a:srcRect t="19758" b="39178"/>
+          <a:stretch/>
+        </p:blipFill>
+        <p:spPr>
+          <a:xfrm>
+            <a:off x="2800759" y="1845990"/>
+            <a:ext cx="710946" cy="291944"/>
+          </a:xfrm>
+          <a:prstGeom prst="rect">
+            <a:avLst/>
+          </a:prstGeom>
+        </p:spPr>
+      </p:pic>
+    </p:spTree>
+    <p:extLst>
+      <p:ext uri="{BB962C8B-B14F-4D97-AF65-F5344CB8AC3E}">
+        <p14:creationId xmlns:p14="http://schemas.microsoft.com/office/powerpoint/2010/main" val="1642002740"/>
+      </p:ext>
+    </p:extLst>
+  </p:cSld>
+  <p:clrMapOvr>
+    <a:masterClrMapping/>
+  </p:clrMapOvr>
+</p:sld>
+</file>
+
+<file path=ppt/slides/slide12.xml><?xml version="1.0" encoding="utf-8"?>
+<p:sld xmlns:a="http://schemas.openxmlformats.org/drawingml/2006/main" xmlns:r="http://schemas.openxmlformats.org/officeDocument/2006/relationships" xmlns:p="http://schemas.openxmlformats.org/presentationml/2006/main">
+  <p:cSld>
+    <p:spTree>
+      <p:nvGrpSpPr>
+        <p:cNvPr id="1" name=""/>
+        <p:cNvGrpSpPr/>
+        <p:nvPr/>
+      </p:nvGrpSpPr>
+      <p:grpSpPr>
+        <a:xfrm>
+          <a:off x="0" y="0"/>
+          <a:ext cx="0" cy="0"/>
+          <a:chOff x="0" y="0"/>
+          <a:chExt cx="0" cy="0"/>
+        </a:xfrm>
+      </p:grpSpPr>
+      <p:cxnSp>
+        <p:nvCxnSpPr>
+          <p:cNvPr id="337" name="Straight Arrow Connector 336">
+            <a:extLst>
+              <a:ext uri="{FF2B5EF4-FFF2-40B4-BE49-F238E27FC236}">
+                <a16:creationId xmlns:a16="http://schemas.microsoft.com/office/drawing/2014/main" id="{1985680E-6AB2-BF60-CFEB-6ED7AB3E08BA}"/>
+              </a:ext>
+            </a:extLst>
+          </p:cNvPr>
+          <p:cNvCxnSpPr>
+            <a:cxnSpLocks/>
+          </p:cNvCxnSpPr>
+          <p:nvPr/>
+        </p:nvCxnSpPr>
+        <p:spPr>
+          <a:xfrm flipH="1">
+            <a:off x="2265985" y="2518643"/>
+            <a:ext cx="320174" cy="0"/>
+          </a:xfrm>
+          <a:prstGeom prst="straightConnector1">
+            <a:avLst/>
+          </a:prstGeom>
+          <a:ln w="12700">
+            <a:solidFill>
+              <a:schemeClr val="accent1"/>
+            </a:solidFill>
+            <a:headEnd type="none" w="med" len="med"/>
+            <a:tailEnd type="triangle" w="med" len="med"/>
+          </a:ln>
+        </p:spPr>
+        <p:style>
+          <a:lnRef idx="1">
+            <a:schemeClr val="accent1"/>
+          </a:lnRef>
+          <a:fillRef idx="0">
+            <a:schemeClr val="accent1"/>
+          </a:fillRef>
+          <a:effectRef idx="0">
+            <a:schemeClr val="accent1"/>
+          </a:effectRef>
+          <a:fontRef idx="minor">
+            <a:schemeClr val="tx1"/>
+          </a:fontRef>
+        </p:style>
+      </p:cxnSp>
+      <p:cxnSp>
+        <p:nvCxnSpPr>
+          <p:cNvPr id="386" name="Connector: Elbow 385">
+            <a:extLst>
+              <a:ext uri="{FF2B5EF4-FFF2-40B4-BE49-F238E27FC236}">
+                <a16:creationId xmlns:a16="http://schemas.microsoft.com/office/drawing/2014/main" id="{B9268D69-00FB-E4C8-1218-14CB2BF516D2}"/>
+              </a:ext>
+            </a:extLst>
+          </p:cNvPr>
+          <p:cNvCxnSpPr>
+            <a:cxnSpLocks/>
+            <a:stCxn id="94" idx="3"/>
+          </p:cNvCxnSpPr>
+          <p:nvPr/>
+        </p:nvCxnSpPr>
+        <p:spPr>
+          <a:xfrm flipV="1">
+            <a:off x="2177641" y="1576633"/>
+            <a:ext cx="100107" cy="1953033"/>
+          </a:xfrm>
+          <a:prstGeom prst="bentConnector3">
+            <a:avLst>
+              <a:gd name="adj1" fmla="val 401429"/>
+            </a:avLst>
+          </a:prstGeom>
+          <a:ln w="12700">
+            <a:headEnd type="triangle" w="med" len="med"/>
+            <a:tailEnd type="triangle" w="med" len="med"/>
+          </a:ln>
+        </p:spPr>
+        <p:style>
+          <a:lnRef idx="1">
+            <a:schemeClr val="accent1"/>
+          </a:lnRef>
+          <a:fillRef idx="0">
+            <a:schemeClr val="accent1"/>
+          </a:fillRef>
+          <a:effectRef idx="0">
+            <a:schemeClr val="accent1"/>
+          </a:effectRef>
+          <a:fontRef idx="minor">
+            <a:schemeClr val="tx1"/>
+          </a:fontRef>
+        </p:style>
+      </p:cxnSp>
+      <p:sp>
+        <p:nvSpPr>
+          <p:cNvPr id="18" name="TextBox 17">
+            <a:extLst>
+              <a:ext uri="{FF2B5EF4-FFF2-40B4-BE49-F238E27FC236}">
+                <a16:creationId xmlns:a16="http://schemas.microsoft.com/office/drawing/2014/main" id="{E2C70ECE-016A-9A22-AD05-903DFA223D4B}"/>
+              </a:ext>
+            </a:extLst>
+          </p:cNvPr>
+          <p:cNvSpPr txBox="1"/>
+          <p:nvPr/>
+        </p:nvSpPr>
+        <p:spPr>
+          <a:xfrm>
+            <a:off x="1574780" y="2670173"/>
+            <a:ext cx="939371" cy="317651"/>
+          </a:xfrm>
+          <a:prstGeom prst="rect">
+            <a:avLst/>
+          </a:prstGeom>
+          <a:noFill/>
+        </p:spPr>
+        <p:txBody>
+          <a:bodyPr wrap="square" rtlCol="0">
+            <a:spAutoFit/>
+          </a:bodyPr>
+          <a:lstStyle/>
+          <a:p>
+            <a:pPr algn="ctr">
+              <a:lnSpc>
+                <a:spcPct val="70000"/>
+              </a:lnSpc>
+            </a:pPr>
+            <a:r>
+              <a:rPr lang="en-CA" sz="1013" noProof="1"/>
+              <a:t>Warmup</a:t>
+            </a:r>
+            <a:br>
+              <a:rPr lang="en-CA" sz="1013" noProof="1"/>
+            </a:br>
+            <a:r>
+              <a:rPr lang="en-CA" sz="1013" noProof="1"/>
+              <a:t>Scoreboard</a:t>
+            </a:r>
+          </a:p>
+        </p:txBody>
+      </p:sp>
+      <p:pic>
+        <p:nvPicPr>
+          <p:cNvPr id="94" name="Graphic 93" descr="Smart Phone">
+            <a:extLst>
+              <a:ext uri="{FF2B5EF4-FFF2-40B4-BE49-F238E27FC236}">
+                <a16:creationId xmlns:a16="http://schemas.microsoft.com/office/drawing/2014/main" id="{7C77A85E-7AAA-8DAA-EC3F-67A83B132FDE}"/>
+              </a:ext>
+            </a:extLst>
+          </p:cNvPr>
+          <p:cNvPicPr>
+            <a:picLocks noChangeAspect="1"/>
+          </p:cNvPicPr>
+          <p:nvPr/>
+        </p:nvPicPr>
+        <p:blipFill>
+          <a:blip r:embed="rId2">
+            <a:extLst>
+              <a:ext uri="{28A0092B-C50C-407E-A947-70E740481C1C}">
+                <a14:useLocalDpi xmlns:a14="http://schemas.microsoft.com/office/drawing/2010/main" val="0"/>
+              </a:ext>
+              <a:ext uri="{96DAC541-7B7A-43D3-8B79-37D633B846F1}">
+                <asvg:svgBlip xmlns:asvg="http://schemas.microsoft.com/office/drawing/2016/SVG/main" r:embed="rId3"/>
+              </a:ext>
+            </a:extLst>
+          </a:blip>
+          <a:stretch>
+            <a:fillRect/>
+          </a:stretch>
+        </p:blipFill>
+        <p:spPr>
+          <a:xfrm>
+            <a:off x="1920466" y="3401078"/>
+            <a:ext cx="257175" cy="257175"/>
+          </a:xfrm>
+          <a:prstGeom prst="rect">
+            <a:avLst/>
+          </a:prstGeom>
+        </p:spPr>
+      </p:pic>
+      <p:pic>
+        <p:nvPicPr>
+          <p:cNvPr id="98" name="Graphic 97" descr="Smart Phone">
+            <a:extLst>
+              <a:ext uri="{FF2B5EF4-FFF2-40B4-BE49-F238E27FC236}">
+                <a16:creationId xmlns:a16="http://schemas.microsoft.com/office/drawing/2014/main" id="{C185BAE4-F4A2-B662-61BA-B911E5DF12DE}"/>
+              </a:ext>
+            </a:extLst>
+          </p:cNvPr>
+          <p:cNvPicPr>
+            <a:picLocks noChangeAspect="1"/>
+          </p:cNvPicPr>
+          <p:nvPr/>
+        </p:nvPicPr>
+        <p:blipFill>
+          <a:blip r:embed="rId2">
+            <a:extLst>
+              <a:ext uri="{28A0092B-C50C-407E-A947-70E740481C1C}">
+                <a14:useLocalDpi xmlns:a14="http://schemas.microsoft.com/office/drawing/2010/main" val="0"/>
+              </a:ext>
+              <a:ext uri="{96DAC541-7B7A-43D3-8B79-37D633B846F1}">
+                <asvg:svgBlip xmlns:asvg="http://schemas.microsoft.com/office/drawing/2016/SVG/main" r:embed="rId3"/>
+              </a:ext>
+            </a:extLst>
+          </a:blip>
+          <a:stretch>
+            <a:fillRect/>
+          </a:stretch>
+        </p:blipFill>
+        <p:spPr>
+          <a:xfrm>
+            <a:off x="1672722" y="3400763"/>
+            <a:ext cx="257175" cy="257175"/>
+          </a:xfrm>
+          <a:prstGeom prst="rect">
+            <a:avLst/>
+          </a:prstGeom>
+        </p:spPr>
+      </p:pic>
+      <p:pic>
+        <p:nvPicPr>
+          <p:cNvPr id="99" name="Graphic 98" descr="Smart Phone">
+            <a:extLst>
+              <a:ext uri="{FF2B5EF4-FFF2-40B4-BE49-F238E27FC236}">
+                <a16:creationId xmlns:a16="http://schemas.microsoft.com/office/drawing/2014/main" id="{371710D2-DDB3-16DC-BC2D-4ADDACCA58BE}"/>
+              </a:ext>
+            </a:extLst>
+          </p:cNvPr>
+          <p:cNvPicPr>
+            <a:picLocks noChangeAspect="1"/>
+          </p:cNvPicPr>
+          <p:nvPr/>
+        </p:nvPicPr>
+        <p:blipFill>
+          <a:blip r:embed="rId2">
+            <a:extLst>
+              <a:ext uri="{28A0092B-C50C-407E-A947-70E740481C1C}">
+                <a14:useLocalDpi xmlns:a14="http://schemas.microsoft.com/office/drawing/2010/main" val="0"/>
+              </a:ext>
+              <a:ext uri="{96DAC541-7B7A-43D3-8B79-37D633B846F1}">
+                <asvg:svgBlip xmlns:asvg="http://schemas.microsoft.com/office/drawing/2016/SVG/main" r:embed="rId3"/>
+              </a:ext>
+            </a:extLst>
+          </a:blip>
+          <a:stretch>
+            <a:fillRect/>
+          </a:stretch>
+        </p:blipFill>
+        <p:spPr>
+          <a:xfrm>
+            <a:off x="1424978" y="3400448"/>
+            <a:ext cx="257175" cy="257175"/>
+          </a:xfrm>
+          <a:prstGeom prst="rect">
+            <a:avLst/>
+          </a:prstGeom>
+        </p:spPr>
+      </p:pic>
+      <p:pic>
+        <p:nvPicPr>
+          <p:cNvPr id="109" name="Picture 108">
+            <a:extLst>
+              <a:ext uri="{FF2B5EF4-FFF2-40B4-BE49-F238E27FC236}">
+                <a16:creationId xmlns:a16="http://schemas.microsoft.com/office/drawing/2014/main" id="{0FECFE45-D370-6CD6-A81A-3660C17F1505}"/>
+              </a:ext>
+            </a:extLst>
+          </p:cNvPr>
+          <p:cNvPicPr>
+            <a:picLocks noChangeAspect="1"/>
+          </p:cNvPicPr>
+          <p:nvPr/>
+        </p:nvPicPr>
+        <p:blipFill>
+          <a:blip r:embed="rId4">
+            <a:extLst>
+              <a:ext uri="{28A0092B-C50C-407E-A947-70E740481C1C}">
+                <a14:useLocalDpi xmlns:a14="http://schemas.microsoft.com/office/drawing/2010/main" val="0"/>
+              </a:ext>
+              <a:ext uri="{837473B0-CC2E-450A-ABE3-18F120FF3D39}">
+                <a1611:picAttrSrcUrl xmlns:a1611="http://schemas.microsoft.com/office/drawing/2016/11/main" r:id="rId5"/>
+              </a:ext>
+            </a:extLst>
+          </a:blip>
+          <a:stretch>
+            <a:fillRect/>
+          </a:stretch>
+        </p:blipFill>
+        <p:spPr>
+          <a:xfrm>
+            <a:off x="2293566" y="3347672"/>
+            <a:ext cx="182880" cy="134684"/>
+          </a:xfrm>
+          <a:prstGeom prst="rect">
+            <a:avLst/>
+          </a:prstGeom>
+        </p:spPr>
+      </p:pic>
+      <p:sp>
+        <p:nvSpPr>
+          <p:cNvPr id="110" name="TextBox 109">
+            <a:extLst>
+              <a:ext uri="{FF2B5EF4-FFF2-40B4-BE49-F238E27FC236}">
+                <a16:creationId xmlns:a16="http://schemas.microsoft.com/office/drawing/2014/main" id="{8B3F18EF-195C-F030-D7F5-D1C95D7DFBFE}"/>
+              </a:ext>
+            </a:extLst>
+          </p:cNvPr>
+          <p:cNvSpPr txBox="1"/>
+          <p:nvPr/>
+        </p:nvSpPr>
+        <p:spPr>
+          <a:xfrm>
+            <a:off x="692696" y="3370834"/>
+            <a:ext cx="862685" cy="317651"/>
+          </a:xfrm>
+          <a:prstGeom prst="rect">
+            <a:avLst/>
+          </a:prstGeom>
+          <a:noFill/>
+        </p:spPr>
+        <p:txBody>
+          <a:bodyPr wrap="square" rtlCol="0">
+            <a:spAutoFit/>
+          </a:bodyPr>
+          <a:lstStyle/>
+          <a:p>
+            <a:pPr algn="ctr">
+              <a:lnSpc>
+                <a:spcPct val="70000"/>
+              </a:lnSpc>
+            </a:pPr>
+            <a:r>
+              <a:rPr lang="en-CA" sz="1013" noProof="1"/>
+              <a:t>Referee</a:t>
+            </a:r>
+            <a:br>
+              <a:rPr lang="en-CA" sz="1013" noProof="1"/>
+            </a:br>
+            <a:r>
+              <a:rPr lang="en-CA" sz="1013" noProof="1"/>
+              <a:t>phones</a:t>
+            </a:r>
+          </a:p>
+        </p:txBody>
+      </p:sp>
+      <p:pic>
+        <p:nvPicPr>
+          <p:cNvPr id="2" name="Graphic 1" descr="Smart Phone">
+            <a:extLst>
+              <a:ext uri="{FF2B5EF4-FFF2-40B4-BE49-F238E27FC236}">
+                <a16:creationId xmlns:a16="http://schemas.microsoft.com/office/drawing/2014/main" id="{DE1EFAD3-AAC4-6993-9E82-C66AE21697B4}"/>
+              </a:ext>
+            </a:extLst>
+          </p:cNvPr>
+          <p:cNvPicPr>
+            <a:picLocks noChangeAspect="1"/>
+          </p:cNvPicPr>
+          <p:nvPr/>
+        </p:nvPicPr>
+        <p:blipFill>
+          <a:blip r:embed="rId2">
+            <a:extLst>
+              <a:ext uri="{28A0092B-C50C-407E-A947-70E740481C1C}">
+                <a14:useLocalDpi xmlns:a14="http://schemas.microsoft.com/office/drawing/2010/main" val="0"/>
+              </a:ext>
+              <a:ext uri="{96DAC541-7B7A-43D3-8B79-37D633B846F1}">
+                <asvg:svgBlip xmlns:asvg="http://schemas.microsoft.com/office/drawing/2016/SVG/main" r:embed="rId3"/>
+              </a:ext>
+            </a:extLst>
+          </a:blip>
+          <a:stretch>
+            <a:fillRect/>
+          </a:stretch>
+        </p:blipFill>
+        <p:spPr>
+          <a:xfrm rot="16200000">
+            <a:off x="1755762" y="2238126"/>
+            <a:ext cx="542365" cy="542365"/>
+          </a:xfrm>
+          <a:prstGeom prst="rect">
+            <a:avLst/>
+          </a:prstGeom>
+        </p:spPr>
+      </p:pic>
+      <p:pic>
+        <p:nvPicPr>
+          <p:cNvPr id="4" name="Graphic 3" descr="Laptop">
+            <a:extLst>
+              <a:ext uri="{FF2B5EF4-FFF2-40B4-BE49-F238E27FC236}">
+                <a16:creationId xmlns:a16="http://schemas.microsoft.com/office/drawing/2014/main" id="{71177BFE-FADE-7C18-D6B3-3E3B81E8BD87}"/>
+              </a:ext>
+            </a:extLst>
+          </p:cNvPr>
+          <p:cNvPicPr>
+            <a:picLocks noChangeAspect="1"/>
+          </p:cNvPicPr>
+          <p:nvPr/>
+        </p:nvPicPr>
+        <p:blipFill>
+          <a:blip r:embed="rId6">
+            <a:extLst>
+              <a:ext uri="{28A0092B-C50C-407E-A947-70E740481C1C}">
+                <a14:useLocalDpi xmlns:a14="http://schemas.microsoft.com/office/drawing/2010/main" val="0"/>
+              </a:ext>
+              <a:ext uri="{96DAC541-7B7A-43D3-8B79-37D633B846F1}">
+                <asvg:svgBlip xmlns:asvg="http://schemas.microsoft.com/office/drawing/2016/SVG/main" r:embed="rId7"/>
+              </a:ext>
+            </a:extLst>
+          </a:blip>
+          <a:stretch>
+            <a:fillRect/>
+          </a:stretch>
+        </p:blipFill>
+        <p:spPr>
+          <a:xfrm>
+            <a:off x="1807151" y="1331640"/>
+            <a:ext cx="514350" cy="514350"/>
+          </a:xfrm>
+          <a:prstGeom prst="rect">
+            <a:avLst/>
+          </a:prstGeom>
+        </p:spPr>
+      </p:pic>
+      <p:pic>
+        <p:nvPicPr>
+          <p:cNvPr id="5" name="Graphic 4" descr="Monitor with solid fill">
+            <a:extLst>
+              <a:ext uri="{FF2B5EF4-FFF2-40B4-BE49-F238E27FC236}">
+                <a16:creationId xmlns:a16="http://schemas.microsoft.com/office/drawing/2014/main" id="{AE175444-22F3-196E-4B37-EA5DDDA72AC5}"/>
+              </a:ext>
+            </a:extLst>
+          </p:cNvPr>
+          <p:cNvPicPr>
+            <a:picLocks noChangeAspect="1"/>
+          </p:cNvPicPr>
+          <p:nvPr/>
+        </p:nvPicPr>
+        <p:blipFill>
+          <a:blip r:embed="rId8">
+            <a:extLst>
+              <a:ext uri="{28A0092B-C50C-407E-A947-70E740481C1C}">
+                <a14:useLocalDpi xmlns:a14="http://schemas.microsoft.com/office/drawing/2010/main" val="0"/>
+              </a:ext>
+              <a:ext uri="{96DAC541-7B7A-43D3-8B79-37D633B846F1}">
+                <asvg:svgBlip xmlns:asvg="http://schemas.microsoft.com/office/drawing/2016/SVG/main" r:embed="rId9"/>
+              </a:ext>
+            </a:extLst>
+          </a:blip>
+          <a:stretch>
+            <a:fillRect/>
+          </a:stretch>
+        </p:blipFill>
+        <p:spPr>
+          <a:xfrm>
+            <a:off x="912510" y="1344301"/>
+            <a:ext cx="463422" cy="463422"/>
+          </a:xfrm>
+          <a:prstGeom prst="rect">
+            <a:avLst/>
+          </a:prstGeom>
+        </p:spPr>
+      </p:pic>
+      <p:sp>
+        <p:nvSpPr>
+          <p:cNvPr id="6" name="TextBox 5">
+            <a:extLst>
+              <a:ext uri="{FF2B5EF4-FFF2-40B4-BE49-F238E27FC236}">
+                <a16:creationId xmlns:a16="http://schemas.microsoft.com/office/drawing/2014/main" id="{7D925E54-90ED-D446-2418-B7072DA4D662}"/>
+              </a:ext>
+            </a:extLst>
+          </p:cNvPr>
+          <p:cNvSpPr txBox="1"/>
+          <p:nvPr/>
+        </p:nvSpPr>
+        <p:spPr>
+          <a:xfrm>
+            <a:off x="693219" y="1637597"/>
+            <a:ext cx="939371" cy="426784"/>
+          </a:xfrm>
+          <a:prstGeom prst="rect">
+            <a:avLst/>
+          </a:prstGeom>
+          <a:noFill/>
+        </p:spPr>
+        <p:txBody>
+          <a:bodyPr wrap="square" rtlCol="0">
+            <a:spAutoFit/>
+          </a:bodyPr>
+          <a:lstStyle/>
+          <a:p>
+            <a:pPr algn="ctr">
+              <a:lnSpc>
+                <a:spcPct val="70000"/>
+              </a:lnSpc>
+            </a:pPr>
+            <a:br>
+              <a:rPr lang="en-CA" sz="1013" noProof="1"/>
+            </a:br>
+            <a:r>
+              <a:rPr lang="en-CA" sz="1013" noProof="1"/>
+              <a:t>Attempt</a:t>
+            </a:r>
+          </a:p>
+          <a:p>
+            <a:pPr algn="ctr">
+              <a:lnSpc>
+                <a:spcPct val="70000"/>
+              </a:lnSpc>
+            </a:pPr>
+            <a:r>
+              <a:rPr lang="en-CA" sz="1013" noProof="1"/>
+              <a:t>Board TV</a:t>
+            </a:r>
+          </a:p>
+        </p:txBody>
+      </p:sp>
+      <p:cxnSp>
+        <p:nvCxnSpPr>
+          <p:cNvPr id="7" name="Straight Arrow Connector 6">
+            <a:extLst>
+              <a:ext uri="{FF2B5EF4-FFF2-40B4-BE49-F238E27FC236}">
+                <a16:creationId xmlns:a16="http://schemas.microsoft.com/office/drawing/2014/main" id="{5F8A012F-F060-BB79-EFB2-D3E1AA20B274}"/>
+              </a:ext>
+            </a:extLst>
+          </p:cNvPr>
+          <p:cNvCxnSpPr>
+            <a:endCxn id="5" idx="3"/>
+          </p:cNvCxnSpPr>
+          <p:nvPr/>
+        </p:nvCxnSpPr>
+        <p:spPr>
+          <a:xfrm flipH="1">
+            <a:off x="1375932" y="1572424"/>
+            <a:ext cx="465878" cy="3588"/>
+          </a:xfrm>
+          <a:prstGeom prst="straightConnector1">
+            <a:avLst/>
+          </a:prstGeom>
+          <a:ln w="25400">
+            <a:solidFill>
+              <a:schemeClr val="accent6">
+                <a:lumMod val="75000"/>
+              </a:schemeClr>
+            </a:solidFill>
+            <a:tailEnd type="triangle"/>
+          </a:ln>
+        </p:spPr>
+        <p:style>
+          <a:lnRef idx="1">
+            <a:schemeClr val="accent1"/>
+          </a:lnRef>
+          <a:fillRef idx="0">
+            <a:schemeClr val="accent1"/>
+          </a:fillRef>
+          <a:effectRef idx="0">
+            <a:schemeClr val="accent1"/>
+          </a:effectRef>
+          <a:fontRef idx="minor">
+            <a:schemeClr val="tx1"/>
+          </a:fontRef>
+        </p:style>
+      </p:cxnSp>
+      <p:sp>
+        <p:nvSpPr>
+          <p:cNvPr id="8" name="TextBox 7">
+            <a:extLst>
+              <a:ext uri="{FF2B5EF4-FFF2-40B4-BE49-F238E27FC236}">
+                <a16:creationId xmlns:a16="http://schemas.microsoft.com/office/drawing/2014/main" id="{6EC13A1A-770F-2040-2A63-DA1FC1FDC402}"/>
+              </a:ext>
+            </a:extLst>
+          </p:cNvPr>
+          <p:cNvSpPr txBox="1"/>
+          <p:nvPr/>
+        </p:nvSpPr>
+        <p:spPr>
+          <a:xfrm>
             <a:off x="1450104" y="1408031"/>
             <a:ext cx="425116" cy="184089"/>
           </a:xfrm>
@@ -10105,7 +11713,7 @@
 </p:sld>
 </file>
 
-<file path=ppt/slides/slide11.xml><?xml version="1.0" encoding="utf-8"?>
+<file path=ppt/slides/slide13.xml><?xml version="1.0" encoding="utf-8"?>
 <p:sld xmlns:a="http://schemas.openxmlformats.org/drawingml/2006/main" xmlns:r="http://schemas.openxmlformats.org/officeDocument/2006/relationships" xmlns:p="http://schemas.openxmlformats.org/presentationml/2006/main">
   <p:cSld>
     <p:spTree>
@@ -40833,97 +42441,6 @@
           </a:prstGeom>
         </p:spPr>
       </p:pic>
-      <p:cxnSp>
-        <p:nvCxnSpPr>
-          <p:cNvPr id="337" name="Straight Arrow Connector 336">
-            <a:extLst>
-              <a:ext uri="{FF2B5EF4-FFF2-40B4-BE49-F238E27FC236}">
-                <a16:creationId xmlns:a16="http://schemas.microsoft.com/office/drawing/2014/main" id="{1985680E-6AB2-BF60-CFEB-6ED7AB3E08BA}"/>
-              </a:ext>
-            </a:extLst>
-          </p:cNvPr>
-          <p:cNvCxnSpPr>
-            <a:cxnSpLocks/>
-          </p:cNvCxnSpPr>
-          <p:nvPr/>
-        </p:nvCxnSpPr>
-        <p:spPr>
-          <a:xfrm flipH="1">
-            <a:off x="4048428" y="2800290"/>
-            <a:ext cx="320174" cy="0"/>
-          </a:xfrm>
-          <a:prstGeom prst="straightConnector1">
-            <a:avLst/>
-          </a:prstGeom>
-          <a:ln w="12700">
-            <a:solidFill>
-              <a:schemeClr val="accent1"/>
-            </a:solidFill>
-            <a:headEnd type="triangle"/>
-            <a:tailEnd type="triangle"/>
-          </a:ln>
-        </p:spPr>
-        <p:style>
-          <a:lnRef idx="1">
-            <a:schemeClr val="accent1"/>
-          </a:lnRef>
-          <a:fillRef idx="0">
-            <a:schemeClr val="accent1"/>
-          </a:fillRef>
-          <a:effectRef idx="0">
-            <a:schemeClr val="accent1"/>
-          </a:effectRef>
-          <a:fontRef idx="minor">
-            <a:schemeClr val="tx1"/>
-          </a:fontRef>
-        </p:style>
-      </p:cxnSp>
-      <p:cxnSp>
-        <p:nvCxnSpPr>
-          <p:cNvPr id="386" name="Connector: Elbow 385">
-            <a:extLst>
-              <a:ext uri="{FF2B5EF4-FFF2-40B4-BE49-F238E27FC236}">
-                <a16:creationId xmlns:a16="http://schemas.microsoft.com/office/drawing/2014/main" id="{B9268D69-00FB-E4C8-1218-14CB2BF516D2}"/>
-              </a:ext>
-            </a:extLst>
-          </p:cNvPr>
-          <p:cNvCxnSpPr>
-            <a:cxnSpLocks/>
-            <a:stCxn id="94" idx="3"/>
-            <a:endCxn id="68" idx="3"/>
-          </p:cNvCxnSpPr>
-          <p:nvPr/>
-        </p:nvCxnSpPr>
-        <p:spPr>
-          <a:xfrm flipV="1">
-            <a:off x="3992590" y="1924012"/>
-            <a:ext cx="100107" cy="1953033"/>
-          </a:xfrm>
-          <a:prstGeom prst="bentConnector3">
-            <a:avLst>
-              <a:gd name="adj1" fmla="val 401429"/>
-            </a:avLst>
-          </a:prstGeom>
-          <a:ln w="12700">
-            <a:headEnd type="triangle" w="med" len="med"/>
-            <a:tailEnd type="triangle" w="med" len="med"/>
-          </a:ln>
-        </p:spPr>
-        <p:style>
-          <a:lnRef idx="1">
-            <a:schemeClr val="accent1"/>
-          </a:lnRef>
-          <a:fillRef idx="0">
-            <a:schemeClr val="accent1"/>
-          </a:fillRef>
-          <a:effectRef idx="0">
-            <a:schemeClr val="accent1"/>
-          </a:effectRef>
-          <a:fontRef idx="minor">
-            <a:schemeClr val="tx1"/>
-          </a:fontRef>
-        </p:style>
-      </p:cxnSp>
       <p:sp>
         <p:nvSpPr>
           <p:cNvPr id="407" name="TextBox 406">
@@ -40958,15 +42475,19 @@
               </a:lnSpc>
             </a:pPr>
             <a:r>
-              <a:rPr lang="fr-CA" sz="1013" dirty="0" err="1"/>
-              <a:t>Competition</a:t>
+              <a:rPr lang="fr-CA" sz="1013" dirty="0"/>
+              <a:t>Gym</a:t>
             </a:r>
             <a:br>
               <a:rPr lang="fr-CA" sz="1013" dirty="0"/>
             </a:br>
             <a:r>
+              <a:rPr lang="fr-CA" sz="1013" dirty="0" err="1"/>
+              <a:t>WiFi</a:t>
+            </a:r>
+            <a:r>
               <a:rPr lang="fr-CA" sz="1013" dirty="0"/>
-              <a:t>Router</a:t>
+              <a:t> Router</a:t>
             </a:r>
           </a:p>
         </p:txBody>
@@ -41491,10 +43012,127 @@
           </a:p>
         </p:txBody>
       </p:sp>
+      <p:pic>
+        <p:nvPicPr>
+          <p:cNvPr id="2" name="Picture 1">
+            <a:extLst>
+              <a:ext uri="{FF2B5EF4-FFF2-40B4-BE49-F238E27FC236}">
+                <a16:creationId xmlns:a16="http://schemas.microsoft.com/office/drawing/2014/main" id="{491BA228-DABD-06ED-5557-4583E2A65B3C}"/>
+              </a:ext>
+            </a:extLst>
+          </p:cNvPr>
+          <p:cNvPicPr>
+            <a:picLocks noChangeAspect="1"/>
+          </p:cNvPicPr>
+          <p:nvPr/>
+        </p:nvPicPr>
+        <p:blipFill>
+          <a:blip r:embed="rId12">
+            <a:extLst>
+              <a:ext uri="{28A0092B-C50C-407E-A947-70E740481C1C}">
+                <a14:useLocalDpi xmlns:a14="http://schemas.microsoft.com/office/drawing/2010/main" val="0"/>
+              </a:ext>
+              <a:ext uri="{837473B0-CC2E-450A-ABE3-18F120FF3D39}">
+                <a1611:picAttrSrcUrl xmlns:a1611="http://schemas.microsoft.com/office/drawing/2016/11/main" r:id="rId13"/>
+              </a:ext>
+            </a:extLst>
+          </a:blip>
+          <a:stretch>
+            <a:fillRect/>
+          </a:stretch>
+        </p:blipFill>
+        <p:spPr>
+          <a:xfrm>
+            <a:off x="4590061" y="2885859"/>
+            <a:ext cx="182880" cy="134684"/>
+          </a:xfrm>
+          <a:prstGeom prst="rect">
+            <a:avLst/>
+          </a:prstGeom>
+        </p:spPr>
+      </p:pic>
+      <p:pic>
+        <p:nvPicPr>
+          <p:cNvPr id="3" name="Picture 2">
+            <a:extLst>
+              <a:ext uri="{FF2B5EF4-FFF2-40B4-BE49-F238E27FC236}">
+                <a16:creationId xmlns:a16="http://schemas.microsoft.com/office/drawing/2014/main" id="{B87257DC-2494-49C6-0BEE-082AB8EC1885}"/>
+              </a:ext>
+            </a:extLst>
+          </p:cNvPr>
+          <p:cNvPicPr>
+            <a:picLocks noChangeAspect="1"/>
+          </p:cNvPicPr>
+          <p:nvPr/>
+        </p:nvPicPr>
+        <p:blipFill>
+          <a:blip r:embed="rId12">
+            <a:extLst>
+              <a:ext uri="{28A0092B-C50C-407E-A947-70E740481C1C}">
+                <a14:useLocalDpi xmlns:a14="http://schemas.microsoft.com/office/drawing/2010/main" val="0"/>
+              </a:ext>
+              <a:ext uri="{837473B0-CC2E-450A-ABE3-18F120FF3D39}">
+                <a1611:picAttrSrcUrl xmlns:a1611="http://schemas.microsoft.com/office/drawing/2016/11/main" r:id="rId13"/>
+              </a:ext>
+            </a:extLst>
+          </a:blip>
+          <a:stretch>
+            <a:fillRect/>
+          </a:stretch>
+        </p:blipFill>
+        <p:spPr>
+          <a:xfrm>
+            <a:off x="4146220" y="2601112"/>
+            <a:ext cx="182880" cy="134684"/>
+          </a:xfrm>
+          <a:prstGeom prst="rect">
+            <a:avLst/>
+          </a:prstGeom>
+        </p:spPr>
+      </p:pic>
+      <p:pic>
+        <p:nvPicPr>
+          <p:cNvPr id="4" name="Picture 3">
+            <a:extLst>
+              <a:ext uri="{FF2B5EF4-FFF2-40B4-BE49-F238E27FC236}">
+                <a16:creationId xmlns:a16="http://schemas.microsoft.com/office/drawing/2014/main" id="{E5970DB3-E904-0811-D0B0-DDE44BA60D32}"/>
+              </a:ext>
+            </a:extLst>
+          </p:cNvPr>
+          <p:cNvPicPr>
+            <a:picLocks noChangeAspect="1"/>
+          </p:cNvPicPr>
+          <p:nvPr/>
+        </p:nvPicPr>
+        <p:blipFill>
+          <a:blip r:embed="rId12">
+            <a:extLst>
+              <a:ext uri="{28A0092B-C50C-407E-A947-70E740481C1C}">
+                <a14:useLocalDpi xmlns:a14="http://schemas.microsoft.com/office/drawing/2010/main" val="0"/>
+              </a:ext>
+              <a:ext uri="{837473B0-CC2E-450A-ABE3-18F120FF3D39}">
+                <a1611:picAttrSrcUrl xmlns:a1611="http://schemas.microsoft.com/office/drawing/2016/11/main" r:id="rId13"/>
+              </a:ext>
+            </a:extLst>
+          </a:blip>
+          <a:stretch>
+            <a:fillRect/>
+          </a:stretch>
+        </p:blipFill>
+        <p:spPr>
+          <a:xfrm>
+            <a:off x="4146220" y="1691680"/>
+            <a:ext cx="182880" cy="134684"/>
+          </a:xfrm>
+          <a:prstGeom prst="rect">
+            <a:avLst/>
+          </a:prstGeom>
+        </p:spPr>
+      </p:pic>
     </p:spTree>
     <p:extLst>
       <p:ext uri="{BB962C8B-B14F-4D97-AF65-F5344CB8AC3E}">
-        <p14:creationId xmlns:p14="http://schemas.microsoft.com/office/powerpoint/2010/main" val="2910309073"/>
+        <p14:creationId xmlns:p14="http://schemas.microsoft.com/office/powerpoint/2010/main" val="1426373849"/>
       </p:ext>
     </p:extLst>
   </p:cSld>
@@ -41521,52 +43159,85 @@
           <a:chExt cx="0" cy="0"/>
         </a:xfrm>
       </p:grpSpPr>
-      <p:cxnSp>
-        <p:nvCxnSpPr>
-          <p:cNvPr id="386" name="Connector: Elbow 385">
-            <a:extLst>
-              <a:ext uri="{FF2B5EF4-FFF2-40B4-BE49-F238E27FC236}">
-                <a16:creationId xmlns:a16="http://schemas.microsoft.com/office/drawing/2014/main" id="{B9268D69-00FB-E4C8-1218-14CB2BF516D2}"/>
-              </a:ext>
-            </a:extLst>
-          </p:cNvPr>
-          <p:cNvCxnSpPr>
-            <a:cxnSpLocks/>
-            <a:stCxn id="2" idx="2"/>
-          </p:cNvCxnSpPr>
-          <p:nvPr/>
-        </p:nvCxnSpPr>
-        <p:spPr>
-          <a:xfrm flipH="1" flipV="1">
-            <a:off x="2277748" y="1576633"/>
-            <a:ext cx="20379" cy="932675"/>
-          </a:xfrm>
-          <a:prstGeom prst="bentConnector4">
-            <a:avLst>
-              <a:gd name="adj1" fmla="val -1433883"/>
-              <a:gd name="adj2" fmla="val 100345"/>
-            </a:avLst>
-          </a:prstGeom>
-          <a:ln w="12700">
-            <a:headEnd type="triangle" w="med" len="med"/>
-            <a:tailEnd type="triangle" w="med" len="med"/>
-          </a:ln>
-        </p:spPr>
-        <p:style>
-          <a:lnRef idx="1">
-            <a:schemeClr val="accent1"/>
-          </a:lnRef>
-          <a:fillRef idx="0">
-            <a:schemeClr val="accent1"/>
-          </a:fillRef>
-          <a:effectRef idx="0">
-            <a:schemeClr val="accent1"/>
-          </a:effectRef>
-          <a:fontRef idx="minor">
-            <a:schemeClr val="tx1"/>
-          </a:fontRef>
-        </p:style>
-      </p:cxnSp>
+      <p:sp>
+        <p:nvSpPr>
+          <p:cNvPr id="72" name="TextBox 71">
+            <a:extLst>
+              <a:ext uri="{FF2B5EF4-FFF2-40B4-BE49-F238E27FC236}">
+                <a16:creationId xmlns:a16="http://schemas.microsoft.com/office/drawing/2014/main" id="{2203EEF7-8763-B761-8E52-FD53115C8BC4}"/>
+              </a:ext>
+            </a:extLst>
+          </p:cNvPr>
+          <p:cNvSpPr txBox="1"/>
+          <p:nvPr/>
+        </p:nvSpPr>
+        <p:spPr>
+          <a:xfrm>
+            <a:off x="3582792" y="2879178"/>
+            <a:ext cx="587020" cy="248209"/>
+          </a:xfrm>
+          <a:prstGeom prst="rect">
+            <a:avLst/>
+          </a:prstGeom>
+          <a:noFill/>
+        </p:spPr>
+        <p:txBody>
+          <a:bodyPr wrap="none" rtlCol="0">
+            <a:spAutoFit/>
+          </a:bodyPr>
+          <a:lstStyle/>
+          <a:p>
+            <a:pPr algn="ctr"/>
+            <a:r>
+              <a:rPr lang="fr-CA" sz="1013" dirty="0">
+                <a:solidFill>
+                  <a:schemeClr val="accent1"/>
+                </a:solidFill>
+              </a:rPr>
+              <a:t>owlcms</a:t>
+            </a:r>
+          </a:p>
+        </p:txBody>
+      </p:sp>
+      <p:pic>
+        <p:nvPicPr>
+          <p:cNvPr id="78" name="Graphic 77" descr="Laptop">
+            <a:extLst>
+              <a:ext uri="{FF2B5EF4-FFF2-40B4-BE49-F238E27FC236}">
+                <a16:creationId xmlns:a16="http://schemas.microsoft.com/office/drawing/2014/main" id="{4BF89AD2-596B-7C94-1344-0D34039A4EE0}"/>
+              </a:ext>
+            </a:extLst>
+          </p:cNvPr>
+          <p:cNvPicPr>
+            <a:picLocks noChangeAspect="1"/>
+          </p:cNvPicPr>
+          <p:nvPr/>
+        </p:nvPicPr>
+        <p:blipFill>
+          <a:blip r:embed="rId2">
+            <a:extLst>
+              <a:ext uri="{28A0092B-C50C-407E-A947-70E740481C1C}">
+                <a14:useLocalDpi xmlns:a14="http://schemas.microsoft.com/office/drawing/2010/main" val="0"/>
+              </a:ext>
+              <a:ext uri="{96DAC541-7B7A-43D3-8B79-37D633B846F1}">
+                <asvg:svgBlip xmlns:asvg="http://schemas.microsoft.com/office/drawing/2016/SVG/main" r:embed="rId3"/>
+              </a:ext>
+            </a:extLst>
+          </a:blip>
+          <a:stretch>
+            <a:fillRect/>
+          </a:stretch>
+        </p:blipFill>
+        <p:spPr>
+          <a:xfrm>
+            <a:off x="3606828" y="2543115"/>
+            <a:ext cx="514350" cy="514350"/>
+          </a:xfrm>
+          <a:prstGeom prst="rect">
+            <a:avLst/>
+          </a:prstGeom>
+        </p:spPr>
+      </p:pic>
       <p:sp>
         <p:nvSpPr>
           <p:cNvPr id="18" name="TextBox 17">
@@ -41581,8 +43252,8 @@
         </p:nvSpPr>
         <p:spPr>
           <a:xfrm>
-            <a:off x="1574780" y="2670173"/>
-            <a:ext cx="939371" cy="317651"/>
+            <a:off x="3392996" y="3023828"/>
+            <a:ext cx="939371" cy="426784"/>
           </a:xfrm>
           <a:prstGeom prst="rect">
             <a:avLst/>
@@ -41601,25 +43272,32 @@
               </a:lnSpc>
             </a:pPr>
             <a:r>
-              <a:rPr lang="en-CA" sz="1013" noProof="1"/>
-              <a:t>Warmup</a:t>
+              <a:rPr lang="fr-CA" sz="1013" dirty="0" err="1"/>
+              <a:t>Announcer</a:t>
             </a:r>
             <a:br>
-              <a:rPr lang="en-CA" sz="1013" noProof="1"/>
+              <a:rPr lang="fr-CA" sz="1013" dirty="0"/>
             </a:br>
             <a:r>
-              <a:rPr lang="en-CA" sz="1013" noProof="1"/>
-              <a:t>Scoreboard</a:t>
+              <a:rPr lang="fr-CA" sz="1013" dirty="0" err="1"/>
+              <a:t>Timekeeper</a:t>
+            </a:r>
+            <a:br>
+              <a:rPr lang="fr-CA" sz="1013" dirty="0"/>
+            </a:br>
+            <a:r>
+              <a:rPr lang="fr-CA" sz="1013" dirty="0"/>
+              <a:t>Marshal</a:t>
             </a:r>
           </a:p>
         </p:txBody>
       </p:sp>
       <p:pic>
         <p:nvPicPr>
-          <p:cNvPr id="2" name="Graphic 1" descr="Smart Phone">
-            <a:extLst>
-              <a:ext uri="{FF2B5EF4-FFF2-40B4-BE49-F238E27FC236}">
-                <a16:creationId xmlns:a16="http://schemas.microsoft.com/office/drawing/2014/main" id="{DE1EFAD3-AAC4-6993-9E82-C66AE21697B4}"/>
+          <p:cNvPr id="87" name="Graphic 86" descr="Monitor with solid fill">
+            <a:extLst>
+              <a:ext uri="{FF2B5EF4-FFF2-40B4-BE49-F238E27FC236}">
+                <a16:creationId xmlns:a16="http://schemas.microsoft.com/office/drawing/2014/main" id="{6ACA4A9E-0CD9-FF26-669D-2D0AE15C084F}"/>
               </a:ext>
             </a:extLst>
           </p:cNvPr>
@@ -41629,13 +43307,13 @@
           <p:nvPr/>
         </p:nvPicPr>
         <p:blipFill>
-          <a:blip r:embed="rId2">
+          <a:blip r:embed="rId4">
             <a:extLst>
               <a:ext uri="{28A0092B-C50C-407E-A947-70E740481C1C}">
                 <a14:useLocalDpi xmlns:a14="http://schemas.microsoft.com/office/drawing/2010/main" val="0"/>
               </a:ext>
               <a:ext uri="{96DAC541-7B7A-43D3-8B79-37D633B846F1}">
-                <asvg:svgBlip xmlns:asvg="http://schemas.microsoft.com/office/drawing/2016/SVG/main" r:embed="rId3"/>
+                <asvg:svgBlip xmlns:asvg="http://schemas.microsoft.com/office/drawing/2016/SVG/main" r:embed="rId5"/>
               </a:ext>
             </a:extLst>
           </a:blip>
@@ -41644,86 +43322,8 @@
           </a:stretch>
         </p:blipFill>
         <p:spPr>
-          <a:xfrm rot="16200000">
-            <a:off x="1755762" y="2238126"/>
-            <a:ext cx="542365" cy="542365"/>
-          </a:xfrm>
-          <a:prstGeom prst="rect">
-            <a:avLst/>
-          </a:prstGeom>
-        </p:spPr>
-      </p:pic>
-      <p:pic>
-        <p:nvPicPr>
-          <p:cNvPr id="4" name="Graphic 3" descr="Laptop">
-            <a:extLst>
-              <a:ext uri="{FF2B5EF4-FFF2-40B4-BE49-F238E27FC236}">
-                <a16:creationId xmlns:a16="http://schemas.microsoft.com/office/drawing/2014/main" id="{71177BFE-FADE-7C18-D6B3-3E3B81E8BD87}"/>
-              </a:ext>
-            </a:extLst>
-          </p:cNvPr>
-          <p:cNvPicPr>
-            <a:picLocks noChangeAspect="1"/>
-          </p:cNvPicPr>
-          <p:nvPr/>
-        </p:nvPicPr>
-        <p:blipFill>
-          <a:blip r:embed="rId4">
-            <a:extLst>
-              <a:ext uri="{28A0092B-C50C-407E-A947-70E740481C1C}">
-                <a14:useLocalDpi xmlns:a14="http://schemas.microsoft.com/office/drawing/2010/main" val="0"/>
-              </a:ext>
-              <a:ext uri="{96DAC541-7B7A-43D3-8B79-37D633B846F1}">
-                <asvg:svgBlip xmlns:asvg="http://schemas.microsoft.com/office/drawing/2016/SVG/main" r:embed="rId5"/>
-              </a:ext>
-            </a:extLst>
-          </a:blip>
-          <a:stretch>
-            <a:fillRect/>
-          </a:stretch>
-        </p:blipFill>
-        <p:spPr>
-          <a:xfrm>
-            <a:off x="1807151" y="1331640"/>
-            <a:ext cx="514350" cy="514350"/>
-          </a:xfrm>
-          <a:prstGeom prst="rect">
-            <a:avLst/>
-          </a:prstGeom>
-        </p:spPr>
-      </p:pic>
-      <p:pic>
-        <p:nvPicPr>
-          <p:cNvPr id="5" name="Graphic 4" descr="Monitor with solid fill">
-            <a:extLst>
-              <a:ext uri="{FF2B5EF4-FFF2-40B4-BE49-F238E27FC236}">
-                <a16:creationId xmlns:a16="http://schemas.microsoft.com/office/drawing/2014/main" id="{AE175444-22F3-196E-4B37-EA5DDDA72AC5}"/>
-              </a:ext>
-            </a:extLst>
-          </p:cNvPr>
-          <p:cNvPicPr>
-            <a:picLocks noChangeAspect="1"/>
-          </p:cNvPicPr>
-          <p:nvPr/>
-        </p:nvPicPr>
-        <p:blipFill>
-          <a:blip r:embed="rId6">
-            <a:extLst>
-              <a:ext uri="{28A0092B-C50C-407E-A947-70E740481C1C}">
-                <a14:useLocalDpi xmlns:a14="http://schemas.microsoft.com/office/drawing/2010/main" val="0"/>
-              </a:ext>
-              <a:ext uri="{96DAC541-7B7A-43D3-8B79-37D633B846F1}">
-                <asvg:svgBlip xmlns:asvg="http://schemas.microsoft.com/office/drawing/2016/SVG/main" r:embed="rId7"/>
-              </a:ext>
-            </a:extLst>
-          </a:blip>
-          <a:stretch>
-            <a:fillRect/>
-          </a:stretch>
-        </p:blipFill>
-        <p:spPr>
-          <a:xfrm>
-            <a:off x="912510" y="1344301"/>
+          <a:xfrm>
+            <a:off x="2712187" y="2555776"/>
             <a:ext cx="463422" cy="463422"/>
           </a:xfrm>
           <a:prstGeom prst="rect">
@@ -41733,10 +43333,10 @@
       </p:pic>
       <p:sp>
         <p:nvSpPr>
-          <p:cNvPr id="6" name="TextBox 5">
-            <a:extLst>
-              <a:ext uri="{FF2B5EF4-FFF2-40B4-BE49-F238E27FC236}">
-                <a16:creationId xmlns:a16="http://schemas.microsoft.com/office/drawing/2014/main" id="{7D925E54-90ED-D446-2418-B7072DA4D662}"/>
+          <p:cNvPr id="88" name="TextBox 87">
+            <a:extLst>
+              <a:ext uri="{FF2B5EF4-FFF2-40B4-BE49-F238E27FC236}">
+                <a16:creationId xmlns:a16="http://schemas.microsoft.com/office/drawing/2014/main" id="{5BBB9911-3114-A179-1134-162E24C1AD3A}"/>
               </a:ext>
             </a:extLst>
           </p:cNvPr>
@@ -41745,8 +43345,8 @@
         </p:nvSpPr>
         <p:spPr>
           <a:xfrm>
-            <a:off x="693219" y="1637597"/>
-            <a:ext cx="939371" cy="426784"/>
+            <a:off x="2456892" y="2849072"/>
+            <a:ext cx="939371" cy="317651"/>
           </a:xfrm>
           <a:prstGeom prst="rect">
             <a:avLst/>
@@ -41765,43 +43365,32 @@
               </a:lnSpc>
             </a:pPr>
             <a:br>
-              <a:rPr lang="en-CA" sz="1013" noProof="1"/>
+              <a:rPr lang="fr-CA" sz="1013" dirty="0"/>
             </a:br>
             <a:r>
-              <a:rPr lang="en-CA" sz="1013" noProof="1"/>
-              <a:t>Attempt</a:t>
-            </a:r>
-          </a:p>
-          <a:p>
-            <a:pPr algn="ctr">
-              <a:lnSpc>
-                <a:spcPct val="70000"/>
-              </a:lnSpc>
-            </a:pPr>
-            <a:r>
-              <a:rPr lang="en-CA" sz="1013" noProof="1"/>
-              <a:t>Board TV</a:t>
+              <a:rPr lang="fr-CA" sz="1013" dirty="0"/>
+              <a:t>Scoreboard</a:t>
             </a:r>
           </a:p>
         </p:txBody>
       </p:sp>
       <p:cxnSp>
         <p:nvCxnSpPr>
-          <p:cNvPr id="7" name="Straight Arrow Connector 6">
-            <a:extLst>
-              <a:ext uri="{FF2B5EF4-FFF2-40B4-BE49-F238E27FC236}">
-                <a16:creationId xmlns:a16="http://schemas.microsoft.com/office/drawing/2014/main" id="{5F8A012F-F060-BB79-EFB2-D3E1AA20B274}"/>
+          <p:cNvPr id="91" name="Straight Arrow Connector 90">
+            <a:extLst>
+              <a:ext uri="{FF2B5EF4-FFF2-40B4-BE49-F238E27FC236}">
+                <a16:creationId xmlns:a16="http://schemas.microsoft.com/office/drawing/2014/main" id="{7B4A887B-52B4-A7A8-4678-09EAEEA5EDCF}"/>
               </a:ext>
             </a:extLst>
           </p:cNvPr>
           <p:cNvCxnSpPr>
-            <a:endCxn id="5" idx="3"/>
+            <a:endCxn id="87" idx="3"/>
           </p:cNvCxnSpPr>
           <p:nvPr/>
         </p:nvCxnSpPr>
         <p:spPr>
           <a:xfrm flipH="1">
-            <a:off x="1375932" y="1572424"/>
+            <a:off x="3175609" y="2783899"/>
             <a:ext cx="465878" cy="3588"/>
           </a:xfrm>
           <a:prstGeom prst="straightConnector1">
@@ -41833,10 +43422,10 @@
       </p:cxnSp>
       <p:sp>
         <p:nvSpPr>
-          <p:cNvPr id="8" name="TextBox 7">
-            <a:extLst>
-              <a:ext uri="{FF2B5EF4-FFF2-40B4-BE49-F238E27FC236}">
-                <a16:creationId xmlns:a16="http://schemas.microsoft.com/office/drawing/2014/main" id="{6EC13A1A-770F-2040-2A63-DA1FC1FDC402}"/>
+          <p:cNvPr id="93" name="TextBox 92">
+            <a:extLst>
+              <a:ext uri="{FF2B5EF4-FFF2-40B4-BE49-F238E27FC236}">
+                <a16:creationId xmlns:a16="http://schemas.microsoft.com/office/drawing/2014/main" id="{2F7B7D8D-39F5-1A4D-9DE3-F1C990EBED96}"/>
               </a:ext>
             </a:extLst>
           </p:cNvPr>
@@ -41845,7 +43434,7 @@
         </p:nvSpPr>
         <p:spPr>
           <a:xfrm>
-            <a:off x="1376772" y="1435583"/>
+            <a:off x="3249781" y="2619506"/>
             <a:ext cx="425116" cy="184089"/>
           </a:xfrm>
           <a:prstGeom prst="rect">
@@ -41865,646 +43454,16 @@
               </a:lnSpc>
             </a:pPr>
             <a:r>
-              <a:rPr lang="en-CA" sz="800" noProof="1"/>
+              <a:rPr lang="en-CA" sz="800" dirty="0"/>
               <a:t>HDMI</a:t>
             </a:r>
           </a:p>
         </p:txBody>
       </p:sp>
-      <p:pic>
-        <p:nvPicPr>
-          <p:cNvPr id="9" name="Picture 8">
-            <a:extLst>
-              <a:ext uri="{FF2B5EF4-FFF2-40B4-BE49-F238E27FC236}">
-                <a16:creationId xmlns:a16="http://schemas.microsoft.com/office/drawing/2014/main" id="{694A75B0-294B-B2FF-0D45-EB170E8CB7CC}"/>
-              </a:ext>
-            </a:extLst>
-          </p:cNvPr>
-          <p:cNvPicPr>
-            <a:picLocks noChangeAspect="1"/>
-          </p:cNvPicPr>
-          <p:nvPr/>
-        </p:nvPicPr>
-        <p:blipFill>
-          <a:blip r:embed="rId8">
-            <a:extLst>
-              <a:ext uri="{28A0092B-C50C-407E-A947-70E740481C1C}">
-                <a14:useLocalDpi xmlns:a14="http://schemas.microsoft.com/office/drawing/2010/main" val="0"/>
-              </a:ext>
-              <a:ext uri="{837473B0-CC2E-450A-ABE3-18F120FF3D39}">
-                <a1611:picAttrSrcUrl xmlns:a1611="http://schemas.microsoft.com/office/drawing/2016/11/main" r:id="rId9"/>
-              </a:ext>
-            </a:extLst>
-          </a:blip>
-          <a:stretch>
-            <a:fillRect/>
-          </a:stretch>
-        </p:blipFill>
-        <p:spPr>
-          <a:xfrm>
-            <a:off x="2370135" y="2355469"/>
-            <a:ext cx="182880" cy="134684"/>
-          </a:xfrm>
-          <a:prstGeom prst="rect">
-            <a:avLst/>
-          </a:prstGeom>
-        </p:spPr>
-      </p:pic>
-      <p:sp>
-        <p:nvSpPr>
-          <p:cNvPr id="10" name="TextBox 9">
-            <a:extLst>
-              <a:ext uri="{FF2B5EF4-FFF2-40B4-BE49-F238E27FC236}">
-                <a16:creationId xmlns:a16="http://schemas.microsoft.com/office/drawing/2014/main" id="{F1943B5A-58B3-2F68-F921-E070BF2485A2}"/>
-              </a:ext>
-            </a:extLst>
-          </p:cNvPr>
-          <p:cNvSpPr txBox="1"/>
-          <p:nvPr/>
-        </p:nvSpPr>
-        <p:spPr>
-          <a:xfrm>
-            <a:off x="1592796" y="1734069"/>
-            <a:ext cx="939371" cy="317651"/>
-          </a:xfrm>
-          <a:prstGeom prst="rect">
-            <a:avLst/>
-          </a:prstGeom>
-          <a:noFill/>
-        </p:spPr>
-        <p:txBody>
-          <a:bodyPr wrap="square" rtlCol="0">
-            <a:spAutoFit/>
-          </a:bodyPr>
-          <a:lstStyle/>
-          <a:p>
-            <a:pPr algn="ctr">
-              <a:lnSpc>
-                <a:spcPct val="70000"/>
-              </a:lnSpc>
-            </a:pPr>
-            <a:r>
-              <a:rPr lang="en-CA" sz="1013" noProof="1"/>
-              <a:t>Announcer</a:t>
-            </a:r>
-            <a:br>
-              <a:rPr lang="en-CA" sz="1013" noProof="1"/>
-            </a:br>
-            <a:r>
-              <a:rPr lang="en-CA" sz="1013" noProof="1"/>
-              <a:t>Timekeeper</a:t>
-            </a:r>
-          </a:p>
-        </p:txBody>
-      </p:sp>
-      <p:pic>
-        <p:nvPicPr>
-          <p:cNvPr id="11" name="Graphic 10">
-            <a:extLst>
-              <a:ext uri="{FF2B5EF4-FFF2-40B4-BE49-F238E27FC236}">
-                <a16:creationId xmlns:a16="http://schemas.microsoft.com/office/drawing/2014/main" id="{0546E365-B64A-A026-7ACB-866EA06EAEC9}"/>
-              </a:ext>
-            </a:extLst>
-          </p:cNvPr>
-          <p:cNvPicPr>
-            <a:picLocks noChangeAspect="1"/>
-          </p:cNvPicPr>
-          <p:nvPr/>
-        </p:nvPicPr>
-        <p:blipFill rotWithShape="1">
-          <a:blip r:embed="rId10">
-            <a:duotone>
-              <a:schemeClr val="bg2">
-                <a:shade val="45000"/>
-                <a:satMod val="135000"/>
-              </a:schemeClr>
-              <a:prstClr val="white"/>
-            </a:duotone>
-            <a:extLst>
-              <a:ext uri="{28A0092B-C50C-407E-A947-70E740481C1C}">
-                <a14:useLocalDpi xmlns:a14="http://schemas.microsoft.com/office/drawing/2010/main" val="0"/>
-              </a:ext>
-              <a:ext uri="{96DAC541-7B7A-43D3-8B79-37D633B846F1}">
-                <asvg:svgBlip xmlns:asvg="http://schemas.microsoft.com/office/drawing/2016/SVG/main" r:embed="rId11"/>
-              </a:ext>
-            </a:extLst>
-          </a:blip>
-          <a:srcRect t="19758" b="39178"/>
-          <a:stretch/>
-        </p:blipFill>
-        <p:spPr>
-          <a:xfrm>
-            <a:off x="2708920" y="1846315"/>
-            <a:ext cx="710946" cy="291944"/>
-          </a:xfrm>
-          <a:prstGeom prst="rect">
-            <a:avLst/>
-          </a:prstGeom>
-        </p:spPr>
-      </p:pic>
-      <p:cxnSp>
-        <p:nvCxnSpPr>
-          <p:cNvPr id="13" name="Straight Arrow Connector 12">
-            <a:extLst>
-              <a:ext uri="{FF2B5EF4-FFF2-40B4-BE49-F238E27FC236}">
-                <a16:creationId xmlns:a16="http://schemas.microsoft.com/office/drawing/2014/main" id="{7F835017-B675-DB19-08D2-C453064FC5BF}"/>
-              </a:ext>
-            </a:extLst>
-          </p:cNvPr>
-          <p:cNvCxnSpPr>
-            <a:cxnSpLocks/>
-          </p:cNvCxnSpPr>
-          <p:nvPr/>
-        </p:nvCxnSpPr>
-        <p:spPr>
-          <a:xfrm flipH="1">
-            <a:off x="2591831" y="1987367"/>
-            <a:ext cx="208928" cy="0"/>
-          </a:xfrm>
-          <a:prstGeom prst="straightConnector1">
-            <a:avLst/>
-          </a:prstGeom>
-          <a:ln w="12700">
-            <a:solidFill>
-              <a:schemeClr val="tx1"/>
-            </a:solidFill>
-            <a:headEnd type="triangle"/>
-            <a:tailEnd type="triangle"/>
-          </a:ln>
-        </p:spPr>
-        <p:style>
-          <a:lnRef idx="1">
-            <a:schemeClr val="accent1"/>
-          </a:lnRef>
-          <a:fillRef idx="0">
-            <a:schemeClr val="accent1"/>
-          </a:fillRef>
-          <a:effectRef idx="0">
-            <a:schemeClr val="accent1"/>
-          </a:effectRef>
-          <a:fontRef idx="minor">
-            <a:schemeClr val="tx1"/>
-          </a:fontRef>
-        </p:style>
-      </p:cxnSp>
-      <p:sp>
-        <p:nvSpPr>
-          <p:cNvPr id="14" name="TextBox 13">
-            <a:extLst>
-              <a:ext uri="{FF2B5EF4-FFF2-40B4-BE49-F238E27FC236}">
-                <a16:creationId xmlns:a16="http://schemas.microsoft.com/office/drawing/2014/main" id="{46F89D06-804C-721C-71C1-D9C84A42DFF4}"/>
-              </a:ext>
-            </a:extLst>
-          </p:cNvPr>
-          <p:cNvSpPr txBox="1"/>
-          <p:nvPr/>
-        </p:nvSpPr>
-        <p:spPr>
-          <a:xfrm>
-            <a:off x="2636912" y="2056984"/>
-            <a:ext cx="862685" cy="208519"/>
-          </a:xfrm>
-          <a:prstGeom prst="rect">
-            <a:avLst/>
-          </a:prstGeom>
-          <a:noFill/>
-        </p:spPr>
-        <p:txBody>
-          <a:bodyPr wrap="square" rtlCol="0">
-            <a:spAutoFit/>
-          </a:bodyPr>
-          <a:lstStyle/>
-          <a:p>
-            <a:pPr algn="ctr">
-              <a:lnSpc>
-                <a:spcPct val="70000"/>
-              </a:lnSpc>
-            </a:pPr>
-            <a:r>
-              <a:rPr lang="fr-CA" sz="1013" dirty="0"/>
-              <a:t>Router</a:t>
-            </a:r>
-          </a:p>
-        </p:txBody>
-      </p:sp>
-      <p:sp>
-        <p:nvSpPr>
-          <p:cNvPr id="16" name="Graphic 45" descr="Cloud">
-            <a:extLst>
-              <a:ext uri="{FF2B5EF4-FFF2-40B4-BE49-F238E27FC236}">
-                <a16:creationId xmlns:a16="http://schemas.microsoft.com/office/drawing/2014/main" id="{659E5067-CD5C-B602-8CE0-D56635098499}"/>
-              </a:ext>
-            </a:extLst>
-          </p:cNvPr>
-          <p:cNvSpPr/>
-          <p:nvPr/>
-        </p:nvSpPr>
-        <p:spPr>
-          <a:xfrm>
-            <a:off x="3870467" y="1676122"/>
-            <a:ext cx="862685" cy="514350"/>
-          </a:xfrm>
-          <a:custGeom>
-            <a:avLst/>
-            <a:gdLst>
-              <a:gd name="connsiteX0" fmla="*/ 681898 w 4015594"/>
-              <a:gd name="connsiteY0" fmla="*/ 2281741 h 2285550"/>
-              <a:gd name="connsiteX1" fmla="*/ 870545 w 4015594"/>
-              <a:gd name="connsiteY1" fmla="*/ 2285551 h 2285550"/>
-              <a:gd name="connsiteX2" fmla="*/ 3444286 w 4015594"/>
-              <a:gd name="connsiteY2" fmla="*/ 2285551 h 2285550"/>
-              <a:gd name="connsiteX3" fmla="*/ 4015591 w 4015594"/>
-              <a:gd name="connsiteY3" fmla="*/ 1709703 h 2285550"/>
-              <a:gd name="connsiteX4" fmla="*/ 3449048 w 4015594"/>
-              <a:gd name="connsiteY4" fmla="*/ 1138436 h 2285550"/>
-              <a:gd name="connsiteX5" fmla="*/ 3401423 w 4015594"/>
-              <a:gd name="connsiteY5" fmla="*/ 1138436 h 2285550"/>
-              <a:gd name="connsiteX6" fmla="*/ 3101386 w 4015594"/>
-              <a:gd name="connsiteY6" fmla="*/ 557239 h 2285550"/>
-              <a:gd name="connsiteX7" fmla="*/ 2448890 w 4015594"/>
-              <a:gd name="connsiteY7" fmla="*/ 466752 h 2285550"/>
-              <a:gd name="connsiteX8" fmla="*/ 1296117 w 4015594"/>
-              <a:gd name="connsiteY8" fmla="*/ 94148 h 2285550"/>
-              <a:gd name="connsiteX9" fmla="*/ 829559 w 4015594"/>
-              <a:gd name="connsiteY9" fmla="*/ 852610 h 2285550"/>
-              <a:gd name="connsiteX10" fmla="*/ 829559 w 4015594"/>
-              <a:gd name="connsiteY10" fmla="*/ 862135 h 2285550"/>
-              <a:gd name="connsiteX11" fmla="*/ 716535 w 4015594"/>
-              <a:gd name="connsiteY11" fmla="*/ 852929 h 2285550"/>
-              <a:gd name="connsiteX12" fmla="*/ 0 w 4015594"/>
-              <a:gd name="connsiteY12" fmla="*/ 1567799 h 2285550"/>
-              <a:gd name="connsiteX13" fmla="*/ 67507 w 4015594"/>
-              <a:gd name="connsiteY13" fmla="*/ 1872066 h 2285550"/>
-              <a:gd name="connsiteX14" fmla="*/ 681898 w 4015594"/>
-              <a:gd name="connsiteY14" fmla="*/ 2281741 h 2285550"/>
-              <a:gd name="connsiteX15" fmla="*/ 219826 w 4015594"/>
-              <a:gd name="connsiteY15" fmla="*/ 1195710 h 2285550"/>
-              <a:gd name="connsiteX16" fmla="*/ 716507 w 4015594"/>
-              <a:gd name="connsiteY16" fmla="*/ 948169 h 2285550"/>
-              <a:gd name="connsiteX17" fmla="*/ 814138 w 4015594"/>
-              <a:gd name="connsiteY17" fmla="*/ 956118 h 2285550"/>
-              <a:gd name="connsiteX18" fmla="*/ 924776 w 4015594"/>
-              <a:gd name="connsiteY18" fmla="*/ 974215 h 2285550"/>
-              <a:gd name="connsiteX19" fmla="*/ 924776 w 4015594"/>
-              <a:gd name="connsiteY19" fmla="*/ 852591 h 2285550"/>
-              <a:gd name="connsiteX20" fmla="*/ 1690971 w 4015594"/>
-              <a:gd name="connsiteY20" fmla="*/ 95767 h 2285550"/>
-              <a:gd name="connsiteX21" fmla="*/ 2364137 w 4015594"/>
-              <a:gd name="connsiteY21" fmla="*/ 510238 h 2285550"/>
-              <a:gd name="connsiteX22" fmla="*/ 2401960 w 4015594"/>
-              <a:gd name="connsiteY22" fmla="*/ 583909 h 2285550"/>
-              <a:gd name="connsiteX23" fmla="*/ 2480170 w 4015594"/>
-              <a:gd name="connsiteY23" fmla="*/ 556701 h 2285550"/>
-              <a:gd name="connsiteX24" fmla="*/ 3270097 w 4015594"/>
-              <a:gd name="connsiteY24" fmla="*/ 930548 h 2285550"/>
-              <a:gd name="connsiteX25" fmla="*/ 3306169 w 4015594"/>
-              <a:gd name="connsiteY25" fmla="*/ 1138436 h 2285550"/>
-              <a:gd name="connsiteX26" fmla="*/ 3306169 w 4015594"/>
-              <a:gd name="connsiteY26" fmla="*/ 1233686 h 2285550"/>
-              <a:gd name="connsiteX27" fmla="*/ 3449044 w 4015594"/>
-              <a:gd name="connsiteY27" fmla="*/ 1233686 h 2285550"/>
-              <a:gd name="connsiteX28" fmla="*/ 3920293 w 4015594"/>
-              <a:gd name="connsiteY28" fmla="*/ 1719004 h 2285550"/>
-              <a:gd name="connsiteX29" fmla="*/ 3444286 w 4015594"/>
-              <a:gd name="connsiteY29" fmla="*/ 2190301 h 2285550"/>
-              <a:gd name="connsiteX30" fmla="*/ 771947 w 4015594"/>
-              <a:gd name="connsiteY30" fmla="*/ 2190301 h 2285550"/>
-              <a:gd name="connsiteX31" fmla="*/ 687070 w 4015594"/>
-              <a:gd name="connsiteY31" fmla="*/ 2186629 h 2285550"/>
-              <a:gd name="connsiteX32" fmla="*/ 95530 w 4015594"/>
-              <a:gd name="connsiteY32" fmla="*/ 1541782 h 2285550"/>
-              <a:gd name="connsiteX33" fmla="*/ 219811 w 4015594"/>
-              <a:gd name="connsiteY33" fmla="*/ 1195710 h 2285550"/>
-            </a:gdLst>
-            <a:ahLst/>
-            <a:cxnLst>
-              <a:cxn ang="0">
-                <a:pos x="connsiteX0" y="connsiteY0"/>
-              </a:cxn>
-              <a:cxn ang="0">
-                <a:pos x="connsiteX1" y="connsiteY1"/>
-              </a:cxn>
-              <a:cxn ang="0">
-                <a:pos x="connsiteX2" y="connsiteY2"/>
-              </a:cxn>
-              <a:cxn ang="0">
-                <a:pos x="connsiteX3" y="connsiteY3"/>
-              </a:cxn>
-              <a:cxn ang="0">
-                <a:pos x="connsiteX4" y="connsiteY4"/>
-              </a:cxn>
-              <a:cxn ang="0">
-                <a:pos x="connsiteX5" y="connsiteY5"/>
-              </a:cxn>
-              <a:cxn ang="0">
-                <a:pos x="connsiteX6" y="connsiteY6"/>
-              </a:cxn>
-              <a:cxn ang="0">
-                <a:pos x="connsiteX7" y="connsiteY7"/>
-              </a:cxn>
-              <a:cxn ang="0">
-                <a:pos x="connsiteX8" y="connsiteY8"/>
-              </a:cxn>
-              <a:cxn ang="0">
-                <a:pos x="connsiteX9" y="connsiteY9"/>
-              </a:cxn>
-              <a:cxn ang="0">
-                <a:pos x="connsiteX10" y="connsiteY10"/>
-              </a:cxn>
-              <a:cxn ang="0">
-                <a:pos x="connsiteX11" y="connsiteY11"/>
-              </a:cxn>
-              <a:cxn ang="0">
-                <a:pos x="connsiteX12" y="connsiteY12"/>
-              </a:cxn>
-              <a:cxn ang="0">
-                <a:pos x="connsiteX13" y="connsiteY13"/>
-              </a:cxn>
-              <a:cxn ang="0">
-                <a:pos x="connsiteX14" y="connsiteY14"/>
-              </a:cxn>
-              <a:cxn ang="0">
-                <a:pos x="connsiteX15" y="connsiteY15"/>
-              </a:cxn>
-              <a:cxn ang="0">
-                <a:pos x="connsiteX16" y="connsiteY16"/>
-              </a:cxn>
-              <a:cxn ang="0">
-                <a:pos x="connsiteX17" y="connsiteY17"/>
-              </a:cxn>
-              <a:cxn ang="0">
-                <a:pos x="connsiteX18" y="connsiteY18"/>
-              </a:cxn>
-              <a:cxn ang="0">
-                <a:pos x="connsiteX19" y="connsiteY19"/>
-              </a:cxn>
-              <a:cxn ang="0">
-                <a:pos x="connsiteX20" y="connsiteY20"/>
-              </a:cxn>
-              <a:cxn ang="0">
-                <a:pos x="connsiteX21" y="connsiteY21"/>
-              </a:cxn>
-              <a:cxn ang="0">
-                <a:pos x="connsiteX22" y="connsiteY22"/>
-              </a:cxn>
-              <a:cxn ang="0">
-                <a:pos x="connsiteX23" y="connsiteY23"/>
-              </a:cxn>
-              <a:cxn ang="0">
-                <a:pos x="connsiteX24" y="connsiteY24"/>
-              </a:cxn>
-              <a:cxn ang="0">
-                <a:pos x="connsiteX25" y="connsiteY25"/>
-              </a:cxn>
-              <a:cxn ang="0">
-                <a:pos x="connsiteX26" y="connsiteY26"/>
-              </a:cxn>
-              <a:cxn ang="0">
-                <a:pos x="connsiteX27" y="connsiteY27"/>
-              </a:cxn>
-              <a:cxn ang="0">
-                <a:pos x="connsiteX28" y="connsiteY28"/>
-              </a:cxn>
-              <a:cxn ang="0">
-                <a:pos x="connsiteX29" y="connsiteY29"/>
-              </a:cxn>
-              <a:cxn ang="0">
-                <a:pos x="connsiteX30" y="connsiteY30"/>
-              </a:cxn>
-              <a:cxn ang="0">
-                <a:pos x="connsiteX31" y="connsiteY31"/>
-              </a:cxn>
-              <a:cxn ang="0">
-                <a:pos x="connsiteX32" y="connsiteY32"/>
-              </a:cxn>
-              <a:cxn ang="0">
-                <a:pos x="connsiteX33" y="connsiteY33"/>
-              </a:cxn>
-            </a:cxnLst>
-            <a:rect l="l" t="t" r="r" b="b"/>
-            <a:pathLst>
-              <a:path w="4015594" h="2285550">
-                <a:moveTo>
-                  <a:pt x="681898" y="2281741"/>
-                </a:moveTo>
-                <a:cubicBezTo>
-                  <a:pt x="730051" y="2284365"/>
-                  <a:pt x="870545" y="2285551"/>
-                  <a:pt x="870545" y="2285551"/>
-                </a:cubicBezTo>
-                <a:lnTo>
-                  <a:pt x="3444286" y="2285551"/>
-                </a:lnTo>
-                <a:cubicBezTo>
-                  <a:pt x="3761064" y="2284298"/>
-                  <a:pt x="4016848" y="2026480"/>
-                  <a:pt x="4015591" y="1709703"/>
-                </a:cubicBezTo>
-                <a:cubicBezTo>
-                  <a:pt x="4014352" y="1396554"/>
-                  <a:pt x="3762178" y="1142275"/>
-                  <a:pt x="3449048" y="1138436"/>
-                </a:cubicBezTo>
-                <a:lnTo>
-                  <a:pt x="3401423" y="1138436"/>
-                </a:lnTo>
-                <a:cubicBezTo>
-                  <a:pt x="3400980" y="907655"/>
-                  <a:pt x="3289266" y="691256"/>
-                  <a:pt x="3101386" y="557239"/>
-                </a:cubicBezTo>
-                <a:cubicBezTo>
-                  <a:pt x="2911034" y="424056"/>
-                  <a:pt x="2668303" y="390395"/>
-                  <a:pt x="2448890" y="466752"/>
-                </a:cubicBezTo>
-                <a:cubicBezTo>
-                  <a:pt x="2233454" y="45533"/>
-                  <a:pt x="1717337" y="-121288"/>
-                  <a:pt x="1296117" y="94148"/>
-                </a:cubicBezTo>
-                <a:cubicBezTo>
-                  <a:pt x="1011091" y="239928"/>
-                  <a:pt x="831140" y="532470"/>
-                  <a:pt x="829559" y="852610"/>
-                </a:cubicBezTo>
-                <a:lnTo>
-                  <a:pt x="829559" y="862135"/>
-                </a:lnTo>
-                <a:cubicBezTo>
-                  <a:pt x="792192" y="856020"/>
-                  <a:pt x="754397" y="852943"/>
-                  <a:pt x="716535" y="852929"/>
-                </a:cubicBezTo>
-                <a:cubicBezTo>
-                  <a:pt x="321262" y="852472"/>
-                  <a:pt x="460" y="1172531"/>
-                  <a:pt x="0" y="1567799"/>
-                </a:cubicBezTo>
-                <a:cubicBezTo>
-                  <a:pt x="-121" y="1672950"/>
-                  <a:pt x="22927" y="1776835"/>
-                  <a:pt x="67507" y="1872066"/>
-                </a:cubicBezTo>
-                <a:cubicBezTo>
-                  <a:pt x="183202" y="2109633"/>
-                  <a:pt x="418107" y="2266272"/>
-                  <a:pt x="681898" y="2281741"/>
-                </a:cubicBezTo>
-                <a:close/>
-                <a:moveTo>
-                  <a:pt x="219826" y="1195710"/>
-                </a:moveTo>
-                <a:cubicBezTo>
-                  <a:pt x="338650" y="1041376"/>
-                  <a:pt x="521740" y="950122"/>
-                  <a:pt x="716507" y="948169"/>
-                </a:cubicBezTo>
-                <a:cubicBezTo>
-                  <a:pt x="749211" y="948198"/>
-                  <a:pt x="781858" y="950855"/>
-                  <a:pt x="814138" y="956118"/>
-                </a:cubicBezTo>
-                <a:lnTo>
-                  <a:pt x="924776" y="974215"/>
-                </a:lnTo>
-                <a:lnTo>
-                  <a:pt x="924776" y="852591"/>
-                </a:lnTo>
-                <a:cubicBezTo>
-                  <a:pt x="927362" y="432019"/>
-                  <a:pt x="1270400" y="93181"/>
-                  <a:pt x="1690971" y="95767"/>
-                </a:cubicBezTo>
-                <a:cubicBezTo>
-                  <a:pt x="1975112" y="97515"/>
-                  <a:pt x="2234644" y="257311"/>
-                  <a:pt x="2364137" y="510238"/>
-                </a:cubicBezTo>
-                <a:lnTo>
-                  <a:pt x="2401960" y="583909"/>
-                </a:lnTo>
-                <a:lnTo>
-                  <a:pt x="2480170" y="556701"/>
-                </a:lnTo>
-                <a:cubicBezTo>
-                  <a:pt x="2801539" y="441806"/>
-                  <a:pt x="3155197" y="609179"/>
-                  <a:pt x="3270097" y="930548"/>
-                </a:cubicBezTo>
-                <a:cubicBezTo>
-                  <a:pt x="3293948" y="997261"/>
-                  <a:pt x="3306149" y="1067584"/>
-                  <a:pt x="3306169" y="1138436"/>
-                </a:cubicBezTo>
-                <a:lnTo>
-                  <a:pt x="3306169" y="1233686"/>
-                </a:lnTo>
-                <a:lnTo>
-                  <a:pt x="3449044" y="1233686"/>
-                </a:lnTo>
-                <a:cubicBezTo>
-                  <a:pt x="3713191" y="1237572"/>
-                  <a:pt x="3924179" y="1454856"/>
-                  <a:pt x="3920293" y="1719004"/>
-                </a:cubicBezTo>
-                <a:cubicBezTo>
-                  <a:pt x="3916459" y="1979527"/>
-                  <a:pt x="3704833" y="2189062"/>
-                  <a:pt x="3444286" y="2190301"/>
-                </a:cubicBezTo>
-                <a:lnTo>
-                  <a:pt x="771947" y="2190301"/>
-                </a:lnTo>
-                <a:lnTo>
-                  <a:pt x="687070" y="2186629"/>
-                </a:lnTo>
-                <a:cubicBezTo>
-                  <a:pt x="345651" y="2171908"/>
-                  <a:pt x="80810" y="1883200"/>
-                  <a:pt x="95530" y="1541782"/>
-                </a:cubicBezTo>
-                <a:cubicBezTo>
-                  <a:pt x="100932" y="1416495"/>
-                  <a:pt x="144273" y="1295808"/>
-                  <a:pt x="219811" y="1195710"/>
-                </a:cubicBezTo>
-                <a:close/>
-              </a:path>
-            </a:pathLst>
-          </a:custGeom>
-          <a:noFill/>
-          <a:ln w="6350" cap="flat">
-            <a:solidFill>
-              <a:schemeClr val="bg2">
-                <a:lumMod val="75000"/>
-              </a:schemeClr>
-            </a:solidFill>
-            <a:prstDash val="solid"/>
-            <a:miter/>
-          </a:ln>
-        </p:spPr>
-        <p:txBody>
-          <a:bodyPr rtlCol="0" anchor="ctr"/>
-          <a:lstStyle/>
-          <a:p>
-            <a:pPr algn="ctr"/>
-            <a:r>
-              <a:rPr lang="en-CA" sz="1013" dirty="0"/>
-              <a:t>Cloud owlcms</a:t>
-            </a:r>
-          </a:p>
-        </p:txBody>
-      </p:sp>
-      <p:cxnSp>
-        <p:nvCxnSpPr>
-          <p:cNvPr id="19" name="Straight Arrow Connector 18">
-            <a:extLst>
-              <a:ext uri="{FF2B5EF4-FFF2-40B4-BE49-F238E27FC236}">
-                <a16:creationId xmlns:a16="http://schemas.microsoft.com/office/drawing/2014/main" id="{B5FD6CAC-8B5B-3FAE-CB5B-4B99C67926A5}"/>
-              </a:ext>
-            </a:extLst>
-          </p:cNvPr>
-          <p:cNvCxnSpPr>
-            <a:cxnSpLocks/>
-          </p:cNvCxnSpPr>
-          <p:nvPr/>
-        </p:nvCxnSpPr>
-        <p:spPr>
-          <a:xfrm flipH="1">
-            <a:off x="3320988" y="1987367"/>
-            <a:ext cx="612068" cy="0"/>
-          </a:xfrm>
-          <a:prstGeom prst="straightConnector1">
-            <a:avLst/>
-          </a:prstGeom>
-          <a:ln w="12700">
-            <a:solidFill>
-              <a:schemeClr val="tx1"/>
-            </a:solidFill>
-            <a:headEnd type="triangle"/>
-            <a:tailEnd type="triangle"/>
-          </a:ln>
-        </p:spPr>
-        <p:style>
-          <a:lnRef idx="1">
-            <a:schemeClr val="accent1"/>
-          </a:lnRef>
-          <a:fillRef idx="0">
-            <a:schemeClr val="accent1"/>
-          </a:fillRef>
-          <a:effectRef idx="0">
-            <a:schemeClr val="accent1"/>
-          </a:effectRef>
-          <a:fontRef idx="minor">
-            <a:schemeClr val="tx1"/>
-          </a:fontRef>
-        </p:style>
-      </p:cxnSp>
     </p:spTree>
     <p:extLst>
       <p:ext uri="{BB962C8B-B14F-4D97-AF65-F5344CB8AC3E}">
-        <p14:creationId xmlns:p14="http://schemas.microsoft.com/office/powerpoint/2010/main" val="2251531255"/>
+        <p14:creationId xmlns:p14="http://schemas.microsoft.com/office/powerpoint/2010/main" val="2451929929"/>
       </p:ext>
     </p:extLst>
   </p:cSld>
@@ -42531,58 +43490,12 @@
           <a:chExt cx="0" cy="0"/>
         </a:xfrm>
       </p:grpSpPr>
-      <p:cxnSp>
-        <p:nvCxnSpPr>
-          <p:cNvPr id="386" name="Connector: Elbow 385">
-            <a:extLst>
-              <a:ext uri="{FF2B5EF4-FFF2-40B4-BE49-F238E27FC236}">
-                <a16:creationId xmlns:a16="http://schemas.microsoft.com/office/drawing/2014/main" id="{B9268D69-00FB-E4C8-1218-14CB2BF516D2}"/>
-              </a:ext>
-            </a:extLst>
-          </p:cNvPr>
-          <p:cNvCxnSpPr>
-            <a:cxnSpLocks/>
-            <a:stCxn id="2" idx="2"/>
-          </p:cNvCxnSpPr>
-          <p:nvPr/>
-        </p:nvCxnSpPr>
-        <p:spPr>
-          <a:xfrm flipH="1" flipV="1">
-            <a:off x="2277748" y="1576633"/>
-            <a:ext cx="20379" cy="932675"/>
-          </a:xfrm>
-          <a:prstGeom prst="bentConnector4">
-            <a:avLst>
-              <a:gd name="adj1" fmla="val -1433883"/>
-              <a:gd name="adj2" fmla="val 100345"/>
-            </a:avLst>
-          </a:prstGeom>
-          <a:ln w="12700">
-            <a:headEnd type="triangle" w="med" len="med"/>
-            <a:tailEnd type="triangle" w="med" len="med"/>
-          </a:ln>
-        </p:spPr>
-        <p:style>
-          <a:lnRef idx="1">
-            <a:schemeClr val="accent1"/>
-          </a:lnRef>
-          <a:fillRef idx="0">
-            <a:schemeClr val="accent1"/>
-          </a:fillRef>
-          <a:effectRef idx="0">
-            <a:schemeClr val="accent1"/>
-          </a:effectRef>
-          <a:fontRef idx="minor">
-            <a:schemeClr val="tx1"/>
-          </a:fontRef>
-        </p:style>
-      </p:cxnSp>
       <p:sp>
         <p:nvSpPr>
-          <p:cNvPr id="18" name="TextBox 17">
-            <a:extLst>
-              <a:ext uri="{FF2B5EF4-FFF2-40B4-BE49-F238E27FC236}">
-                <a16:creationId xmlns:a16="http://schemas.microsoft.com/office/drawing/2014/main" id="{E2C70ECE-016A-9A22-AD05-903DFA223D4B}"/>
+          <p:cNvPr id="72" name="TextBox 71">
+            <a:extLst>
+              <a:ext uri="{FF2B5EF4-FFF2-40B4-BE49-F238E27FC236}">
+                <a16:creationId xmlns:a16="http://schemas.microsoft.com/office/drawing/2014/main" id="{2203EEF7-8763-B761-8E52-FD53115C8BC4}"/>
               </a:ext>
             </a:extLst>
           </p:cNvPr>
@@ -42591,7 +43504,221 @@
         </p:nvSpPr>
         <p:spPr>
           <a:xfrm>
-            <a:off x="1574780" y="2670173"/>
+            <a:off x="3582792" y="2879178"/>
+            <a:ext cx="587020" cy="248209"/>
+          </a:xfrm>
+          <a:prstGeom prst="rect">
+            <a:avLst/>
+          </a:prstGeom>
+          <a:noFill/>
+        </p:spPr>
+        <p:txBody>
+          <a:bodyPr wrap="none" rtlCol="0">
+            <a:spAutoFit/>
+          </a:bodyPr>
+          <a:lstStyle/>
+          <a:p>
+            <a:pPr algn="ctr"/>
+            <a:r>
+              <a:rPr lang="fr-CA" sz="1013" dirty="0">
+                <a:solidFill>
+                  <a:schemeClr val="accent1"/>
+                </a:solidFill>
+              </a:rPr>
+              <a:t>owlcms</a:t>
+            </a:r>
+          </a:p>
+        </p:txBody>
+      </p:sp>
+      <p:pic>
+        <p:nvPicPr>
+          <p:cNvPr id="78" name="Graphic 77" descr="Laptop">
+            <a:extLst>
+              <a:ext uri="{FF2B5EF4-FFF2-40B4-BE49-F238E27FC236}">
+                <a16:creationId xmlns:a16="http://schemas.microsoft.com/office/drawing/2014/main" id="{4BF89AD2-596B-7C94-1344-0D34039A4EE0}"/>
+              </a:ext>
+            </a:extLst>
+          </p:cNvPr>
+          <p:cNvPicPr>
+            <a:picLocks noChangeAspect="1"/>
+          </p:cNvPicPr>
+          <p:nvPr/>
+        </p:nvPicPr>
+        <p:blipFill>
+          <a:blip r:embed="rId2">
+            <a:extLst>
+              <a:ext uri="{28A0092B-C50C-407E-A947-70E740481C1C}">
+                <a14:useLocalDpi xmlns:a14="http://schemas.microsoft.com/office/drawing/2010/main" val="0"/>
+              </a:ext>
+              <a:ext uri="{96DAC541-7B7A-43D3-8B79-37D633B846F1}">
+                <asvg:svgBlip xmlns:asvg="http://schemas.microsoft.com/office/drawing/2016/SVG/main" r:embed="rId3"/>
+              </a:ext>
+            </a:extLst>
+          </a:blip>
+          <a:stretch>
+            <a:fillRect/>
+          </a:stretch>
+        </p:blipFill>
+        <p:spPr>
+          <a:xfrm>
+            <a:off x="3606828" y="2543115"/>
+            <a:ext cx="514350" cy="514350"/>
+          </a:xfrm>
+          <a:prstGeom prst="rect">
+            <a:avLst/>
+          </a:prstGeom>
+        </p:spPr>
+      </p:pic>
+      <p:grpSp>
+        <p:nvGrpSpPr>
+          <p:cNvPr id="60" name="Group 59">
+            <a:extLst>
+              <a:ext uri="{FF2B5EF4-FFF2-40B4-BE49-F238E27FC236}">
+                <a16:creationId xmlns:a16="http://schemas.microsoft.com/office/drawing/2014/main" id="{74AFF561-DD6F-5BB8-4DC0-216725C3D8B7}"/>
+              </a:ext>
+            </a:extLst>
+          </p:cNvPr>
+          <p:cNvGrpSpPr/>
+          <p:nvPr/>
+        </p:nvGrpSpPr>
+        <p:grpSpPr>
+          <a:xfrm>
+            <a:off x="3655245" y="1695889"/>
+            <a:ext cx="437452" cy="728430"/>
+            <a:chOff x="2313501" y="958704"/>
+            <a:chExt cx="437452" cy="728430"/>
+          </a:xfrm>
+        </p:grpSpPr>
+        <p:pic>
+          <p:nvPicPr>
+            <p:cNvPr id="68" name="Graphic 67" descr="Laptop">
+              <a:extLst>
+                <a:ext uri="{FF2B5EF4-FFF2-40B4-BE49-F238E27FC236}">
+                  <a16:creationId xmlns:a16="http://schemas.microsoft.com/office/drawing/2014/main" id="{0856CCFE-A969-C49A-E832-1C0E6BA50241}"/>
+                </a:ext>
+              </a:extLst>
+            </p:cNvPr>
+            <p:cNvPicPr>
+              <a:picLocks noChangeAspect="1"/>
+            </p:cNvPicPr>
+            <p:nvPr/>
+          </p:nvPicPr>
+          <p:blipFill>
+            <a:blip r:embed="rId4">
+              <a:extLst>
+                <a:ext uri="{28A0092B-C50C-407E-A947-70E740481C1C}">
+                  <a14:useLocalDpi xmlns:a14="http://schemas.microsoft.com/office/drawing/2010/main" val="0"/>
+                </a:ext>
+                <a:ext uri="{96DAC541-7B7A-43D3-8B79-37D633B846F1}">
+                  <asvg:svgBlip xmlns:asvg="http://schemas.microsoft.com/office/drawing/2016/SVG/main" r:embed="rId5"/>
+                </a:ext>
+              </a:extLst>
+            </a:blip>
+            <a:stretch>
+              <a:fillRect/>
+            </a:stretch>
+          </p:blipFill>
+          <p:spPr>
+            <a:xfrm>
+              <a:off x="2313501" y="958704"/>
+              <a:ext cx="437452" cy="456245"/>
+            </a:xfrm>
+            <a:prstGeom prst="rect">
+              <a:avLst/>
+            </a:prstGeom>
+          </p:spPr>
+        </p:pic>
+        <p:sp>
+          <p:nvSpPr>
+            <p:cNvPr id="73" name="TextBox 72">
+              <a:extLst>
+                <a:ext uri="{FF2B5EF4-FFF2-40B4-BE49-F238E27FC236}">
+                  <a16:creationId xmlns:a16="http://schemas.microsoft.com/office/drawing/2014/main" id="{0925C640-24D2-31D1-53A7-2FF27E10A476}"/>
+                </a:ext>
+              </a:extLst>
+            </p:cNvPr>
+            <p:cNvSpPr txBox="1"/>
+            <p:nvPr/>
+          </p:nvSpPr>
+          <p:spPr>
+            <a:xfrm>
+              <a:off x="2439868" y="1283049"/>
+              <a:ext cx="184730" cy="404085"/>
+            </a:xfrm>
+            <a:prstGeom prst="rect">
+              <a:avLst/>
+            </a:prstGeom>
+            <a:noFill/>
+          </p:spPr>
+          <p:txBody>
+            <a:bodyPr wrap="none" rtlCol="0">
+              <a:spAutoFit/>
+            </a:bodyPr>
+            <a:lstStyle/>
+            <a:p>
+              <a:pPr algn="ctr"/>
+              <a:br>
+                <a:rPr lang="fr-CA" sz="1013" dirty="0"/>
+              </a:br>
+              <a:endParaRPr lang="fr-CA" sz="1013" dirty="0"/>
+            </a:p>
+          </p:txBody>
+        </p:sp>
+      </p:grpSp>
+      <p:pic>
+        <p:nvPicPr>
+          <p:cNvPr id="107" name="Graphic 106" descr="Monitor with solid fill">
+            <a:extLst>
+              <a:ext uri="{FF2B5EF4-FFF2-40B4-BE49-F238E27FC236}">
+                <a16:creationId xmlns:a16="http://schemas.microsoft.com/office/drawing/2014/main" id="{F2E2F63C-280E-F8B1-E28C-3D71849220AE}"/>
+              </a:ext>
+            </a:extLst>
+          </p:cNvPr>
+          <p:cNvPicPr>
+            <a:picLocks noChangeAspect="1"/>
+          </p:cNvPicPr>
+          <p:nvPr/>
+        </p:nvPicPr>
+        <p:blipFill>
+          <a:blip r:embed="rId6">
+            <a:extLst>
+              <a:ext uri="{28A0092B-C50C-407E-A947-70E740481C1C}">
+                <a14:useLocalDpi xmlns:a14="http://schemas.microsoft.com/office/drawing/2010/main" val="0"/>
+              </a:ext>
+              <a:ext uri="{96DAC541-7B7A-43D3-8B79-37D633B846F1}">
+                <asvg:svgBlip xmlns:asvg="http://schemas.microsoft.com/office/drawing/2016/SVG/main" r:embed="rId7"/>
+              </a:ext>
+            </a:extLst>
+          </a:blip>
+          <a:stretch>
+            <a:fillRect/>
+          </a:stretch>
+        </p:blipFill>
+        <p:spPr>
+          <a:xfrm>
+            <a:off x="2725945" y="1695889"/>
+            <a:ext cx="463422" cy="463422"/>
+          </a:xfrm>
+          <a:prstGeom prst="rect">
+            <a:avLst/>
+          </a:prstGeom>
+        </p:spPr>
+      </p:pic>
+      <p:sp>
+        <p:nvSpPr>
+          <p:cNvPr id="116" name="TextBox 115">
+            <a:extLst>
+              <a:ext uri="{FF2B5EF4-FFF2-40B4-BE49-F238E27FC236}">
+                <a16:creationId xmlns:a16="http://schemas.microsoft.com/office/drawing/2014/main" id="{BE3673FE-B82F-67A8-446D-0436EA62049E}"/>
+              </a:ext>
+            </a:extLst>
+          </p:cNvPr>
+          <p:cNvSpPr txBox="1"/>
+          <p:nvPr/>
+        </p:nvSpPr>
+        <p:spPr>
+          <a:xfrm>
+            <a:off x="2492896" y="2060104"/>
             <a:ext cx="939371" cy="317651"/>
           </a:xfrm>
           <a:prstGeom prst="rect">
@@ -42611,25 +43738,72 @@
               </a:lnSpc>
             </a:pPr>
             <a:r>
-              <a:rPr lang="en-CA" sz="1013" noProof="1"/>
+              <a:rPr lang="fr-CA" sz="1013" dirty="0" err="1"/>
               <a:t>Warmup</a:t>
             </a:r>
             <a:br>
-              <a:rPr lang="en-CA" sz="1013" noProof="1"/>
+              <a:rPr lang="fr-CA" sz="1013" dirty="0"/>
             </a:br>
             <a:r>
-              <a:rPr lang="en-CA" sz="1013" noProof="1"/>
+              <a:rPr lang="fr-CA" sz="1013" dirty="0"/>
               <a:t>Scoreboard</a:t>
             </a:r>
           </a:p>
         </p:txBody>
       </p:sp>
+      <p:cxnSp>
+        <p:nvCxnSpPr>
+          <p:cNvPr id="156" name="Straight Arrow Connector 155">
+            <a:extLst>
+              <a:ext uri="{FF2B5EF4-FFF2-40B4-BE49-F238E27FC236}">
+                <a16:creationId xmlns:a16="http://schemas.microsoft.com/office/drawing/2014/main" id="{4DA848C7-A301-8B2E-29CB-1AF6F55C4FE1}"/>
+              </a:ext>
+            </a:extLst>
+          </p:cNvPr>
+          <p:cNvCxnSpPr>
+            <a:stCxn id="68" idx="1"/>
+            <a:endCxn id="107" idx="3"/>
+          </p:cNvCxnSpPr>
+          <p:nvPr/>
+        </p:nvCxnSpPr>
+        <p:spPr>
+          <a:xfrm flipH="1">
+            <a:off x="3189367" y="1924012"/>
+            <a:ext cx="465878" cy="3588"/>
+          </a:xfrm>
+          <a:prstGeom prst="straightConnector1">
+            <a:avLst/>
+          </a:prstGeom>
+          <a:ln w="25400">
+            <a:solidFill>
+              <a:schemeClr val="accent6">
+                <a:lumMod val="75000"/>
+              </a:schemeClr>
+            </a:solidFill>
+            <a:tailEnd type="triangle"/>
+          </a:ln>
+        </p:spPr>
+        <p:style>
+          <a:lnRef idx="1">
+            <a:schemeClr val="accent1"/>
+          </a:lnRef>
+          <a:fillRef idx="0">
+            <a:schemeClr val="accent1"/>
+          </a:fillRef>
+          <a:effectRef idx="0">
+            <a:schemeClr val="accent1"/>
+          </a:effectRef>
+          <a:fontRef idx="minor">
+            <a:schemeClr val="tx1"/>
+          </a:fontRef>
+        </p:style>
+      </p:cxnSp>
       <p:pic>
         <p:nvPicPr>
-          <p:cNvPr id="2" name="Graphic 1" descr="Smart Phone">
-            <a:extLst>
-              <a:ext uri="{FF2B5EF4-FFF2-40B4-BE49-F238E27FC236}">
-                <a16:creationId xmlns:a16="http://schemas.microsoft.com/office/drawing/2014/main" id="{DE1EFAD3-AAC4-6993-9E82-C66AE21697B4}"/>
+          <p:cNvPr id="269" name="Graphic 268">
+            <a:extLst>
+              <a:ext uri="{FF2B5EF4-FFF2-40B4-BE49-F238E27FC236}">
+                <a16:creationId xmlns:a16="http://schemas.microsoft.com/office/drawing/2014/main" id="{1E362577-7114-0110-5DE8-8E20B2BB9FFE}"/>
               </a:ext>
             </a:extLst>
           </p:cNvPr>
@@ -42638,14 +43812,333 @@
           </p:cNvPicPr>
           <p:nvPr/>
         </p:nvPicPr>
-        <p:blipFill>
-          <a:blip r:embed="rId2">
+        <p:blipFill rotWithShape="1">
+          <a:blip r:embed="rId8">
+            <a:duotone>
+              <a:schemeClr val="accent1">
+                <a:shade val="45000"/>
+                <a:satMod val="135000"/>
+              </a:schemeClr>
+              <a:prstClr val="white"/>
+            </a:duotone>
             <a:extLst>
               <a:ext uri="{28A0092B-C50C-407E-A947-70E740481C1C}">
                 <a14:useLocalDpi xmlns:a14="http://schemas.microsoft.com/office/drawing/2010/main" val="0"/>
               </a:ext>
               <a:ext uri="{96DAC541-7B7A-43D3-8B79-37D633B846F1}">
-                <asvg:svgBlip xmlns:asvg="http://schemas.microsoft.com/office/drawing/2016/SVG/main" r:embed="rId3"/>
+                <asvg:svgBlip xmlns:asvg="http://schemas.microsoft.com/office/drawing/2016/SVG/main" r:embed="rId9"/>
+              </a:ext>
+            </a:extLst>
+          </a:blip>
+          <a:srcRect t="19758" b="39178"/>
+          <a:stretch/>
+        </p:blipFill>
+        <p:spPr>
+          <a:xfrm>
+            <a:off x="4293096" y="2987212"/>
+            <a:ext cx="710946" cy="291944"/>
+          </a:xfrm>
+          <a:prstGeom prst="rect">
+            <a:avLst/>
+          </a:prstGeom>
+        </p:spPr>
+      </p:pic>
+      <p:cxnSp>
+        <p:nvCxnSpPr>
+          <p:cNvPr id="337" name="Straight Arrow Connector 336">
+            <a:extLst>
+              <a:ext uri="{FF2B5EF4-FFF2-40B4-BE49-F238E27FC236}">
+                <a16:creationId xmlns:a16="http://schemas.microsoft.com/office/drawing/2014/main" id="{1985680E-6AB2-BF60-CFEB-6ED7AB3E08BA}"/>
+              </a:ext>
+            </a:extLst>
+          </p:cNvPr>
+          <p:cNvCxnSpPr>
+            <a:cxnSpLocks/>
+          </p:cNvCxnSpPr>
+          <p:nvPr/>
+        </p:nvCxnSpPr>
+        <p:spPr>
+          <a:xfrm flipH="1">
+            <a:off x="4048428" y="2800290"/>
+            <a:ext cx="320174" cy="0"/>
+          </a:xfrm>
+          <a:prstGeom prst="straightConnector1">
+            <a:avLst/>
+          </a:prstGeom>
+          <a:ln w="12700">
+            <a:solidFill>
+              <a:schemeClr val="accent1"/>
+            </a:solidFill>
+            <a:headEnd type="triangle"/>
+            <a:tailEnd type="triangle"/>
+          </a:ln>
+        </p:spPr>
+        <p:style>
+          <a:lnRef idx="1">
+            <a:schemeClr val="accent1"/>
+          </a:lnRef>
+          <a:fillRef idx="0">
+            <a:schemeClr val="accent1"/>
+          </a:fillRef>
+          <a:effectRef idx="0">
+            <a:schemeClr val="accent1"/>
+          </a:effectRef>
+          <a:fontRef idx="minor">
+            <a:schemeClr val="tx1"/>
+          </a:fontRef>
+        </p:style>
+      </p:cxnSp>
+      <p:cxnSp>
+        <p:nvCxnSpPr>
+          <p:cNvPr id="386" name="Connector: Elbow 385">
+            <a:extLst>
+              <a:ext uri="{FF2B5EF4-FFF2-40B4-BE49-F238E27FC236}">
+                <a16:creationId xmlns:a16="http://schemas.microsoft.com/office/drawing/2014/main" id="{B9268D69-00FB-E4C8-1218-14CB2BF516D2}"/>
+              </a:ext>
+            </a:extLst>
+          </p:cNvPr>
+          <p:cNvCxnSpPr>
+            <a:cxnSpLocks/>
+            <a:stCxn id="94" idx="3"/>
+            <a:endCxn id="68" idx="3"/>
+          </p:cNvCxnSpPr>
+          <p:nvPr/>
+        </p:nvCxnSpPr>
+        <p:spPr>
+          <a:xfrm flipV="1">
+            <a:off x="3992590" y="1924012"/>
+            <a:ext cx="100107" cy="1953033"/>
+          </a:xfrm>
+          <a:prstGeom prst="bentConnector3">
+            <a:avLst>
+              <a:gd name="adj1" fmla="val 401429"/>
+            </a:avLst>
+          </a:prstGeom>
+          <a:ln w="12700">
+            <a:headEnd type="triangle" w="med" len="med"/>
+            <a:tailEnd type="triangle" w="med" len="med"/>
+          </a:ln>
+        </p:spPr>
+        <p:style>
+          <a:lnRef idx="1">
+            <a:schemeClr val="accent1"/>
+          </a:lnRef>
+          <a:fillRef idx="0">
+            <a:schemeClr val="accent1"/>
+          </a:fillRef>
+          <a:effectRef idx="0">
+            <a:schemeClr val="accent1"/>
+          </a:effectRef>
+          <a:fontRef idx="minor">
+            <a:schemeClr val="tx1"/>
+          </a:fontRef>
+        </p:style>
+      </p:cxnSp>
+      <p:sp>
+        <p:nvSpPr>
+          <p:cNvPr id="407" name="TextBox 406">
+            <a:extLst>
+              <a:ext uri="{FF2B5EF4-FFF2-40B4-BE49-F238E27FC236}">
+                <a16:creationId xmlns:a16="http://schemas.microsoft.com/office/drawing/2014/main" id="{BE01BD03-1013-EEB8-B968-1DB1110B6135}"/>
+              </a:ext>
+            </a:extLst>
+          </p:cNvPr>
+          <p:cNvSpPr txBox="1"/>
+          <p:nvPr/>
+        </p:nvSpPr>
+        <p:spPr>
+          <a:xfrm>
+            <a:off x="4827855" y="3003282"/>
+            <a:ext cx="862685" cy="317651"/>
+          </a:xfrm>
+          <a:prstGeom prst="rect">
+            <a:avLst/>
+          </a:prstGeom>
+          <a:noFill/>
+        </p:spPr>
+        <p:txBody>
+          <a:bodyPr wrap="square" rtlCol="0">
+            <a:spAutoFit/>
+          </a:bodyPr>
+          <a:lstStyle/>
+          <a:p>
+            <a:pPr algn="ctr">
+              <a:lnSpc>
+                <a:spcPct val="70000"/>
+              </a:lnSpc>
+            </a:pPr>
+            <a:r>
+              <a:rPr lang="fr-CA" sz="1013" dirty="0" err="1"/>
+              <a:t>Competition</a:t>
+            </a:r>
+            <a:br>
+              <a:rPr lang="fr-CA" sz="1013" dirty="0"/>
+            </a:br>
+            <a:r>
+              <a:rPr lang="fr-CA" sz="1013" dirty="0"/>
+              <a:t>Router</a:t>
+            </a:r>
+          </a:p>
+        </p:txBody>
+      </p:sp>
+      <p:sp>
+        <p:nvSpPr>
+          <p:cNvPr id="12" name="TextBox 11">
+            <a:extLst>
+              <a:ext uri="{FF2B5EF4-FFF2-40B4-BE49-F238E27FC236}">
+                <a16:creationId xmlns:a16="http://schemas.microsoft.com/office/drawing/2014/main" id="{BE21DD6A-F02D-D638-943C-F12CEEF526A6}"/>
+              </a:ext>
+            </a:extLst>
+          </p:cNvPr>
+          <p:cNvSpPr txBox="1"/>
+          <p:nvPr/>
+        </p:nvSpPr>
+        <p:spPr>
+          <a:xfrm>
+            <a:off x="3263539" y="1759619"/>
+            <a:ext cx="425116" cy="184089"/>
+          </a:xfrm>
+          <a:prstGeom prst="rect">
+            <a:avLst/>
+          </a:prstGeom>
+          <a:noFill/>
+        </p:spPr>
+        <p:txBody>
+          <a:bodyPr wrap="none" rtlCol="0">
+            <a:spAutoFit/>
+          </a:bodyPr>
+          <a:lstStyle/>
+          <a:p>
+            <a:pPr algn="ctr">
+              <a:lnSpc>
+                <a:spcPct val="70000"/>
+              </a:lnSpc>
+            </a:pPr>
+            <a:r>
+              <a:rPr lang="en-CA" sz="800" dirty="0"/>
+              <a:t>HDMI</a:t>
+            </a:r>
+          </a:p>
+        </p:txBody>
+      </p:sp>
+      <p:sp>
+        <p:nvSpPr>
+          <p:cNvPr id="18" name="TextBox 17">
+            <a:extLst>
+              <a:ext uri="{FF2B5EF4-FFF2-40B4-BE49-F238E27FC236}">
+                <a16:creationId xmlns:a16="http://schemas.microsoft.com/office/drawing/2014/main" id="{E2C70ECE-016A-9A22-AD05-903DFA223D4B}"/>
+              </a:ext>
+            </a:extLst>
+          </p:cNvPr>
+          <p:cNvSpPr txBox="1"/>
+          <p:nvPr/>
+        </p:nvSpPr>
+        <p:spPr>
+          <a:xfrm>
+            <a:off x="3392996" y="3023828"/>
+            <a:ext cx="939371" cy="317651"/>
+          </a:xfrm>
+          <a:prstGeom prst="rect">
+            <a:avLst/>
+          </a:prstGeom>
+          <a:noFill/>
+        </p:spPr>
+        <p:txBody>
+          <a:bodyPr wrap="square" rtlCol="0">
+            <a:spAutoFit/>
+          </a:bodyPr>
+          <a:lstStyle/>
+          <a:p>
+            <a:pPr algn="ctr">
+              <a:lnSpc>
+                <a:spcPct val="70000"/>
+              </a:lnSpc>
+            </a:pPr>
+            <a:r>
+              <a:rPr lang="fr-CA" sz="1013" dirty="0" err="1"/>
+              <a:t>Announcer</a:t>
+            </a:r>
+            <a:br>
+              <a:rPr lang="fr-CA" sz="1013" dirty="0"/>
+            </a:br>
+            <a:r>
+              <a:rPr lang="fr-CA" sz="1013" dirty="0" err="1"/>
+              <a:t>Timekeeper</a:t>
+            </a:r>
+            <a:endParaRPr lang="fr-CA" sz="1013" dirty="0"/>
+          </a:p>
+        </p:txBody>
+      </p:sp>
+      <p:sp>
+        <p:nvSpPr>
+          <p:cNvPr id="79" name="TextBox 78">
+            <a:extLst>
+              <a:ext uri="{FF2B5EF4-FFF2-40B4-BE49-F238E27FC236}">
+                <a16:creationId xmlns:a16="http://schemas.microsoft.com/office/drawing/2014/main" id="{90C8B18D-E554-35ED-B5A1-FB8971D127E8}"/>
+              </a:ext>
+            </a:extLst>
+          </p:cNvPr>
+          <p:cNvSpPr txBox="1"/>
+          <p:nvPr/>
+        </p:nvSpPr>
+        <p:spPr>
+          <a:xfrm>
+            <a:off x="3422911" y="2052591"/>
+            <a:ext cx="939371" cy="317651"/>
+          </a:xfrm>
+          <a:prstGeom prst="rect">
+            <a:avLst/>
+          </a:prstGeom>
+          <a:noFill/>
+        </p:spPr>
+        <p:txBody>
+          <a:bodyPr wrap="square" rtlCol="0">
+            <a:spAutoFit/>
+          </a:bodyPr>
+          <a:lstStyle/>
+          <a:p>
+            <a:pPr algn="ctr">
+              <a:lnSpc>
+                <a:spcPct val="70000"/>
+              </a:lnSpc>
+            </a:pPr>
+            <a:r>
+              <a:rPr lang="fr-CA" sz="1013" dirty="0"/>
+              <a:t>Marshall</a:t>
+            </a:r>
+            <a:br>
+              <a:rPr lang="fr-CA" sz="1013" dirty="0"/>
+            </a:br>
+            <a:r>
+              <a:rPr lang="fr-CA" sz="1013" dirty="0" err="1"/>
+              <a:t>Secretary</a:t>
+            </a:r>
+            <a:endParaRPr lang="fr-CA" sz="1013" dirty="0"/>
+          </a:p>
+        </p:txBody>
+      </p:sp>
+      <p:pic>
+        <p:nvPicPr>
+          <p:cNvPr id="87" name="Graphic 86" descr="Monitor with solid fill">
+            <a:extLst>
+              <a:ext uri="{FF2B5EF4-FFF2-40B4-BE49-F238E27FC236}">
+                <a16:creationId xmlns:a16="http://schemas.microsoft.com/office/drawing/2014/main" id="{6ACA4A9E-0CD9-FF26-669D-2D0AE15C084F}"/>
+              </a:ext>
+            </a:extLst>
+          </p:cNvPr>
+          <p:cNvPicPr>
+            <a:picLocks noChangeAspect="1"/>
+          </p:cNvPicPr>
+          <p:nvPr/>
+        </p:nvPicPr>
+        <p:blipFill>
+          <a:blip r:embed="rId6">
+            <a:extLst>
+              <a:ext uri="{28A0092B-C50C-407E-A947-70E740481C1C}">
+                <a14:useLocalDpi xmlns:a14="http://schemas.microsoft.com/office/drawing/2010/main" val="0"/>
+              </a:ext>
+              <a:ext uri="{96DAC541-7B7A-43D3-8B79-37D633B846F1}">
+                <asvg:svgBlip xmlns:asvg="http://schemas.microsoft.com/office/drawing/2016/SVG/main" r:embed="rId7"/>
               </a:ext>
             </a:extLst>
           </a:blip>
@@ -42654,86 +44147,8 @@
           </a:stretch>
         </p:blipFill>
         <p:spPr>
-          <a:xfrm rot="16200000">
-            <a:off x="1755762" y="2238126"/>
-            <a:ext cx="542365" cy="542365"/>
-          </a:xfrm>
-          <a:prstGeom prst="rect">
-            <a:avLst/>
-          </a:prstGeom>
-        </p:spPr>
-      </p:pic>
-      <p:pic>
-        <p:nvPicPr>
-          <p:cNvPr id="4" name="Graphic 3" descr="Laptop">
-            <a:extLst>
-              <a:ext uri="{FF2B5EF4-FFF2-40B4-BE49-F238E27FC236}">
-                <a16:creationId xmlns:a16="http://schemas.microsoft.com/office/drawing/2014/main" id="{71177BFE-FADE-7C18-D6B3-3E3B81E8BD87}"/>
-              </a:ext>
-            </a:extLst>
-          </p:cNvPr>
-          <p:cNvPicPr>
-            <a:picLocks noChangeAspect="1"/>
-          </p:cNvPicPr>
-          <p:nvPr/>
-        </p:nvPicPr>
-        <p:blipFill>
-          <a:blip r:embed="rId4">
-            <a:extLst>
-              <a:ext uri="{28A0092B-C50C-407E-A947-70E740481C1C}">
-                <a14:useLocalDpi xmlns:a14="http://schemas.microsoft.com/office/drawing/2010/main" val="0"/>
-              </a:ext>
-              <a:ext uri="{96DAC541-7B7A-43D3-8B79-37D633B846F1}">
-                <asvg:svgBlip xmlns:asvg="http://schemas.microsoft.com/office/drawing/2016/SVG/main" r:embed="rId5"/>
-              </a:ext>
-            </a:extLst>
-          </a:blip>
-          <a:stretch>
-            <a:fillRect/>
-          </a:stretch>
-        </p:blipFill>
-        <p:spPr>
-          <a:xfrm>
-            <a:off x="1807151" y="1331640"/>
-            <a:ext cx="514350" cy="514350"/>
-          </a:xfrm>
-          <a:prstGeom prst="rect">
-            <a:avLst/>
-          </a:prstGeom>
-        </p:spPr>
-      </p:pic>
-      <p:pic>
-        <p:nvPicPr>
-          <p:cNvPr id="5" name="Graphic 4" descr="Monitor with solid fill">
-            <a:extLst>
-              <a:ext uri="{FF2B5EF4-FFF2-40B4-BE49-F238E27FC236}">
-                <a16:creationId xmlns:a16="http://schemas.microsoft.com/office/drawing/2014/main" id="{AE175444-22F3-196E-4B37-EA5DDDA72AC5}"/>
-              </a:ext>
-            </a:extLst>
-          </p:cNvPr>
-          <p:cNvPicPr>
-            <a:picLocks noChangeAspect="1"/>
-          </p:cNvPicPr>
-          <p:nvPr/>
-        </p:nvPicPr>
-        <p:blipFill>
-          <a:blip r:embed="rId6">
-            <a:extLst>
-              <a:ext uri="{28A0092B-C50C-407E-A947-70E740481C1C}">
-                <a14:useLocalDpi xmlns:a14="http://schemas.microsoft.com/office/drawing/2010/main" val="0"/>
-              </a:ext>
-              <a:ext uri="{96DAC541-7B7A-43D3-8B79-37D633B846F1}">
-                <asvg:svgBlip xmlns:asvg="http://schemas.microsoft.com/office/drawing/2016/SVG/main" r:embed="rId7"/>
-              </a:ext>
-            </a:extLst>
-          </a:blip>
-          <a:stretch>
-            <a:fillRect/>
-          </a:stretch>
-        </p:blipFill>
-        <p:spPr>
-          <a:xfrm>
-            <a:off x="912510" y="1344301"/>
+          <a:xfrm>
+            <a:off x="2712187" y="2555776"/>
             <a:ext cx="463422" cy="463422"/>
           </a:xfrm>
           <a:prstGeom prst="rect">
@@ -42743,10 +44158,10 @@
       </p:pic>
       <p:sp>
         <p:nvSpPr>
-          <p:cNvPr id="6" name="TextBox 5">
-            <a:extLst>
-              <a:ext uri="{FF2B5EF4-FFF2-40B4-BE49-F238E27FC236}">
-                <a16:creationId xmlns:a16="http://schemas.microsoft.com/office/drawing/2014/main" id="{7D925E54-90ED-D446-2418-B7072DA4D662}"/>
+          <p:cNvPr id="88" name="TextBox 87">
+            <a:extLst>
+              <a:ext uri="{FF2B5EF4-FFF2-40B4-BE49-F238E27FC236}">
+                <a16:creationId xmlns:a16="http://schemas.microsoft.com/office/drawing/2014/main" id="{5BBB9911-3114-A179-1134-162E24C1AD3A}"/>
               </a:ext>
             </a:extLst>
           </p:cNvPr>
@@ -42755,7 +44170,7 @@
         </p:nvSpPr>
         <p:spPr>
           <a:xfrm>
-            <a:off x="693219" y="1637597"/>
+            <a:off x="2492896" y="2849072"/>
             <a:ext cx="939371" cy="426784"/>
           </a:xfrm>
           <a:prstGeom prst="rect">
@@ -42775,12 +44190,13 @@
               </a:lnSpc>
             </a:pPr>
             <a:br>
-              <a:rPr lang="en-CA" sz="1013" noProof="1"/>
+              <a:rPr lang="fr-CA" sz="1013" dirty="0"/>
             </a:br>
             <a:r>
-              <a:rPr lang="en-CA" sz="1013" noProof="1"/>
+              <a:rPr lang="fr-CA" sz="1013" dirty="0" err="1"/>
               <a:t>Attempt</a:t>
             </a:r>
+            <a:endParaRPr lang="fr-CA" sz="1013" dirty="0"/>
           </a:p>
           <a:p>
             <a:pPr algn="ctr">
@@ -42789,29 +44205,30 @@
               </a:lnSpc>
             </a:pPr>
             <a:r>
-              <a:rPr lang="en-CA" sz="1013" noProof="1"/>
-              <a:t>Board TV</a:t>
+              <a:rPr lang="fr-CA" sz="1013" dirty="0" err="1"/>
+              <a:t>Board</a:t>
             </a:r>
+            <a:endParaRPr lang="fr-CA" sz="1013" dirty="0"/>
           </a:p>
         </p:txBody>
       </p:sp>
       <p:cxnSp>
         <p:nvCxnSpPr>
-          <p:cNvPr id="7" name="Straight Arrow Connector 6">
-            <a:extLst>
-              <a:ext uri="{FF2B5EF4-FFF2-40B4-BE49-F238E27FC236}">
-                <a16:creationId xmlns:a16="http://schemas.microsoft.com/office/drawing/2014/main" id="{5F8A012F-F060-BB79-EFB2-D3E1AA20B274}"/>
+          <p:cNvPr id="91" name="Straight Arrow Connector 90">
+            <a:extLst>
+              <a:ext uri="{FF2B5EF4-FFF2-40B4-BE49-F238E27FC236}">
+                <a16:creationId xmlns:a16="http://schemas.microsoft.com/office/drawing/2014/main" id="{7B4A887B-52B4-A7A8-4678-09EAEEA5EDCF}"/>
               </a:ext>
             </a:extLst>
           </p:cNvPr>
           <p:cNvCxnSpPr>
-            <a:endCxn id="5" idx="3"/>
+            <a:endCxn id="87" idx="3"/>
           </p:cNvCxnSpPr>
           <p:nvPr/>
         </p:nvCxnSpPr>
         <p:spPr>
           <a:xfrm flipH="1">
-            <a:off x="1375932" y="1572424"/>
+            <a:off x="3175609" y="2783899"/>
             <a:ext cx="465878" cy="3588"/>
           </a:xfrm>
           <a:prstGeom prst="straightConnector1">
@@ -42843,10 +44260,10 @@
       </p:cxnSp>
       <p:sp>
         <p:nvSpPr>
-          <p:cNvPr id="8" name="TextBox 7">
-            <a:extLst>
-              <a:ext uri="{FF2B5EF4-FFF2-40B4-BE49-F238E27FC236}">
-                <a16:creationId xmlns:a16="http://schemas.microsoft.com/office/drawing/2014/main" id="{6EC13A1A-770F-2040-2A63-DA1FC1FDC402}"/>
+          <p:cNvPr id="93" name="TextBox 92">
+            <a:extLst>
+              <a:ext uri="{FF2B5EF4-FFF2-40B4-BE49-F238E27FC236}">
+                <a16:creationId xmlns:a16="http://schemas.microsoft.com/office/drawing/2014/main" id="{2F7B7D8D-39F5-1A4D-9DE3-F1C990EBED96}"/>
               </a:ext>
             </a:extLst>
           </p:cNvPr>
@@ -42855,7 +44272,7 @@
         </p:nvSpPr>
         <p:spPr>
           <a:xfrm>
-            <a:off x="1376772" y="1435583"/>
+            <a:off x="3249781" y="2619506"/>
             <a:ext cx="425116" cy="184089"/>
           </a:xfrm>
           <a:prstGeom prst="rect">
@@ -42875,7 +44292,7 @@
               </a:lnSpc>
             </a:pPr>
             <a:r>
-              <a:rPr lang="en-CA" sz="800" noProof="1"/>
+              <a:rPr lang="en-CA" sz="800" dirty="0"/>
               <a:t>HDMI</a:t>
             </a:r>
           </a:p>
@@ -42883,10 +44300,10 @@
       </p:sp>
       <p:pic>
         <p:nvPicPr>
-          <p:cNvPr id="9" name="Picture 8">
-            <a:extLst>
-              <a:ext uri="{FF2B5EF4-FFF2-40B4-BE49-F238E27FC236}">
-                <a16:creationId xmlns:a16="http://schemas.microsoft.com/office/drawing/2014/main" id="{694A75B0-294B-B2FF-0D45-EB170E8CB7CC}"/>
+          <p:cNvPr id="94" name="Graphic 93" descr="Smart Phone">
+            <a:extLst>
+              <a:ext uri="{FF2B5EF4-FFF2-40B4-BE49-F238E27FC236}">
+                <a16:creationId xmlns:a16="http://schemas.microsoft.com/office/drawing/2014/main" id="{7C77A85E-7AAA-8DAA-EC3F-67A83B132FDE}"/>
               </a:ext>
             </a:extLst>
           </p:cNvPr>
@@ -42896,13 +44313,13 @@
           <p:nvPr/>
         </p:nvPicPr>
         <p:blipFill>
-          <a:blip r:embed="rId8">
+          <a:blip r:embed="rId10">
             <a:extLst>
               <a:ext uri="{28A0092B-C50C-407E-A947-70E740481C1C}">
                 <a14:useLocalDpi xmlns:a14="http://schemas.microsoft.com/office/drawing/2010/main" val="0"/>
               </a:ext>
-              <a:ext uri="{837473B0-CC2E-450A-ABE3-18F120FF3D39}">
-                <a1611:picAttrSrcUrl xmlns:a1611="http://schemas.microsoft.com/office/drawing/2016/11/main" r:id="rId9"/>
+              <a:ext uri="{96DAC541-7B7A-43D3-8B79-37D633B846F1}">
+                <asvg:svgBlip xmlns:asvg="http://schemas.microsoft.com/office/drawing/2016/SVG/main" r:embed="rId11"/>
               </a:ext>
             </a:extLst>
           </a:blip>
@@ -42912,7 +44329,124 @@
         </p:blipFill>
         <p:spPr>
           <a:xfrm>
-            <a:off x="2370135" y="2355469"/>
+            <a:off x="3735415" y="3748457"/>
+            <a:ext cx="257175" cy="257175"/>
+          </a:xfrm>
+          <a:prstGeom prst="rect">
+            <a:avLst/>
+          </a:prstGeom>
+        </p:spPr>
+      </p:pic>
+      <p:pic>
+        <p:nvPicPr>
+          <p:cNvPr id="98" name="Graphic 97" descr="Smart Phone">
+            <a:extLst>
+              <a:ext uri="{FF2B5EF4-FFF2-40B4-BE49-F238E27FC236}">
+                <a16:creationId xmlns:a16="http://schemas.microsoft.com/office/drawing/2014/main" id="{C185BAE4-F4A2-B662-61BA-B911E5DF12DE}"/>
+              </a:ext>
+            </a:extLst>
+          </p:cNvPr>
+          <p:cNvPicPr>
+            <a:picLocks noChangeAspect="1"/>
+          </p:cNvPicPr>
+          <p:nvPr/>
+        </p:nvPicPr>
+        <p:blipFill>
+          <a:blip r:embed="rId10">
+            <a:extLst>
+              <a:ext uri="{28A0092B-C50C-407E-A947-70E740481C1C}">
+                <a14:useLocalDpi xmlns:a14="http://schemas.microsoft.com/office/drawing/2010/main" val="0"/>
+              </a:ext>
+              <a:ext uri="{96DAC541-7B7A-43D3-8B79-37D633B846F1}">
+                <asvg:svgBlip xmlns:asvg="http://schemas.microsoft.com/office/drawing/2016/SVG/main" r:embed="rId11"/>
+              </a:ext>
+            </a:extLst>
+          </a:blip>
+          <a:stretch>
+            <a:fillRect/>
+          </a:stretch>
+        </p:blipFill>
+        <p:spPr>
+          <a:xfrm>
+            <a:off x="3487671" y="3748142"/>
+            <a:ext cx="257175" cy="257175"/>
+          </a:xfrm>
+          <a:prstGeom prst="rect">
+            <a:avLst/>
+          </a:prstGeom>
+        </p:spPr>
+      </p:pic>
+      <p:pic>
+        <p:nvPicPr>
+          <p:cNvPr id="99" name="Graphic 98" descr="Smart Phone">
+            <a:extLst>
+              <a:ext uri="{FF2B5EF4-FFF2-40B4-BE49-F238E27FC236}">
+                <a16:creationId xmlns:a16="http://schemas.microsoft.com/office/drawing/2014/main" id="{371710D2-DDB3-16DC-BC2D-4ADDACCA58BE}"/>
+              </a:ext>
+            </a:extLst>
+          </p:cNvPr>
+          <p:cNvPicPr>
+            <a:picLocks noChangeAspect="1"/>
+          </p:cNvPicPr>
+          <p:nvPr/>
+        </p:nvPicPr>
+        <p:blipFill>
+          <a:blip r:embed="rId10">
+            <a:extLst>
+              <a:ext uri="{28A0092B-C50C-407E-A947-70E740481C1C}">
+                <a14:useLocalDpi xmlns:a14="http://schemas.microsoft.com/office/drawing/2010/main" val="0"/>
+              </a:ext>
+              <a:ext uri="{96DAC541-7B7A-43D3-8B79-37D633B846F1}">
+                <asvg:svgBlip xmlns:asvg="http://schemas.microsoft.com/office/drawing/2016/SVG/main" r:embed="rId11"/>
+              </a:ext>
+            </a:extLst>
+          </a:blip>
+          <a:stretch>
+            <a:fillRect/>
+          </a:stretch>
+        </p:blipFill>
+        <p:spPr>
+          <a:xfrm>
+            <a:off x="3239927" y="3747827"/>
+            <a:ext cx="257175" cy="257175"/>
+          </a:xfrm>
+          <a:prstGeom prst="rect">
+            <a:avLst/>
+          </a:prstGeom>
+        </p:spPr>
+      </p:pic>
+      <p:pic>
+        <p:nvPicPr>
+          <p:cNvPr id="109" name="Picture 108">
+            <a:extLst>
+              <a:ext uri="{FF2B5EF4-FFF2-40B4-BE49-F238E27FC236}">
+                <a16:creationId xmlns:a16="http://schemas.microsoft.com/office/drawing/2014/main" id="{0FECFE45-D370-6CD6-A81A-3660C17F1505}"/>
+              </a:ext>
+            </a:extLst>
+          </p:cNvPr>
+          <p:cNvPicPr>
+            <a:picLocks noChangeAspect="1"/>
+          </p:cNvPicPr>
+          <p:nvPr/>
+        </p:nvPicPr>
+        <p:blipFill>
+          <a:blip r:embed="rId12">
+            <a:extLst>
+              <a:ext uri="{28A0092B-C50C-407E-A947-70E740481C1C}">
+                <a14:useLocalDpi xmlns:a14="http://schemas.microsoft.com/office/drawing/2010/main" val="0"/>
+              </a:ext>
+              <a:ext uri="{837473B0-CC2E-450A-ABE3-18F120FF3D39}">
+                <a1611:picAttrSrcUrl xmlns:a1611="http://schemas.microsoft.com/office/drawing/2016/11/main" r:id="rId13"/>
+              </a:ext>
+            </a:extLst>
+          </a:blip>
+          <a:stretch>
+            <a:fillRect/>
+          </a:stretch>
+        </p:blipFill>
+        <p:spPr>
+          <a:xfrm>
+            <a:off x="4108515" y="3695051"/>
             <a:ext cx="182880" cy="134684"/>
           </a:xfrm>
           <a:prstGeom prst="rect">
@@ -42922,10 +44456,10 @@
       </p:pic>
       <p:sp>
         <p:nvSpPr>
-          <p:cNvPr id="10" name="TextBox 9">
-            <a:extLst>
-              <a:ext uri="{FF2B5EF4-FFF2-40B4-BE49-F238E27FC236}">
-                <a16:creationId xmlns:a16="http://schemas.microsoft.com/office/drawing/2014/main" id="{F1943B5A-58B3-2F68-F921-E070BF2485A2}"/>
+          <p:cNvPr id="110" name="TextBox 109">
+            <a:extLst>
+              <a:ext uri="{FF2B5EF4-FFF2-40B4-BE49-F238E27FC236}">
+                <a16:creationId xmlns:a16="http://schemas.microsoft.com/office/drawing/2014/main" id="{8B3F18EF-195C-F030-D7F5-D1C95D7DFBFE}"/>
               </a:ext>
             </a:extLst>
           </p:cNvPr>
@@ -42934,8 +44468,8 @@
         </p:nvSpPr>
         <p:spPr>
           <a:xfrm>
-            <a:off x="1592796" y="1734069"/>
-            <a:ext cx="939371" cy="317651"/>
+            <a:off x="2507645" y="3718213"/>
+            <a:ext cx="862685" cy="317651"/>
           </a:xfrm>
           <a:prstGeom prst="rect">
             <a:avLst/>
@@ -42954,153 +44488,23 @@
               </a:lnSpc>
             </a:pPr>
             <a:r>
-              <a:rPr lang="en-CA" sz="1013" noProof="1"/>
-              <a:t>Announcer</a:t>
+              <a:rPr lang="fr-CA" sz="1013" dirty="0"/>
+              <a:t>Referee</a:t>
             </a:r>
             <a:br>
-              <a:rPr lang="en-CA" sz="1013" noProof="1"/>
+              <a:rPr lang="fr-CA" sz="1013" dirty="0"/>
             </a:br>
             <a:r>
-              <a:rPr lang="en-CA" sz="1013" noProof="1"/>
-              <a:t>Timekeeper</a:t>
+              <a:rPr lang="fr-CA" sz="1013" dirty="0"/>
+              <a:t>phones</a:t>
             </a:r>
           </a:p>
         </p:txBody>
       </p:sp>
-      <p:sp>
-        <p:nvSpPr>
-          <p:cNvPr id="14" name="TextBox 13">
-            <a:extLst>
-              <a:ext uri="{FF2B5EF4-FFF2-40B4-BE49-F238E27FC236}">
-                <a16:creationId xmlns:a16="http://schemas.microsoft.com/office/drawing/2014/main" id="{46F89D06-804C-721C-71C1-D9C84A42DFF4}"/>
-              </a:ext>
-            </a:extLst>
-          </p:cNvPr>
-          <p:cNvSpPr txBox="1"/>
-          <p:nvPr/>
-        </p:nvSpPr>
-        <p:spPr>
-          <a:xfrm>
-            <a:off x="2852936" y="2056984"/>
-            <a:ext cx="587592" cy="208519"/>
-          </a:xfrm>
-          <a:prstGeom prst="rect">
-            <a:avLst/>
-          </a:prstGeom>
-          <a:noFill/>
-        </p:spPr>
-        <p:txBody>
-          <a:bodyPr wrap="square" rtlCol="0">
-            <a:spAutoFit/>
-          </a:bodyPr>
-          <a:lstStyle/>
-          <a:p>
-            <a:pPr algn="ctr">
-              <a:lnSpc>
-                <a:spcPct val="70000"/>
-              </a:lnSpc>
-            </a:pPr>
-            <a:r>
-              <a:rPr lang="en-CA" sz="1013" noProof="1"/>
-              <a:t>Router</a:t>
-            </a:r>
-          </a:p>
-        </p:txBody>
-      </p:sp>
-      <p:cxnSp>
-        <p:nvCxnSpPr>
-          <p:cNvPr id="3" name="Straight Arrow Connector 2">
-            <a:extLst>
-              <a:ext uri="{FF2B5EF4-FFF2-40B4-BE49-F238E27FC236}">
-                <a16:creationId xmlns:a16="http://schemas.microsoft.com/office/drawing/2014/main" id="{CD2CC5BC-4F24-A06C-F7FC-E9158707B87D}"/>
-              </a:ext>
-            </a:extLst>
-          </p:cNvPr>
-          <p:cNvCxnSpPr>
-            <a:cxnSpLocks/>
-          </p:cNvCxnSpPr>
-          <p:nvPr/>
-        </p:nvCxnSpPr>
-        <p:spPr>
-          <a:xfrm flipH="1">
-            <a:off x="2591831" y="1987367"/>
-            <a:ext cx="320174" cy="0"/>
-          </a:xfrm>
-          <a:prstGeom prst="straightConnector1">
-            <a:avLst/>
-          </a:prstGeom>
-          <a:ln w="12700">
-            <a:solidFill>
-              <a:schemeClr val="tx1"/>
-            </a:solidFill>
-            <a:headEnd type="triangle"/>
-            <a:tailEnd type="triangle"/>
-          </a:ln>
-        </p:spPr>
-        <p:style>
-          <a:lnRef idx="1">
-            <a:schemeClr val="accent1"/>
-          </a:lnRef>
-          <a:fillRef idx="0">
-            <a:schemeClr val="accent1"/>
-          </a:fillRef>
-          <a:effectRef idx="0">
-            <a:schemeClr val="accent1"/>
-          </a:effectRef>
-          <a:fontRef idx="minor">
-            <a:schemeClr val="tx1"/>
-          </a:fontRef>
-        </p:style>
-      </p:cxnSp>
-      <p:pic>
-        <p:nvPicPr>
-          <p:cNvPr id="12" name="Graphic 11">
-            <a:extLst>
-              <a:ext uri="{FF2B5EF4-FFF2-40B4-BE49-F238E27FC236}">
-                <a16:creationId xmlns:a16="http://schemas.microsoft.com/office/drawing/2014/main" id="{C4367C66-B4EE-11B6-3D33-0B9732744A5A}"/>
-              </a:ext>
-            </a:extLst>
-          </p:cNvPr>
-          <p:cNvPicPr>
-            <a:picLocks noChangeAspect="1"/>
-          </p:cNvPicPr>
-          <p:nvPr/>
-        </p:nvPicPr>
-        <p:blipFill rotWithShape="1">
-          <a:blip r:embed="rId10">
-            <a:duotone>
-              <a:schemeClr val="accent1">
-                <a:shade val="45000"/>
-                <a:satMod val="135000"/>
-              </a:schemeClr>
-              <a:prstClr val="white"/>
-            </a:duotone>
-            <a:extLst>
-              <a:ext uri="{28A0092B-C50C-407E-A947-70E740481C1C}">
-                <a14:useLocalDpi xmlns:a14="http://schemas.microsoft.com/office/drawing/2010/main" val="0"/>
-              </a:ext>
-              <a:ext uri="{96DAC541-7B7A-43D3-8B79-37D633B846F1}">
-                <asvg:svgBlip xmlns:asvg="http://schemas.microsoft.com/office/drawing/2016/SVG/main" r:embed="rId11"/>
-              </a:ext>
-            </a:extLst>
-          </a:blip>
-          <a:srcRect t="19758" b="39178"/>
-          <a:stretch/>
-        </p:blipFill>
-        <p:spPr>
-          <a:xfrm>
-            <a:off x="2800759" y="1845990"/>
-            <a:ext cx="710946" cy="291944"/>
-          </a:xfrm>
-          <a:prstGeom prst="rect">
-            <a:avLst/>
-          </a:prstGeom>
-        </p:spPr>
-      </p:pic>
     </p:spTree>
     <p:extLst>
       <p:ext uri="{BB962C8B-B14F-4D97-AF65-F5344CB8AC3E}">
-        <p14:creationId xmlns:p14="http://schemas.microsoft.com/office/powerpoint/2010/main" val="1642002740"/>
+        <p14:creationId xmlns:p14="http://schemas.microsoft.com/office/powerpoint/2010/main" val="2910309073"/>
       </p:ext>
     </p:extLst>
   </p:cSld>

</xml_diff>